<commit_message>
Updated ROS arch. and exported image
</commit_message>
<xml_diff>
--- a/Architecture.pptx
+++ b/Architecture.pptx
@@ -213,7 +213,7 @@
           <a:p>
             <a:fld id="{7207C0AE-1CF7-4A0B-B9C2-6CA9E4371059}" type="datetimeFigureOut">
               <a:rPr lang="en-US" smtClean="0"/>
-              <a:t>7/22/2017</a:t>
+              <a:t>8/4/2017</a:t>
             </a:fld>
             <a:endParaRPr lang="en-US"/>
           </a:p>
@@ -613,13 +613,8 @@
           <a:p>
             <a:r>
               <a:rPr lang="en-US" dirty="0"/>
-              <a:t>ROS Architecture. Structure of nodes </a:t>
-            </a:r>
-            <a:r>
-              <a:rPr lang="en-US"/>
-              <a:t>(lines are topics).</a:t>
-            </a:r>
-            <a:endParaRPr lang="en-US" dirty="0"/>
+              <a:t>ROS Architecture. Structure of nodes (lines are topics).</a:t>
+            </a:r>
           </a:p>
           <a:p>
             <a:endParaRPr lang="en-US" dirty="0"/>
@@ -653,7 +648,19 @@
           <a:p>
             <a:r>
               <a:rPr lang="en-US" dirty="0"/>
-              <a:t>The Inverse Kinematics library may or may not exist in reality. It will certainty not exist in rev1.</a:t>
+              <a:t>The Inverse </a:t>
+            </a:r>
+            <a:r>
+              <a:rPr lang="en-US"/>
+              <a:t>Kinematics </a:t>
+            </a:r>
+            <a:r>
+              <a:rPr lang="en-US" smtClean="0"/>
+              <a:t>node may </a:t>
+            </a:r>
+            <a:r>
+              <a:rPr lang="en-US" dirty="0"/>
+              <a:t>or may not exist in reality. It will certainty not exist in rev1.</a:t>
             </a:r>
           </a:p>
         </p:txBody>
@@ -716,7 +723,7 @@
           <p:cNvPr id="2" name="Title 1">
             <a:extLst>
               <a:ext uri="{FF2B5EF4-FFF2-40B4-BE49-F238E27FC236}">
-                <a16:creationId xmlns:a16="http://schemas.microsoft.com/office/drawing/2014/main" id="{2DEB2E61-9CD0-4F11-B666-8FDB4731D0A0}"/>
+                <a16:creationId xmlns:a16="http://schemas.microsoft.com/office/drawing/2014/main" xmlns="" id="{2DEB2E61-9CD0-4F11-B666-8FDB4731D0A0}"/>
               </a:ext>
             </a:extLst>
           </p:cNvPr>
@@ -753,7 +760,7 @@
           <p:cNvPr id="3" name="Subtitle 2">
             <a:extLst>
               <a:ext uri="{FF2B5EF4-FFF2-40B4-BE49-F238E27FC236}">
-                <a16:creationId xmlns:a16="http://schemas.microsoft.com/office/drawing/2014/main" id="{BF547E7B-21BD-43C5-9726-809B94867BE1}"/>
+                <a16:creationId xmlns:a16="http://schemas.microsoft.com/office/drawing/2014/main" xmlns="" id="{BF547E7B-21BD-43C5-9726-809B94867BE1}"/>
               </a:ext>
             </a:extLst>
           </p:cNvPr>
@@ -823,7 +830,7 @@
           <p:cNvPr id="4" name="Date Placeholder 3">
             <a:extLst>
               <a:ext uri="{FF2B5EF4-FFF2-40B4-BE49-F238E27FC236}">
-                <a16:creationId xmlns:a16="http://schemas.microsoft.com/office/drawing/2014/main" id="{496F9238-1F92-4D4B-A16E-CCD61B73ABAA}"/>
+                <a16:creationId xmlns:a16="http://schemas.microsoft.com/office/drawing/2014/main" xmlns="" id="{496F9238-1F92-4D4B-A16E-CCD61B73ABAA}"/>
               </a:ext>
             </a:extLst>
           </p:cNvPr>
@@ -841,7 +848,7 @@
           <a:p>
             <a:fld id="{1522C3F5-FD30-402A-BDF3-0D99E299B33B}" type="datetimeFigureOut">
               <a:rPr lang="en-US" smtClean="0"/>
-              <a:t>7/22/2017</a:t>
+              <a:t>8/4/2017</a:t>
             </a:fld>
             <a:endParaRPr lang="en-US"/>
           </a:p>
@@ -852,7 +859,7 @@
           <p:cNvPr id="5" name="Footer Placeholder 4">
             <a:extLst>
               <a:ext uri="{FF2B5EF4-FFF2-40B4-BE49-F238E27FC236}">
-                <a16:creationId xmlns:a16="http://schemas.microsoft.com/office/drawing/2014/main" id="{09CEB96C-DD9B-4D85-915D-D9F4DF7E625C}"/>
+                <a16:creationId xmlns:a16="http://schemas.microsoft.com/office/drawing/2014/main" xmlns="" id="{09CEB96C-DD9B-4D85-915D-D9F4DF7E625C}"/>
               </a:ext>
             </a:extLst>
           </p:cNvPr>
@@ -877,7 +884,7 @@
           <p:cNvPr id="6" name="Slide Number Placeholder 5">
             <a:extLst>
               <a:ext uri="{FF2B5EF4-FFF2-40B4-BE49-F238E27FC236}">
-                <a16:creationId xmlns:a16="http://schemas.microsoft.com/office/drawing/2014/main" id="{7BA96337-642A-459D-8F6A-188DE1979B04}"/>
+                <a16:creationId xmlns:a16="http://schemas.microsoft.com/office/drawing/2014/main" xmlns="" id="{7BA96337-642A-459D-8F6A-188DE1979B04}"/>
               </a:ext>
             </a:extLst>
           </p:cNvPr>
@@ -936,7 +943,7 @@
           <p:cNvPr id="2" name="Title 1">
             <a:extLst>
               <a:ext uri="{FF2B5EF4-FFF2-40B4-BE49-F238E27FC236}">
-                <a16:creationId xmlns:a16="http://schemas.microsoft.com/office/drawing/2014/main" id="{BF7E8A16-AF9E-4BC9-9825-70050997DAF6}"/>
+                <a16:creationId xmlns:a16="http://schemas.microsoft.com/office/drawing/2014/main" xmlns="" id="{BF7E8A16-AF9E-4BC9-9825-70050997DAF6}"/>
               </a:ext>
             </a:extLst>
           </p:cNvPr>
@@ -964,7 +971,7 @@
           <p:cNvPr id="3" name="Vertical Text Placeholder 2">
             <a:extLst>
               <a:ext uri="{FF2B5EF4-FFF2-40B4-BE49-F238E27FC236}">
-                <a16:creationId xmlns:a16="http://schemas.microsoft.com/office/drawing/2014/main" id="{B67FB979-0B7A-436D-A155-5AED645CCBF8}"/>
+                <a16:creationId xmlns:a16="http://schemas.microsoft.com/office/drawing/2014/main" xmlns="" id="{B67FB979-0B7A-436D-A155-5AED645CCBF8}"/>
               </a:ext>
             </a:extLst>
           </p:cNvPr>
@@ -1021,7 +1028,7 @@
           <p:cNvPr id="4" name="Date Placeholder 3">
             <a:extLst>
               <a:ext uri="{FF2B5EF4-FFF2-40B4-BE49-F238E27FC236}">
-                <a16:creationId xmlns:a16="http://schemas.microsoft.com/office/drawing/2014/main" id="{C10D1D0F-1314-460E-8D0A-A7EF3F206254}"/>
+                <a16:creationId xmlns:a16="http://schemas.microsoft.com/office/drawing/2014/main" xmlns="" id="{C10D1D0F-1314-460E-8D0A-A7EF3F206254}"/>
               </a:ext>
             </a:extLst>
           </p:cNvPr>
@@ -1039,7 +1046,7 @@
           <a:p>
             <a:fld id="{1522C3F5-FD30-402A-BDF3-0D99E299B33B}" type="datetimeFigureOut">
               <a:rPr lang="en-US" smtClean="0"/>
-              <a:t>7/22/2017</a:t>
+              <a:t>8/4/2017</a:t>
             </a:fld>
             <a:endParaRPr lang="en-US"/>
           </a:p>
@@ -1050,7 +1057,7 @@
           <p:cNvPr id="5" name="Footer Placeholder 4">
             <a:extLst>
               <a:ext uri="{FF2B5EF4-FFF2-40B4-BE49-F238E27FC236}">
-                <a16:creationId xmlns:a16="http://schemas.microsoft.com/office/drawing/2014/main" id="{AAD8ACAF-58A7-4C2B-A3C5-1DF92F9D89B3}"/>
+                <a16:creationId xmlns:a16="http://schemas.microsoft.com/office/drawing/2014/main" xmlns="" id="{AAD8ACAF-58A7-4C2B-A3C5-1DF92F9D89B3}"/>
               </a:ext>
             </a:extLst>
           </p:cNvPr>
@@ -1075,7 +1082,7 @@
           <p:cNvPr id="6" name="Slide Number Placeholder 5">
             <a:extLst>
               <a:ext uri="{FF2B5EF4-FFF2-40B4-BE49-F238E27FC236}">
-                <a16:creationId xmlns:a16="http://schemas.microsoft.com/office/drawing/2014/main" id="{28DCC1E8-C736-4BD2-9D36-F0BC6295E588}"/>
+                <a16:creationId xmlns:a16="http://schemas.microsoft.com/office/drawing/2014/main" xmlns="" id="{28DCC1E8-C736-4BD2-9D36-F0BC6295E588}"/>
               </a:ext>
             </a:extLst>
           </p:cNvPr>
@@ -1134,7 +1141,7 @@
           <p:cNvPr id="2" name="Vertical Title 1">
             <a:extLst>
               <a:ext uri="{FF2B5EF4-FFF2-40B4-BE49-F238E27FC236}">
-                <a16:creationId xmlns:a16="http://schemas.microsoft.com/office/drawing/2014/main" id="{31DAA29B-9B59-41F8-B9AB-5D09C605E5D8}"/>
+                <a16:creationId xmlns:a16="http://schemas.microsoft.com/office/drawing/2014/main" xmlns="" id="{31DAA29B-9B59-41F8-B9AB-5D09C605E5D8}"/>
               </a:ext>
             </a:extLst>
           </p:cNvPr>
@@ -1167,7 +1174,7 @@
           <p:cNvPr id="3" name="Vertical Text Placeholder 2">
             <a:extLst>
               <a:ext uri="{FF2B5EF4-FFF2-40B4-BE49-F238E27FC236}">
-                <a16:creationId xmlns:a16="http://schemas.microsoft.com/office/drawing/2014/main" id="{FDDE99D5-E6F1-4AAA-B423-C22EB72B5E40}"/>
+                <a16:creationId xmlns:a16="http://schemas.microsoft.com/office/drawing/2014/main" xmlns="" id="{FDDE99D5-E6F1-4AAA-B423-C22EB72B5E40}"/>
               </a:ext>
             </a:extLst>
           </p:cNvPr>
@@ -1229,7 +1236,7 @@
           <p:cNvPr id="4" name="Date Placeholder 3">
             <a:extLst>
               <a:ext uri="{FF2B5EF4-FFF2-40B4-BE49-F238E27FC236}">
-                <a16:creationId xmlns:a16="http://schemas.microsoft.com/office/drawing/2014/main" id="{7F71ED12-90B8-417C-A16C-D90B6072872A}"/>
+                <a16:creationId xmlns:a16="http://schemas.microsoft.com/office/drawing/2014/main" xmlns="" id="{7F71ED12-90B8-417C-A16C-D90B6072872A}"/>
               </a:ext>
             </a:extLst>
           </p:cNvPr>
@@ -1247,7 +1254,7 @@
           <a:p>
             <a:fld id="{1522C3F5-FD30-402A-BDF3-0D99E299B33B}" type="datetimeFigureOut">
               <a:rPr lang="en-US" smtClean="0"/>
-              <a:t>7/22/2017</a:t>
+              <a:t>8/4/2017</a:t>
             </a:fld>
             <a:endParaRPr lang="en-US"/>
           </a:p>
@@ -1258,7 +1265,7 @@
           <p:cNvPr id="5" name="Footer Placeholder 4">
             <a:extLst>
               <a:ext uri="{FF2B5EF4-FFF2-40B4-BE49-F238E27FC236}">
-                <a16:creationId xmlns:a16="http://schemas.microsoft.com/office/drawing/2014/main" id="{C7C6390B-E9D7-4013-B105-108BFA7F4149}"/>
+                <a16:creationId xmlns:a16="http://schemas.microsoft.com/office/drawing/2014/main" xmlns="" id="{C7C6390B-E9D7-4013-B105-108BFA7F4149}"/>
               </a:ext>
             </a:extLst>
           </p:cNvPr>
@@ -1283,7 +1290,7 @@
           <p:cNvPr id="6" name="Slide Number Placeholder 5">
             <a:extLst>
               <a:ext uri="{FF2B5EF4-FFF2-40B4-BE49-F238E27FC236}">
-                <a16:creationId xmlns:a16="http://schemas.microsoft.com/office/drawing/2014/main" id="{F8C6763C-CC05-474B-8133-5EBAA0559D7F}"/>
+                <a16:creationId xmlns:a16="http://schemas.microsoft.com/office/drawing/2014/main" xmlns="" id="{F8C6763C-CC05-474B-8133-5EBAA0559D7F}"/>
               </a:ext>
             </a:extLst>
           </p:cNvPr>
@@ -1342,7 +1349,7 @@
           <p:cNvPr id="2" name="Title 1">
             <a:extLst>
               <a:ext uri="{FF2B5EF4-FFF2-40B4-BE49-F238E27FC236}">
-                <a16:creationId xmlns:a16="http://schemas.microsoft.com/office/drawing/2014/main" id="{9C96DDB4-5FF9-4C26-B0A9-9037C05FE13F}"/>
+                <a16:creationId xmlns:a16="http://schemas.microsoft.com/office/drawing/2014/main" xmlns="" id="{9C96DDB4-5FF9-4C26-B0A9-9037C05FE13F}"/>
               </a:ext>
             </a:extLst>
           </p:cNvPr>
@@ -1370,7 +1377,7 @@
           <p:cNvPr id="3" name="Content Placeholder 2">
             <a:extLst>
               <a:ext uri="{FF2B5EF4-FFF2-40B4-BE49-F238E27FC236}">
-                <a16:creationId xmlns:a16="http://schemas.microsoft.com/office/drawing/2014/main" id="{5E2372B5-8438-4C41-BBCC-3D45D7CFF92C}"/>
+                <a16:creationId xmlns:a16="http://schemas.microsoft.com/office/drawing/2014/main" xmlns="" id="{5E2372B5-8438-4C41-BBCC-3D45D7CFF92C}"/>
               </a:ext>
             </a:extLst>
           </p:cNvPr>
@@ -1427,7 +1434,7 @@
           <p:cNvPr id="4" name="Date Placeholder 3">
             <a:extLst>
               <a:ext uri="{FF2B5EF4-FFF2-40B4-BE49-F238E27FC236}">
-                <a16:creationId xmlns:a16="http://schemas.microsoft.com/office/drawing/2014/main" id="{E67DB774-BF60-48FD-A34E-6AC1AD2B75A9}"/>
+                <a16:creationId xmlns:a16="http://schemas.microsoft.com/office/drawing/2014/main" xmlns="" id="{E67DB774-BF60-48FD-A34E-6AC1AD2B75A9}"/>
               </a:ext>
             </a:extLst>
           </p:cNvPr>
@@ -1445,7 +1452,7 @@
           <a:p>
             <a:fld id="{1522C3F5-FD30-402A-BDF3-0D99E299B33B}" type="datetimeFigureOut">
               <a:rPr lang="en-US" smtClean="0"/>
-              <a:t>7/22/2017</a:t>
+              <a:t>8/4/2017</a:t>
             </a:fld>
             <a:endParaRPr lang="en-US"/>
           </a:p>
@@ -1456,7 +1463,7 @@
           <p:cNvPr id="5" name="Footer Placeholder 4">
             <a:extLst>
               <a:ext uri="{FF2B5EF4-FFF2-40B4-BE49-F238E27FC236}">
-                <a16:creationId xmlns:a16="http://schemas.microsoft.com/office/drawing/2014/main" id="{C40CA876-38D1-4F86-AADF-761BFD8C055E}"/>
+                <a16:creationId xmlns:a16="http://schemas.microsoft.com/office/drawing/2014/main" xmlns="" id="{C40CA876-38D1-4F86-AADF-761BFD8C055E}"/>
               </a:ext>
             </a:extLst>
           </p:cNvPr>
@@ -1481,7 +1488,7 @@
           <p:cNvPr id="6" name="Slide Number Placeholder 5">
             <a:extLst>
               <a:ext uri="{FF2B5EF4-FFF2-40B4-BE49-F238E27FC236}">
-                <a16:creationId xmlns:a16="http://schemas.microsoft.com/office/drawing/2014/main" id="{90EC0C56-8C3A-44AB-8D04-19A6F4903765}"/>
+                <a16:creationId xmlns:a16="http://schemas.microsoft.com/office/drawing/2014/main" xmlns="" id="{90EC0C56-8C3A-44AB-8D04-19A6F4903765}"/>
               </a:ext>
             </a:extLst>
           </p:cNvPr>
@@ -1540,7 +1547,7 @@
           <p:cNvPr id="2" name="Title 1">
             <a:extLst>
               <a:ext uri="{FF2B5EF4-FFF2-40B4-BE49-F238E27FC236}">
-                <a16:creationId xmlns:a16="http://schemas.microsoft.com/office/drawing/2014/main" id="{519E1F64-CB8C-485C-B924-B2C76F4DBE4D}"/>
+                <a16:creationId xmlns:a16="http://schemas.microsoft.com/office/drawing/2014/main" xmlns="" id="{519E1F64-CB8C-485C-B924-B2C76F4DBE4D}"/>
               </a:ext>
             </a:extLst>
           </p:cNvPr>
@@ -1577,7 +1584,7 @@
           <p:cNvPr id="3" name="Text Placeholder 2">
             <a:extLst>
               <a:ext uri="{FF2B5EF4-FFF2-40B4-BE49-F238E27FC236}">
-                <a16:creationId xmlns:a16="http://schemas.microsoft.com/office/drawing/2014/main" id="{14CCD593-DC0F-4DC8-86CF-C2EB215157A5}"/>
+                <a16:creationId xmlns:a16="http://schemas.microsoft.com/office/drawing/2014/main" xmlns="" id="{14CCD593-DC0F-4DC8-86CF-C2EB215157A5}"/>
               </a:ext>
             </a:extLst>
           </p:cNvPr>
@@ -1702,7 +1709,7 @@
           <p:cNvPr id="4" name="Date Placeholder 3">
             <a:extLst>
               <a:ext uri="{FF2B5EF4-FFF2-40B4-BE49-F238E27FC236}">
-                <a16:creationId xmlns:a16="http://schemas.microsoft.com/office/drawing/2014/main" id="{72D0AC71-8D0F-4C06-90E8-BE21B5D7AB3C}"/>
+                <a16:creationId xmlns:a16="http://schemas.microsoft.com/office/drawing/2014/main" xmlns="" id="{72D0AC71-8D0F-4C06-90E8-BE21B5D7AB3C}"/>
               </a:ext>
             </a:extLst>
           </p:cNvPr>
@@ -1720,7 +1727,7 @@
           <a:p>
             <a:fld id="{1522C3F5-FD30-402A-BDF3-0D99E299B33B}" type="datetimeFigureOut">
               <a:rPr lang="en-US" smtClean="0"/>
-              <a:t>7/22/2017</a:t>
+              <a:t>8/4/2017</a:t>
             </a:fld>
             <a:endParaRPr lang="en-US"/>
           </a:p>
@@ -1731,7 +1738,7 @@
           <p:cNvPr id="5" name="Footer Placeholder 4">
             <a:extLst>
               <a:ext uri="{FF2B5EF4-FFF2-40B4-BE49-F238E27FC236}">
-                <a16:creationId xmlns:a16="http://schemas.microsoft.com/office/drawing/2014/main" id="{2B3BA73C-F7B0-424A-94C7-8DE18676A405}"/>
+                <a16:creationId xmlns:a16="http://schemas.microsoft.com/office/drawing/2014/main" xmlns="" id="{2B3BA73C-F7B0-424A-94C7-8DE18676A405}"/>
               </a:ext>
             </a:extLst>
           </p:cNvPr>
@@ -1756,7 +1763,7 @@
           <p:cNvPr id="6" name="Slide Number Placeholder 5">
             <a:extLst>
               <a:ext uri="{FF2B5EF4-FFF2-40B4-BE49-F238E27FC236}">
-                <a16:creationId xmlns:a16="http://schemas.microsoft.com/office/drawing/2014/main" id="{898D936B-659D-4433-A4C1-BD0B01634E5D}"/>
+                <a16:creationId xmlns:a16="http://schemas.microsoft.com/office/drawing/2014/main" xmlns="" id="{898D936B-659D-4433-A4C1-BD0B01634E5D}"/>
               </a:ext>
             </a:extLst>
           </p:cNvPr>
@@ -1815,7 +1822,7 @@
           <p:cNvPr id="2" name="Title 1">
             <a:extLst>
               <a:ext uri="{FF2B5EF4-FFF2-40B4-BE49-F238E27FC236}">
-                <a16:creationId xmlns:a16="http://schemas.microsoft.com/office/drawing/2014/main" id="{932A8F0E-AC4E-447E-8DDF-0FEC1671703A}"/>
+                <a16:creationId xmlns:a16="http://schemas.microsoft.com/office/drawing/2014/main" xmlns="" id="{932A8F0E-AC4E-447E-8DDF-0FEC1671703A}"/>
               </a:ext>
             </a:extLst>
           </p:cNvPr>
@@ -1843,7 +1850,7 @@
           <p:cNvPr id="3" name="Content Placeholder 2">
             <a:extLst>
               <a:ext uri="{FF2B5EF4-FFF2-40B4-BE49-F238E27FC236}">
-                <a16:creationId xmlns:a16="http://schemas.microsoft.com/office/drawing/2014/main" id="{A673D2D1-EC5D-40FE-B311-CE8175A4CF50}"/>
+                <a16:creationId xmlns:a16="http://schemas.microsoft.com/office/drawing/2014/main" xmlns="" id="{A673D2D1-EC5D-40FE-B311-CE8175A4CF50}"/>
               </a:ext>
             </a:extLst>
           </p:cNvPr>
@@ -1905,7 +1912,7 @@
           <p:cNvPr id="4" name="Content Placeholder 3">
             <a:extLst>
               <a:ext uri="{FF2B5EF4-FFF2-40B4-BE49-F238E27FC236}">
-                <a16:creationId xmlns:a16="http://schemas.microsoft.com/office/drawing/2014/main" id="{68AFBAC7-367C-4540-AD6A-D3456BD4AF89}"/>
+                <a16:creationId xmlns:a16="http://schemas.microsoft.com/office/drawing/2014/main" xmlns="" id="{68AFBAC7-367C-4540-AD6A-D3456BD4AF89}"/>
               </a:ext>
             </a:extLst>
           </p:cNvPr>
@@ -1967,7 +1974,7 @@
           <p:cNvPr id="5" name="Date Placeholder 4">
             <a:extLst>
               <a:ext uri="{FF2B5EF4-FFF2-40B4-BE49-F238E27FC236}">
-                <a16:creationId xmlns:a16="http://schemas.microsoft.com/office/drawing/2014/main" id="{B3D335ED-202F-4FCE-8130-30FD5210FDB1}"/>
+                <a16:creationId xmlns:a16="http://schemas.microsoft.com/office/drawing/2014/main" xmlns="" id="{B3D335ED-202F-4FCE-8130-30FD5210FDB1}"/>
               </a:ext>
             </a:extLst>
           </p:cNvPr>
@@ -1985,7 +1992,7 @@
           <a:p>
             <a:fld id="{1522C3F5-FD30-402A-BDF3-0D99E299B33B}" type="datetimeFigureOut">
               <a:rPr lang="en-US" smtClean="0"/>
-              <a:t>7/22/2017</a:t>
+              <a:t>8/4/2017</a:t>
             </a:fld>
             <a:endParaRPr lang="en-US"/>
           </a:p>
@@ -1996,7 +2003,7 @@
           <p:cNvPr id="6" name="Footer Placeholder 5">
             <a:extLst>
               <a:ext uri="{FF2B5EF4-FFF2-40B4-BE49-F238E27FC236}">
-                <a16:creationId xmlns:a16="http://schemas.microsoft.com/office/drawing/2014/main" id="{49D077C7-214E-492D-B478-E378DFB099A6}"/>
+                <a16:creationId xmlns:a16="http://schemas.microsoft.com/office/drawing/2014/main" xmlns="" id="{49D077C7-214E-492D-B478-E378DFB099A6}"/>
               </a:ext>
             </a:extLst>
           </p:cNvPr>
@@ -2021,7 +2028,7 @@
           <p:cNvPr id="7" name="Slide Number Placeholder 6">
             <a:extLst>
               <a:ext uri="{FF2B5EF4-FFF2-40B4-BE49-F238E27FC236}">
-                <a16:creationId xmlns:a16="http://schemas.microsoft.com/office/drawing/2014/main" id="{9C007027-2F55-466E-89E0-08ACB85C3BCA}"/>
+                <a16:creationId xmlns:a16="http://schemas.microsoft.com/office/drawing/2014/main" xmlns="" id="{9C007027-2F55-466E-89E0-08ACB85C3BCA}"/>
               </a:ext>
             </a:extLst>
           </p:cNvPr>
@@ -2080,7 +2087,7 @@
           <p:cNvPr id="2" name="Title 1">
             <a:extLst>
               <a:ext uri="{FF2B5EF4-FFF2-40B4-BE49-F238E27FC236}">
-                <a16:creationId xmlns:a16="http://schemas.microsoft.com/office/drawing/2014/main" id="{191A78EE-ADAE-41A3-8966-A11F11C4CA19}"/>
+                <a16:creationId xmlns:a16="http://schemas.microsoft.com/office/drawing/2014/main" xmlns="" id="{191A78EE-ADAE-41A3-8966-A11F11C4CA19}"/>
               </a:ext>
             </a:extLst>
           </p:cNvPr>
@@ -2113,7 +2120,7 @@
           <p:cNvPr id="3" name="Text Placeholder 2">
             <a:extLst>
               <a:ext uri="{FF2B5EF4-FFF2-40B4-BE49-F238E27FC236}">
-                <a16:creationId xmlns:a16="http://schemas.microsoft.com/office/drawing/2014/main" id="{34E6C091-4D67-4A33-863F-9BECB18D8D4B}"/>
+                <a16:creationId xmlns:a16="http://schemas.microsoft.com/office/drawing/2014/main" xmlns="" id="{34E6C091-4D67-4A33-863F-9BECB18D8D4B}"/>
               </a:ext>
             </a:extLst>
           </p:cNvPr>
@@ -2184,7 +2191,7 @@
           <p:cNvPr id="4" name="Content Placeholder 3">
             <a:extLst>
               <a:ext uri="{FF2B5EF4-FFF2-40B4-BE49-F238E27FC236}">
-                <a16:creationId xmlns:a16="http://schemas.microsoft.com/office/drawing/2014/main" id="{7CAF1A9C-B9CF-45E7-B168-D0DCC255CD64}"/>
+                <a16:creationId xmlns:a16="http://schemas.microsoft.com/office/drawing/2014/main" xmlns="" id="{7CAF1A9C-B9CF-45E7-B168-D0DCC255CD64}"/>
               </a:ext>
             </a:extLst>
           </p:cNvPr>
@@ -2246,7 +2253,7 @@
           <p:cNvPr id="5" name="Text Placeholder 4">
             <a:extLst>
               <a:ext uri="{FF2B5EF4-FFF2-40B4-BE49-F238E27FC236}">
-                <a16:creationId xmlns:a16="http://schemas.microsoft.com/office/drawing/2014/main" id="{D715AE5A-B81A-46F6-B2C0-9194D0A6A66D}"/>
+                <a16:creationId xmlns:a16="http://schemas.microsoft.com/office/drawing/2014/main" xmlns="" id="{D715AE5A-B81A-46F6-B2C0-9194D0A6A66D}"/>
               </a:ext>
             </a:extLst>
           </p:cNvPr>
@@ -2317,7 +2324,7 @@
           <p:cNvPr id="6" name="Content Placeholder 5">
             <a:extLst>
               <a:ext uri="{FF2B5EF4-FFF2-40B4-BE49-F238E27FC236}">
-                <a16:creationId xmlns:a16="http://schemas.microsoft.com/office/drawing/2014/main" id="{50571D5F-5F17-4D17-9EDC-47FC5E645434}"/>
+                <a16:creationId xmlns:a16="http://schemas.microsoft.com/office/drawing/2014/main" xmlns="" id="{50571D5F-5F17-4D17-9EDC-47FC5E645434}"/>
               </a:ext>
             </a:extLst>
           </p:cNvPr>
@@ -2379,7 +2386,7 @@
           <p:cNvPr id="7" name="Date Placeholder 6">
             <a:extLst>
               <a:ext uri="{FF2B5EF4-FFF2-40B4-BE49-F238E27FC236}">
-                <a16:creationId xmlns:a16="http://schemas.microsoft.com/office/drawing/2014/main" id="{5AF82212-8144-4473-8BA2-9067A5D7A638}"/>
+                <a16:creationId xmlns:a16="http://schemas.microsoft.com/office/drawing/2014/main" xmlns="" id="{5AF82212-8144-4473-8BA2-9067A5D7A638}"/>
               </a:ext>
             </a:extLst>
           </p:cNvPr>
@@ -2397,7 +2404,7 @@
           <a:p>
             <a:fld id="{1522C3F5-FD30-402A-BDF3-0D99E299B33B}" type="datetimeFigureOut">
               <a:rPr lang="en-US" smtClean="0"/>
-              <a:t>7/22/2017</a:t>
+              <a:t>8/4/2017</a:t>
             </a:fld>
             <a:endParaRPr lang="en-US"/>
           </a:p>
@@ -2408,7 +2415,7 @@
           <p:cNvPr id="8" name="Footer Placeholder 7">
             <a:extLst>
               <a:ext uri="{FF2B5EF4-FFF2-40B4-BE49-F238E27FC236}">
-                <a16:creationId xmlns:a16="http://schemas.microsoft.com/office/drawing/2014/main" id="{65577486-B285-451E-99CF-3D12C093CF61}"/>
+                <a16:creationId xmlns:a16="http://schemas.microsoft.com/office/drawing/2014/main" xmlns="" id="{65577486-B285-451E-99CF-3D12C093CF61}"/>
               </a:ext>
             </a:extLst>
           </p:cNvPr>
@@ -2433,7 +2440,7 @@
           <p:cNvPr id="9" name="Slide Number Placeholder 8">
             <a:extLst>
               <a:ext uri="{FF2B5EF4-FFF2-40B4-BE49-F238E27FC236}">
-                <a16:creationId xmlns:a16="http://schemas.microsoft.com/office/drawing/2014/main" id="{B39D349B-A643-4B5C-A253-6F84353DEEE6}"/>
+                <a16:creationId xmlns:a16="http://schemas.microsoft.com/office/drawing/2014/main" xmlns="" id="{B39D349B-A643-4B5C-A253-6F84353DEEE6}"/>
               </a:ext>
             </a:extLst>
           </p:cNvPr>
@@ -2492,7 +2499,7 @@
           <p:cNvPr id="2" name="Title 1">
             <a:extLst>
               <a:ext uri="{FF2B5EF4-FFF2-40B4-BE49-F238E27FC236}">
-                <a16:creationId xmlns:a16="http://schemas.microsoft.com/office/drawing/2014/main" id="{102D00B1-E475-41CE-8D41-C7A98C0B2E88}"/>
+                <a16:creationId xmlns:a16="http://schemas.microsoft.com/office/drawing/2014/main" xmlns="" id="{102D00B1-E475-41CE-8D41-C7A98C0B2E88}"/>
               </a:ext>
             </a:extLst>
           </p:cNvPr>
@@ -2520,7 +2527,7 @@
           <p:cNvPr id="3" name="Date Placeholder 2">
             <a:extLst>
               <a:ext uri="{FF2B5EF4-FFF2-40B4-BE49-F238E27FC236}">
-                <a16:creationId xmlns:a16="http://schemas.microsoft.com/office/drawing/2014/main" id="{84987BCA-4837-4450-88CE-CADCF32CFDC6}"/>
+                <a16:creationId xmlns:a16="http://schemas.microsoft.com/office/drawing/2014/main" xmlns="" id="{84987BCA-4837-4450-88CE-CADCF32CFDC6}"/>
               </a:ext>
             </a:extLst>
           </p:cNvPr>
@@ -2538,7 +2545,7 @@
           <a:p>
             <a:fld id="{1522C3F5-FD30-402A-BDF3-0D99E299B33B}" type="datetimeFigureOut">
               <a:rPr lang="en-US" smtClean="0"/>
-              <a:t>7/22/2017</a:t>
+              <a:t>8/4/2017</a:t>
             </a:fld>
             <a:endParaRPr lang="en-US"/>
           </a:p>
@@ -2549,7 +2556,7 @@
           <p:cNvPr id="4" name="Footer Placeholder 3">
             <a:extLst>
               <a:ext uri="{FF2B5EF4-FFF2-40B4-BE49-F238E27FC236}">
-                <a16:creationId xmlns:a16="http://schemas.microsoft.com/office/drawing/2014/main" id="{10BFBF54-E7F7-4485-B49B-FBD6E525856D}"/>
+                <a16:creationId xmlns:a16="http://schemas.microsoft.com/office/drawing/2014/main" xmlns="" id="{10BFBF54-E7F7-4485-B49B-FBD6E525856D}"/>
               </a:ext>
             </a:extLst>
           </p:cNvPr>
@@ -2574,7 +2581,7 @@
           <p:cNvPr id="5" name="Slide Number Placeholder 4">
             <a:extLst>
               <a:ext uri="{FF2B5EF4-FFF2-40B4-BE49-F238E27FC236}">
-                <a16:creationId xmlns:a16="http://schemas.microsoft.com/office/drawing/2014/main" id="{6766203F-7BC1-4DA3-A581-510515F8D100}"/>
+                <a16:creationId xmlns:a16="http://schemas.microsoft.com/office/drawing/2014/main" xmlns="" id="{6766203F-7BC1-4DA3-A581-510515F8D100}"/>
               </a:ext>
             </a:extLst>
           </p:cNvPr>
@@ -2633,7 +2640,7 @@
           <p:cNvPr id="2" name="Date Placeholder 1">
             <a:extLst>
               <a:ext uri="{FF2B5EF4-FFF2-40B4-BE49-F238E27FC236}">
-                <a16:creationId xmlns:a16="http://schemas.microsoft.com/office/drawing/2014/main" id="{94C3A6B6-64ED-4091-9A2F-B378109EA41C}"/>
+                <a16:creationId xmlns:a16="http://schemas.microsoft.com/office/drawing/2014/main" xmlns="" id="{94C3A6B6-64ED-4091-9A2F-B378109EA41C}"/>
               </a:ext>
             </a:extLst>
           </p:cNvPr>
@@ -2651,7 +2658,7 @@
           <a:p>
             <a:fld id="{1522C3F5-FD30-402A-BDF3-0D99E299B33B}" type="datetimeFigureOut">
               <a:rPr lang="en-US" smtClean="0"/>
-              <a:t>7/22/2017</a:t>
+              <a:t>8/4/2017</a:t>
             </a:fld>
             <a:endParaRPr lang="en-US"/>
           </a:p>
@@ -2662,7 +2669,7 @@
           <p:cNvPr id="3" name="Footer Placeholder 2">
             <a:extLst>
               <a:ext uri="{FF2B5EF4-FFF2-40B4-BE49-F238E27FC236}">
-                <a16:creationId xmlns:a16="http://schemas.microsoft.com/office/drawing/2014/main" id="{C381AFB8-6CC2-4805-AFAA-8AAAC3E9DDF5}"/>
+                <a16:creationId xmlns:a16="http://schemas.microsoft.com/office/drawing/2014/main" xmlns="" id="{C381AFB8-6CC2-4805-AFAA-8AAAC3E9DDF5}"/>
               </a:ext>
             </a:extLst>
           </p:cNvPr>
@@ -2687,7 +2694,7 @@
           <p:cNvPr id="4" name="Slide Number Placeholder 3">
             <a:extLst>
               <a:ext uri="{FF2B5EF4-FFF2-40B4-BE49-F238E27FC236}">
-                <a16:creationId xmlns:a16="http://schemas.microsoft.com/office/drawing/2014/main" id="{056E0FE2-58DF-4FC7-98BE-7388386AB294}"/>
+                <a16:creationId xmlns:a16="http://schemas.microsoft.com/office/drawing/2014/main" xmlns="" id="{056E0FE2-58DF-4FC7-98BE-7388386AB294}"/>
               </a:ext>
             </a:extLst>
           </p:cNvPr>
@@ -2746,7 +2753,7 @@
           <p:cNvPr id="2" name="Title 1">
             <a:extLst>
               <a:ext uri="{FF2B5EF4-FFF2-40B4-BE49-F238E27FC236}">
-                <a16:creationId xmlns:a16="http://schemas.microsoft.com/office/drawing/2014/main" id="{D6D2A7CE-38CE-44A1-8AE6-2CC6C11A1D36}"/>
+                <a16:creationId xmlns:a16="http://schemas.microsoft.com/office/drawing/2014/main" xmlns="" id="{D6D2A7CE-38CE-44A1-8AE6-2CC6C11A1D36}"/>
               </a:ext>
             </a:extLst>
           </p:cNvPr>
@@ -2783,7 +2790,7 @@
           <p:cNvPr id="3" name="Content Placeholder 2">
             <a:extLst>
               <a:ext uri="{FF2B5EF4-FFF2-40B4-BE49-F238E27FC236}">
-                <a16:creationId xmlns:a16="http://schemas.microsoft.com/office/drawing/2014/main" id="{2A34C7C9-6D3D-49C9-AC85-25A6C57FFD83}"/>
+                <a16:creationId xmlns:a16="http://schemas.microsoft.com/office/drawing/2014/main" xmlns="" id="{2A34C7C9-6D3D-49C9-AC85-25A6C57FFD83}"/>
               </a:ext>
             </a:extLst>
           </p:cNvPr>
@@ -2873,7 +2880,7 @@
           <p:cNvPr id="4" name="Text Placeholder 3">
             <a:extLst>
               <a:ext uri="{FF2B5EF4-FFF2-40B4-BE49-F238E27FC236}">
-                <a16:creationId xmlns:a16="http://schemas.microsoft.com/office/drawing/2014/main" id="{52F40544-4792-4EEF-A095-162E49B3BD99}"/>
+                <a16:creationId xmlns:a16="http://schemas.microsoft.com/office/drawing/2014/main" xmlns="" id="{52F40544-4792-4EEF-A095-162E49B3BD99}"/>
               </a:ext>
             </a:extLst>
           </p:cNvPr>
@@ -2944,7 +2951,7 @@
           <p:cNvPr id="5" name="Date Placeholder 4">
             <a:extLst>
               <a:ext uri="{FF2B5EF4-FFF2-40B4-BE49-F238E27FC236}">
-                <a16:creationId xmlns:a16="http://schemas.microsoft.com/office/drawing/2014/main" id="{5811D340-4585-4F60-9982-1733A10FE8E1}"/>
+                <a16:creationId xmlns:a16="http://schemas.microsoft.com/office/drawing/2014/main" xmlns="" id="{5811D340-4585-4F60-9982-1733A10FE8E1}"/>
               </a:ext>
             </a:extLst>
           </p:cNvPr>
@@ -2962,7 +2969,7 @@
           <a:p>
             <a:fld id="{1522C3F5-FD30-402A-BDF3-0D99E299B33B}" type="datetimeFigureOut">
               <a:rPr lang="en-US" smtClean="0"/>
-              <a:t>7/22/2017</a:t>
+              <a:t>8/4/2017</a:t>
             </a:fld>
             <a:endParaRPr lang="en-US"/>
           </a:p>
@@ -2973,7 +2980,7 @@
           <p:cNvPr id="6" name="Footer Placeholder 5">
             <a:extLst>
               <a:ext uri="{FF2B5EF4-FFF2-40B4-BE49-F238E27FC236}">
-                <a16:creationId xmlns:a16="http://schemas.microsoft.com/office/drawing/2014/main" id="{F0933ACF-2CE2-40B6-A851-44BC23D5EF84}"/>
+                <a16:creationId xmlns:a16="http://schemas.microsoft.com/office/drawing/2014/main" xmlns="" id="{F0933ACF-2CE2-40B6-A851-44BC23D5EF84}"/>
               </a:ext>
             </a:extLst>
           </p:cNvPr>
@@ -2998,7 +3005,7 @@
           <p:cNvPr id="7" name="Slide Number Placeholder 6">
             <a:extLst>
               <a:ext uri="{FF2B5EF4-FFF2-40B4-BE49-F238E27FC236}">
-                <a16:creationId xmlns:a16="http://schemas.microsoft.com/office/drawing/2014/main" id="{99DD3556-7085-48AE-B8ED-DF5D97EC4712}"/>
+                <a16:creationId xmlns:a16="http://schemas.microsoft.com/office/drawing/2014/main" xmlns="" id="{99DD3556-7085-48AE-B8ED-DF5D97EC4712}"/>
               </a:ext>
             </a:extLst>
           </p:cNvPr>
@@ -3057,7 +3064,7 @@
           <p:cNvPr id="2" name="Title 1">
             <a:extLst>
               <a:ext uri="{FF2B5EF4-FFF2-40B4-BE49-F238E27FC236}">
-                <a16:creationId xmlns:a16="http://schemas.microsoft.com/office/drawing/2014/main" id="{F7A54E27-D50C-4615-806C-B4B0BE0FC01C}"/>
+                <a16:creationId xmlns:a16="http://schemas.microsoft.com/office/drawing/2014/main" xmlns="" id="{F7A54E27-D50C-4615-806C-B4B0BE0FC01C}"/>
               </a:ext>
             </a:extLst>
           </p:cNvPr>
@@ -3094,7 +3101,7 @@
           <p:cNvPr id="3" name="Picture Placeholder 2">
             <a:extLst>
               <a:ext uri="{FF2B5EF4-FFF2-40B4-BE49-F238E27FC236}">
-                <a16:creationId xmlns:a16="http://schemas.microsoft.com/office/drawing/2014/main" id="{36183ED0-1A83-4BA4-9CCE-EB2A3AD37B1B}"/>
+                <a16:creationId xmlns:a16="http://schemas.microsoft.com/office/drawing/2014/main" xmlns="" id="{36183ED0-1A83-4BA4-9CCE-EB2A3AD37B1B}"/>
               </a:ext>
             </a:extLst>
           </p:cNvPr>
@@ -3161,7 +3168,7 @@
           <p:cNvPr id="4" name="Text Placeholder 3">
             <a:extLst>
               <a:ext uri="{FF2B5EF4-FFF2-40B4-BE49-F238E27FC236}">
-                <a16:creationId xmlns:a16="http://schemas.microsoft.com/office/drawing/2014/main" id="{69EB18E5-6EFD-4563-96EA-981D390C062B}"/>
+                <a16:creationId xmlns:a16="http://schemas.microsoft.com/office/drawing/2014/main" xmlns="" id="{69EB18E5-6EFD-4563-96EA-981D390C062B}"/>
               </a:ext>
             </a:extLst>
           </p:cNvPr>
@@ -3232,7 +3239,7 @@
           <p:cNvPr id="5" name="Date Placeholder 4">
             <a:extLst>
               <a:ext uri="{FF2B5EF4-FFF2-40B4-BE49-F238E27FC236}">
-                <a16:creationId xmlns:a16="http://schemas.microsoft.com/office/drawing/2014/main" id="{D2E82F1E-41FA-412C-B10E-C56F9ED69123}"/>
+                <a16:creationId xmlns:a16="http://schemas.microsoft.com/office/drawing/2014/main" xmlns="" id="{D2E82F1E-41FA-412C-B10E-C56F9ED69123}"/>
               </a:ext>
             </a:extLst>
           </p:cNvPr>
@@ -3250,7 +3257,7 @@
           <a:p>
             <a:fld id="{1522C3F5-FD30-402A-BDF3-0D99E299B33B}" type="datetimeFigureOut">
               <a:rPr lang="en-US" smtClean="0"/>
-              <a:t>7/22/2017</a:t>
+              <a:t>8/4/2017</a:t>
             </a:fld>
             <a:endParaRPr lang="en-US"/>
           </a:p>
@@ -3261,7 +3268,7 @@
           <p:cNvPr id="6" name="Footer Placeholder 5">
             <a:extLst>
               <a:ext uri="{FF2B5EF4-FFF2-40B4-BE49-F238E27FC236}">
-                <a16:creationId xmlns:a16="http://schemas.microsoft.com/office/drawing/2014/main" id="{F83AD574-1FC2-4477-839C-126EC28ACC6D}"/>
+                <a16:creationId xmlns:a16="http://schemas.microsoft.com/office/drawing/2014/main" xmlns="" id="{F83AD574-1FC2-4477-839C-126EC28ACC6D}"/>
               </a:ext>
             </a:extLst>
           </p:cNvPr>
@@ -3286,7 +3293,7 @@
           <p:cNvPr id="7" name="Slide Number Placeholder 6">
             <a:extLst>
               <a:ext uri="{FF2B5EF4-FFF2-40B4-BE49-F238E27FC236}">
-                <a16:creationId xmlns:a16="http://schemas.microsoft.com/office/drawing/2014/main" id="{92166E50-B3E2-4273-994B-CD37D03B34A3}"/>
+                <a16:creationId xmlns:a16="http://schemas.microsoft.com/office/drawing/2014/main" xmlns="" id="{92166E50-B3E2-4273-994B-CD37D03B34A3}"/>
               </a:ext>
             </a:extLst>
           </p:cNvPr>
@@ -3350,7 +3357,7 @@
           <p:cNvPr id="2" name="Title Placeholder 1">
             <a:extLst>
               <a:ext uri="{FF2B5EF4-FFF2-40B4-BE49-F238E27FC236}">
-                <a16:creationId xmlns:a16="http://schemas.microsoft.com/office/drawing/2014/main" id="{65430CE5-531F-4E34-86F7-C2705143F741}"/>
+                <a16:creationId xmlns:a16="http://schemas.microsoft.com/office/drawing/2014/main" xmlns="" id="{65430CE5-531F-4E34-86F7-C2705143F741}"/>
               </a:ext>
             </a:extLst>
           </p:cNvPr>
@@ -3388,7 +3395,7 @@
           <p:cNvPr id="3" name="Text Placeholder 2">
             <a:extLst>
               <a:ext uri="{FF2B5EF4-FFF2-40B4-BE49-F238E27FC236}">
-                <a16:creationId xmlns:a16="http://schemas.microsoft.com/office/drawing/2014/main" id="{78334CE6-D348-4583-B247-71EE6E2F47EE}"/>
+                <a16:creationId xmlns:a16="http://schemas.microsoft.com/office/drawing/2014/main" xmlns="" id="{78334CE6-D348-4583-B247-71EE6E2F47EE}"/>
               </a:ext>
             </a:extLst>
           </p:cNvPr>
@@ -3455,7 +3462,7 @@
           <p:cNvPr id="4" name="Date Placeholder 3">
             <a:extLst>
               <a:ext uri="{FF2B5EF4-FFF2-40B4-BE49-F238E27FC236}">
-                <a16:creationId xmlns:a16="http://schemas.microsoft.com/office/drawing/2014/main" id="{AC1DD669-9B9C-4D3E-B395-936459DF61F9}"/>
+                <a16:creationId xmlns:a16="http://schemas.microsoft.com/office/drawing/2014/main" xmlns="" id="{AC1DD669-9B9C-4D3E-B395-936459DF61F9}"/>
               </a:ext>
             </a:extLst>
           </p:cNvPr>
@@ -3491,7 +3498,7 @@
           <a:p>
             <a:fld id="{1522C3F5-FD30-402A-BDF3-0D99E299B33B}" type="datetimeFigureOut">
               <a:rPr lang="en-US" smtClean="0"/>
-              <a:t>7/22/2017</a:t>
+              <a:t>8/4/2017</a:t>
             </a:fld>
             <a:endParaRPr lang="en-US"/>
           </a:p>
@@ -3502,7 +3509,7 @@
           <p:cNvPr id="5" name="Footer Placeholder 4">
             <a:extLst>
               <a:ext uri="{FF2B5EF4-FFF2-40B4-BE49-F238E27FC236}">
-                <a16:creationId xmlns:a16="http://schemas.microsoft.com/office/drawing/2014/main" id="{730FE137-E059-4C2B-9B20-3CC0D0E2821F}"/>
+                <a16:creationId xmlns:a16="http://schemas.microsoft.com/office/drawing/2014/main" xmlns="" id="{730FE137-E059-4C2B-9B20-3CC0D0E2821F}"/>
               </a:ext>
             </a:extLst>
           </p:cNvPr>
@@ -3545,7 +3552,7 @@
           <p:cNvPr id="6" name="Slide Number Placeholder 5">
             <a:extLst>
               <a:ext uri="{FF2B5EF4-FFF2-40B4-BE49-F238E27FC236}">
-                <a16:creationId xmlns:a16="http://schemas.microsoft.com/office/drawing/2014/main" id="{F2B321CB-D6A4-4287-B6BC-013D38540555}"/>
+                <a16:creationId xmlns:a16="http://schemas.microsoft.com/office/drawing/2014/main" xmlns="" id="{F2B321CB-D6A4-4287-B6BC-013D38540555}"/>
               </a:ext>
             </a:extLst>
           </p:cNvPr>
@@ -3913,7 +3920,7 @@
           <p:cNvPr id="14" name="Group 13">
             <a:extLst>
               <a:ext uri="{FF2B5EF4-FFF2-40B4-BE49-F238E27FC236}">
-                <a16:creationId xmlns:a16="http://schemas.microsoft.com/office/drawing/2014/main" id="{32AB8248-0176-46EB-928B-C53110C16A6D}"/>
+                <a16:creationId xmlns:a16="http://schemas.microsoft.com/office/drawing/2014/main" xmlns="" id="{32AB8248-0176-46EB-928B-C53110C16A6D}"/>
               </a:ext>
             </a:extLst>
           </p:cNvPr>
@@ -3933,7 +3940,7 @@
             <p:cNvPr id="4" name="Rectangle 3">
               <a:extLst>
                 <a:ext uri="{FF2B5EF4-FFF2-40B4-BE49-F238E27FC236}">
-                  <a16:creationId xmlns:a16="http://schemas.microsoft.com/office/drawing/2014/main" id="{B8864DF7-A1B9-4B17-B3D9-A3E564F10A80}"/>
+                  <a16:creationId xmlns:a16="http://schemas.microsoft.com/office/drawing/2014/main" xmlns="" id="{B8864DF7-A1B9-4B17-B3D9-A3E564F10A80}"/>
                 </a:ext>
               </a:extLst>
             </p:cNvPr>
@@ -3983,7 +3990,7 @@
             <p:cNvPr id="7" name="Straight Connector 6">
               <a:extLst>
                 <a:ext uri="{FF2B5EF4-FFF2-40B4-BE49-F238E27FC236}">
-                  <a16:creationId xmlns:a16="http://schemas.microsoft.com/office/drawing/2014/main" id="{CE31012A-661F-4192-B26E-42D564A77F57}"/>
+                  <a16:creationId xmlns:a16="http://schemas.microsoft.com/office/drawing/2014/main" xmlns="" id="{CE31012A-661F-4192-B26E-42D564A77F57}"/>
                 </a:ext>
               </a:extLst>
             </p:cNvPr>
@@ -4024,7 +4031,7 @@
             <p:cNvPr id="8" name="Straight Connector 7">
               <a:extLst>
                 <a:ext uri="{FF2B5EF4-FFF2-40B4-BE49-F238E27FC236}">
-                  <a16:creationId xmlns:a16="http://schemas.microsoft.com/office/drawing/2014/main" id="{C2B3DD2A-20B7-4F42-89CC-E293443C8678}"/>
+                  <a16:creationId xmlns:a16="http://schemas.microsoft.com/office/drawing/2014/main" xmlns="" id="{C2B3DD2A-20B7-4F42-89CC-E293443C8678}"/>
                 </a:ext>
               </a:extLst>
             </p:cNvPr>
@@ -4066,7 +4073,7 @@
           <p:cNvPr id="13" name="Group 12">
             <a:extLst>
               <a:ext uri="{FF2B5EF4-FFF2-40B4-BE49-F238E27FC236}">
-                <a16:creationId xmlns:a16="http://schemas.microsoft.com/office/drawing/2014/main" id="{0193EBE0-D80F-4190-9CCC-17C4B3E6E091}"/>
+                <a16:creationId xmlns:a16="http://schemas.microsoft.com/office/drawing/2014/main" xmlns="" id="{0193EBE0-D80F-4190-9CCC-17C4B3E6E091}"/>
               </a:ext>
             </a:extLst>
           </p:cNvPr>
@@ -4086,7 +4093,7 @@
             <p:cNvPr id="5" name="Rectangle 4">
               <a:extLst>
                 <a:ext uri="{FF2B5EF4-FFF2-40B4-BE49-F238E27FC236}">
-                  <a16:creationId xmlns:a16="http://schemas.microsoft.com/office/drawing/2014/main" id="{6766CC03-14D1-40EB-8206-02E3D227EEB8}"/>
+                  <a16:creationId xmlns:a16="http://schemas.microsoft.com/office/drawing/2014/main" xmlns="" id="{6766CC03-14D1-40EB-8206-02E3D227EEB8}"/>
                 </a:ext>
               </a:extLst>
             </p:cNvPr>
@@ -4136,7 +4143,7 @@
             <p:cNvPr id="9" name="Straight Connector 8">
               <a:extLst>
                 <a:ext uri="{FF2B5EF4-FFF2-40B4-BE49-F238E27FC236}">
-                  <a16:creationId xmlns:a16="http://schemas.microsoft.com/office/drawing/2014/main" id="{906E00F6-C2D6-456E-8033-F81BE4CE4BA8}"/>
+                  <a16:creationId xmlns:a16="http://schemas.microsoft.com/office/drawing/2014/main" xmlns="" id="{906E00F6-C2D6-456E-8033-F81BE4CE4BA8}"/>
                 </a:ext>
               </a:extLst>
             </p:cNvPr>
@@ -4177,7 +4184,7 @@
             <p:cNvPr id="10" name="Straight Connector 9">
               <a:extLst>
                 <a:ext uri="{FF2B5EF4-FFF2-40B4-BE49-F238E27FC236}">
-                  <a16:creationId xmlns:a16="http://schemas.microsoft.com/office/drawing/2014/main" id="{E6BC7A66-3A06-476B-BA0D-46F23E3340DB}"/>
+                  <a16:creationId xmlns:a16="http://schemas.microsoft.com/office/drawing/2014/main" xmlns="" id="{E6BC7A66-3A06-476B-BA0D-46F23E3340DB}"/>
                 </a:ext>
               </a:extLst>
             </p:cNvPr>
@@ -4219,7 +4226,7 @@
           <p:cNvPr id="16" name="Rectangle 15">
             <a:extLst>
               <a:ext uri="{FF2B5EF4-FFF2-40B4-BE49-F238E27FC236}">
-                <a16:creationId xmlns:a16="http://schemas.microsoft.com/office/drawing/2014/main" id="{3DB762B7-AC70-4FF6-B1B9-E3111A615C14}"/>
+                <a16:creationId xmlns:a16="http://schemas.microsoft.com/office/drawing/2014/main" xmlns="" id="{3DB762B7-AC70-4FF6-B1B9-E3111A615C14}"/>
               </a:ext>
             </a:extLst>
           </p:cNvPr>
@@ -4269,7 +4276,7 @@
           <p:cNvPr id="18" name="Straight Connector 17">
             <a:extLst>
               <a:ext uri="{FF2B5EF4-FFF2-40B4-BE49-F238E27FC236}">
-                <a16:creationId xmlns:a16="http://schemas.microsoft.com/office/drawing/2014/main" id="{0E2CBE2C-9D09-426A-8B9B-0E32BDBA4B01}"/>
+                <a16:creationId xmlns:a16="http://schemas.microsoft.com/office/drawing/2014/main" xmlns="" id="{0E2CBE2C-9D09-426A-8B9B-0E32BDBA4B01}"/>
               </a:ext>
             </a:extLst>
           </p:cNvPr>
@@ -4312,7 +4319,7 @@
           <p:cNvPr id="53" name="Rectangle 52">
             <a:extLst>
               <a:ext uri="{FF2B5EF4-FFF2-40B4-BE49-F238E27FC236}">
-                <a16:creationId xmlns:a16="http://schemas.microsoft.com/office/drawing/2014/main" id="{CA4E69DD-9A77-4EA9-A6F7-6341F72A2953}"/>
+                <a16:creationId xmlns:a16="http://schemas.microsoft.com/office/drawing/2014/main" xmlns="" id="{CA4E69DD-9A77-4EA9-A6F7-6341F72A2953}"/>
               </a:ext>
             </a:extLst>
           </p:cNvPr>
@@ -4362,7 +4369,7 @@
           <p:cNvPr id="54" name="Rectangle 53">
             <a:extLst>
               <a:ext uri="{FF2B5EF4-FFF2-40B4-BE49-F238E27FC236}">
-                <a16:creationId xmlns:a16="http://schemas.microsoft.com/office/drawing/2014/main" id="{57287B0E-9236-45ED-B5A1-43F08FB8095F}"/>
+                <a16:creationId xmlns:a16="http://schemas.microsoft.com/office/drawing/2014/main" xmlns="" id="{57287B0E-9236-45ED-B5A1-43F08FB8095F}"/>
               </a:ext>
             </a:extLst>
           </p:cNvPr>
@@ -4412,7 +4419,7 @@
           <p:cNvPr id="55" name="Rectangle 54">
             <a:extLst>
               <a:ext uri="{FF2B5EF4-FFF2-40B4-BE49-F238E27FC236}">
-                <a16:creationId xmlns:a16="http://schemas.microsoft.com/office/drawing/2014/main" id="{A8F63F83-F25F-4627-B711-07CFCFA65383}"/>
+                <a16:creationId xmlns:a16="http://schemas.microsoft.com/office/drawing/2014/main" xmlns="" id="{A8F63F83-F25F-4627-B711-07CFCFA65383}"/>
               </a:ext>
             </a:extLst>
           </p:cNvPr>
@@ -4462,7 +4469,7 @@
           <p:cNvPr id="56" name="Rectangle 55">
             <a:extLst>
               <a:ext uri="{FF2B5EF4-FFF2-40B4-BE49-F238E27FC236}">
-                <a16:creationId xmlns:a16="http://schemas.microsoft.com/office/drawing/2014/main" id="{242FFC5D-4610-4825-B1A2-173F42A86099}"/>
+                <a16:creationId xmlns:a16="http://schemas.microsoft.com/office/drawing/2014/main" xmlns="" id="{242FFC5D-4610-4825-B1A2-173F42A86099}"/>
               </a:ext>
             </a:extLst>
           </p:cNvPr>
@@ -4512,7 +4519,7 @@
           <p:cNvPr id="57" name="Rectangle 56">
             <a:extLst>
               <a:ext uri="{FF2B5EF4-FFF2-40B4-BE49-F238E27FC236}">
-                <a16:creationId xmlns:a16="http://schemas.microsoft.com/office/drawing/2014/main" id="{049A08D3-9472-49FA-8CDD-3D2B909550CB}"/>
+                <a16:creationId xmlns:a16="http://schemas.microsoft.com/office/drawing/2014/main" xmlns="" id="{049A08D3-9472-49FA-8CDD-3D2B909550CB}"/>
               </a:ext>
             </a:extLst>
           </p:cNvPr>
@@ -4562,7 +4569,7 @@
           <p:cNvPr id="58" name="Rectangle 57">
             <a:extLst>
               <a:ext uri="{FF2B5EF4-FFF2-40B4-BE49-F238E27FC236}">
-                <a16:creationId xmlns:a16="http://schemas.microsoft.com/office/drawing/2014/main" id="{2CFC32C5-92A6-463F-A7FD-8B1D80261674}"/>
+                <a16:creationId xmlns:a16="http://schemas.microsoft.com/office/drawing/2014/main" xmlns="" id="{2CFC32C5-92A6-463F-A7FD-8B1D80261674}"/>
               </a:ext>
             </a:extLst>
           </p:cNvPr>
@@ -4612,7 +4619,7 @@
           <p:cNvPr id="17" name="Straight Connector 16">
             <a:extLst>
               <a:ext uri="{FF2B5EF4-FFF2-40B4-BE49-F238E27FC236}">
-                <a16:creationId xmlns:a16="http://schemas.microsoft.com/office/drawing/2014/main" id="{EBC7078E-8725-4656-A3C5-9DF92AD62F9B}"/>
+                <a16:creationId xmlns:a16="http://schemas.microsoft.com/office/drawing/2014/main" xmlns="" id="{EBC7078E-8725-4656-A3C5-9DF92AD62F9B}"/>
               </a:ext>
             </a:extLst>
           </p:cNvPr>
@@ -4655,7 +4662,7 @@
           <p:cNvPr id="59" name="Straight Connector 58">
             <a:extLst>
               <a:ext uri="{FF2B5EF4-FFF2-40B4-BE49-F238E27FC236}">
-                <a16:creationId xmlns:a16="http://schemas.microsoft.com/office/drawing/2014/main" id="{891FAE58-D658-4C83-BA17-9343371C1DA9}"/>
+                <a16:creationId xmlns:a16="http://schemas.microsoft.com/office/drawing/2014/main" xmlns="" id="{891FAE58-D658-4C83-BA17-9343371C1DA9}"/>
               </a:ext>
             </a:extLst>
           </p:cNvPr>
@@ -4696,7 +4703,7 @@
           <p:cNvPr id="63" name="Straight Connector 62">
             <a:extLst>
               <a:ext uri="{FF2B5EF4-FFF2-40B4-BE49-F238E27FC236}">
-                <a16:creationId xmlns:a16="http://schemas.microsoft.com/office/drawing/2014/main" id="{D572406F-A872-4AAD-8876-189BAC2B5228}"/>
+                <a16:creationId xmlns:a16="http://schemas.microsoft.com/office/drawing/2014/main" xmlns="" id="{D572406F-A872-4AAD-8876-189BAC2B5228}"/>
               </a:ext>
             </a:extLst>
           </p:cNvPr>
@@ -4737,7 +4744,7 @@
           <p:cNvPr id="66" name="Straight Connector 65">
             <a:extLst>
               <a:ext uri="{FF2B5EF4-FFF2-40B4-BE49-F238E27FC236}">
-                <a16:creationId xmlns:a16="http://schemas.microsoft.com/office/drawing/2014/main" id="{76E56733-63E8-42C3-8FBD-74923D88FC6B}"/>
+                <a16:creationId xmlns:a16="http://schemas.microsoft.com/office/drawing/2014/main" xmlns="" id="{76E56733-63E8-42C3-8FBD-74923D88FC6B}"/>
               </a:ext>
             </a:extLst>
           </p:cNvPr>
@@ -4778,7 +4785,7 @@
           <p:cNvPr id="60" name="Straight Connector 59">
             <a:extLst>
               <a:ext uri="{FF2B5EF4-FFF2-40B4-BE49-F238E27FC236}">
-                <a16:creationId xmlns:a16="http://schemas.microsoft.com/office/drawing/2014/main" id="{6294DA56-6FF0-4F5A-89AC-2FA227F13620}"/>
+                <a16:creationId xmlns:a16="http://schemas.microsoft.com/office/drawing/2014/main" xmlns="" id="{6294DA56-6FF0-4F5A-89AC-2FA227F13620}"/>
               </a:ext>
             </a:extLst>
           </p:cNvPr>
@@ -4819,7 +4826,7 @@
           <p:cNvPr id="64" name="Straight Connector 63">
             <a:extLst>
               <a:ext uri="{FF2B5EF4-FFF2-40B4-BE49-F238E27FC236}">
-                <a16:creationId xmlns:a16="http://schemas.microsoft.com/office/drawing/2014/main" id="{FCBB3104-B6F8-49D6-AB5A-E64AF988663B}"/>
+                <a16:creationId xmlns:a16="http://schemas.microsoft.com/office/drawing/2014/main" xmlns="" id="{FCBB3104-B6F8-49D6-AB5A-E64AF988663B}"/>
               </a:ext>
             </a:extLst>
           </p:cNvPr>
@@ -4860,7 +4867,7 @@
           <p:cNvPr id="67" name="Straight Connector 66">
             <a:extLst>
               <a:ext uri="{FF2B5EF4-FFF2-40B4-BE49-F238E27FC236}">
-                <a16:creationId xmlns:a16="http://schemas.microsoft.com/office/drawing/2014/main" id="{6B935634-EA94-48DB-A07A-10E8ECFEEC11}"/>
+                <a16:creationId xmlns:a16="http://schemas.microsoft.com/office/drawing/2014/main" xmlns="" id="{6B935634-EA94-48DB-A07A-10E8ECFEEC11}"/>
               </a:ext>
             </a:extLst>
           </p:cNvPr>
@@ -4901,7 +4908,7 @@
           <p:cNvPr id="84" name="Straight Connector 83">
             <a:extLst>
               <a:ext uri="{FF2B5EF4-FFF2-40B4-BE49-F238E27FC236}">
-                <a16:creationId xmlns:a16="http://schemas.microsoft.com/office/drawing/2014/main" id="{077E2BD4-E283-4CAF-8A22-91799B7F39FF}"/>
+                <a16:creationId xmlns:a16="http://schemas.microsoft.com/office/drawing/2014/main" xmlns="" id="{077E2BD4-E283-4CAF-8A22-91799B7F39FF}"/>
               </a:ext>
             </a:extLst>
           </p:cNvPr>
@@ -4944,7 +4951,7 @@
           <p:cNvPr id="88" name="Straight Connector 87">
             <a:extLst>
               <a:ext uri="{FF2B5EF4-FFF2-40B4-BE49-F238E27FC236}">
-                <a16:creationId xmlns:a16="http://schemas.microsoft.com/office/drawing/2014/main" id="{A85F9708-B079-4EED-9177-90A973430BD2}"/>
+                <a16:creationId xmlns:a16="http://schemas.microsoft.com/office/drawing/2014/main" xmlns="" id="{A85F9708-B079-4EED-9177-90A973430BD2}"/>
               </a:ext>
             </a:extLst>
           </p:cNvPr>
@@ -4987,7 +4994,7 @@
           <p:cNvPr id="90" name="Straight Connector 89">
             <a:extLst>
               <a:ext uri="{FF2B5EF4-FFF2-40B4-BE49-F238E27FC236}">
-                <a16:creationId xmlns:a16="http://schemas.microsoft.com/office/drawing/2014/main" id="{157CE5A1-A3FD-4DDC-9309-022747AA6893}"/>
+                <a16:creationId xmlns:a16="http://schemas.microsoft.com/office/drawing/2014/main" xmlns="" id="{157CE5A1-A3FD-4DDC-9309-022747AA6893}"/>
               </a:ext>
             </a:extLst>
           </p:cNvPr>
@@ -5030,7 +5037,7 @@
           <p:cNvPr id="93" name="Straight Connector 92">
             <a:extLst>
               <a:ext uri="{FF2B5EF4-FFF2-40B4-BE49-F238E27FC236}">
-                <a16:creationId xmlns:a16="http://schemas.microsoft.com/office/drawing/2014/main" id="{EFB2B6B3-D4B4-4956-99AA-3E5FF33D31EF}"/>
+                <a16:creationId xmlns:a16="http://schemas.microsoft.com/office/drawing/2014/main" xmlns="" id="{EFB2B6B3-D4B4-4956-99AA-3E5FF33D31EF}"/>
               </a:ext>
             </a:extLst>
           </p:cNvPr>
@@ -5073,7 +5080,7 @@
           <p:cNvPr id="98" name="Straight Connector 97">
             <a:extLst>
               <a:ext uri="{FF2B5EF4-FFF2-40B4-BE49-F238E27FC236}">
-                <a16:creationId xmlns:a16="http://schemas.microsoft.com/office/drawing/2014/main" id="{6DACF23B-B048-4A8B-86A4-E25D2F3044C7}"/>
+                <a16:creationId xmlns:a16="http://schemas.microsoft.com/office/drawing/2014/main" xmlns="" id="{6DACF23B-B048-4A8B-86A4-E25D2F3044C7}"/>
               </a:ext>
             </a:extLst>
           </p:cNvPr>
@@ -5114,7 +5121,7 @@
           <p:cNvPr id="99" name="Straight Connector 98">
             <a:extLst>
               <a:ext uri="{FF2B5EF4-FFF2-40B4-BE49-F238E27FC236}">
-                <a16:creationId xmlns:a16="http://schemas.microsoft.com/office/drawing/2014/main" id="{347DCB27-55EC-4289-B9BA-EDD2A74F54FB}"/>
+                <a16:creationId xmlns:a16="http://schemas.microsoft.com/office/drawing/2014/main" xmlns="" id="{347DCB27-55EC-4289-B9BA-EDD2A74F54FB}"/>
               </a:ext>
             </a:extLst>
           </p:cNvPr>
@@ -5155,7 +5162,7 @@
           <p:cNvPr id="100" name="Straight Connector 99">
             <a:extLst>
               <a:ext uri="{FF2B5EF4-FFF2-40B4-BE49-F238E27FC236}">
-                <a16:creationId xmlns:a16="http://schemas.microsoft.com/office/drawing/2014/main" id="{9792A0B8-095B-43F9-8780-617E7562BA52}"/>
+                <a16:creationId xmlns:a16="http://schemas.microsoft.com/office/drawing/2014/main" xmlns="" id="{9792A0B8-095B-43F9-8780-617E7562BA52}"/>
               </a:ext>
             </a:extLst>
           </p:cNvPr>
@@ -5196,7 +5203,7 @@
           <p:cNvPr id="106" name="Straight Connector 105">
             <a:extLst>
               <a:ext uri="{FF2B5EF4-FFF2-40B4-BE49-F238E27FC236}">
-                <a16:creationId xmlns:a16="http://schemas.microsoft.com/office/drawing/2014/main" id="{DA61923F-A716-48A7-907A-92F49093C143}"/>
+                <a16:creationId xmlns:a16="http://schemas.microsoft.com/office/drawing/2014/main" xmlns="" id="{DA61923F-A716-48A7-907A-92F49093C143}"/>
               </a:ext>
             </a:extLst>
           </p:cNvPr>
@@ -5237,7 +5244,7 @@
           <p:cNvPr id="107" name="Straight Connector 106">
             <a:extLst>
               <a:ext uri="{FF2B5EF4-FFF2-40B4-BE49-F238E27FC236}">
-                <a16:creationId xmlns:a16="http://schemas.microsoft.com/office/drawing/2014/main" id="{C0521422-DE44-4CC0-BBDC-AB0E5901ABAD}"/>
+                <a16:creationId xmlns:a16="http://schemas.microsoft.com/office/drawing/2014/main" xmlns="" id="{C0521422-DE44-4CC0-BBDC-AB0E5901ABAD}"/>
               </a:ext>
             </a:extLst>
           </p:cNvPr>
@@ -5278,7 +5285,7 @@
           <p:cNvPr id="108" name="Straight Connector 107">
             <a:extLst>
               <a:ext uri="{FF2B5EF4-FFF2-40B4-BE49-F238E27FC236}">
-                <a16:creationId xmlns:a16="http://schemas.microsoft.com/office/drawing/2014/main" id="{5FB9FCB9-60BF-4ECE-8331-75E675B840A0}"/>
+                <a16:creationId xmlns:a16="http://schemas.microsoft.com/office/drawing/2014/main" xmlns="" id="{5FB9FCB9-60BF-4ECE-8331-75E675B840A0}"/>
               </a:ext>
             </a:extLst>
           </p:cNvPr>
@@ -5319,7 +5326,7 @@
           <p:cNvPr id="102" name="Straight Connector 101">
             <a:extLst>
               <a:ext uri="{FF2B5EF4-FFF2-40B4-BE49-F238E27FC236}">
-                <a16:creationId xmlns:a16="http://schemas.microsoft.com/office/drawing/2014/main" id="{09632F15-DA46-4984-A7D9-48577E6F2EAC}"/>
+                <a16:creationId xmlns:a16="http://schemas.microsoft.com/office/drawing/2014/main" xmlns="" id="{09632F15-DA46-4984-A7D9-48577E6F2EAC}"/>
               </a:ext>
             </a:extLst>
           </p:cNvPr>
@@ -5362,7 +5369,7 @@
           <p:cNvPr id="103" name="Straight Connector 102">
             <a:extLst>
               <a:ext uri="{FF2B5EF4-FFF2-40B4-BE49-F238E27FC236}">
-                <a16:creationId xmlns:a16="http://schemas.microsoft.com/office/drawing/2014/main" id="{D9F247BE-1181-45A4-A6B1-4DE2E1486A67}"/>
+                <a16:creationId xmlns:a16="http://schemas.microsoft.com/office/drawing/2014/main" xmlns="" id="{D9F247BE-1181-45A4-A6B1-4DE2E1486A67}"/>
               </a:ext>
             </a:extLst>
           </p:cNvPr>
@@ -5405,7 +5412,7 @@
           <p:cNvPr id="104" name="Straight Connector 103">
             <a:extLst>
               <a:ext uri="{FF2B5EF4-FFF2-40B4-BE49-F238E27FC236}">
-                <a16:creationId xmlns:a16="http://schemas.microsoft.com/office/drawing/2014/main" id="{42F5A379-B103-4071-BADE-A4A557D43955}"/>
+                <a16:creationId xmlns:a16="http://schemas.microsoft.com/office/drawing/2014/main" xmlns="" id="{42F5A379-B103-4071-BADE-A4A557D43955}"/>
               </a:ext>
             </a:extLst>
           </p:cNvPr>
@@ -5448,7 +5455,7 @@
           <p:cNvPr id="105" name="Straight Connector 104">
             <a:extLst>
               <a:ext uri="{FF2B5EF4-FFF2-40B4-BE49-F238E27FC236}">
-                <a16:creationId xmlns:a16="http://schemas.microsoft.com/office/drawing/2014/main" id="{94C40C4C-B550-42D3-9E62-A696B03AC409}"/>
+                <a16:creationId xmlns:a16="http://schemas.microsoft.com/office/drawing/2014/main" xmlns="" id="{94C40C4C-B550-42D3-9E62-A696B03AC409}"/>
               </a:ext>
             </a:extLst>
           </p:cNvPr>
@@ -5491,7 +5498,7 @@
           <p:cNvPr id="111" name="Oval 110">
             <a:extLst>
               <a:ext uri="{FF2B5EF4-FFF2-40B4-BE49-F238E27FC236}">
-                <a16:creationId xmlns:a16="http://schemas.microsoft.com/office/drawing/2014/main" id="{5B704D29-65CF-4F6F-A64D-0563B943FACB}"/>
+                <a16:creationId xmlns:a16="http://schemas.microsoft.com/office/drawing/2014/main" xmlns="" id="{5B704D29-65CF-4F6F-A64D-0563B943FACB}"/>
               </a:ext>
             </a:extLst>
           </p:cNvPr>
@@ -5543,7 +5550,7 @@
           <p:cNvPr id="112" name="Oval 111">
             <a:extLst>
               <a:ext uri="{FF2B5EF4-FFF2-40B4-BE49-F238E27FC236}">
-                <a16:creationId xmlns:a16="http://schemas.microsoft.com/office/drawing/2014/main" id="{FE8CED4F-83E1-4ED7-A7A3-17D9287B3829}"/>
+                <a16:creationId xmlns:a16="http://schemas.microsoft.com/office/drawing/2014/main" xmlns="" id="{FE8CED4F-83E1-4ED7-A7A3-17D9287B3829}"/>
               </a:ext>
             </a:extLst>
           </p:cNvPr>
@@ -5595,7 +5602,7 @@
           <p:cNvPr id="115" name="Rectangle 114">
             <a:extLst>
               <a:ext uri="{FF2B5EF4-FFF2-40B4-BE49-F238E27FC236}">
-                <a16:creationId xmlns:a16="http://schemas.microsoft.com/office/drawing/2014/main" id="{9F68283C-7D1B-4B84-A9E6-5CC4E855E4B6}"/>
+                <a16:creationId xmlns:a16="http://schemas.microsoft.com/office/drawing/2014/main" xmlns="" id="{9F68283C-7D1B-4B84-A9E6-5CC4E855E4B6}"/>
               </a:ext>
             </a:extLst>
           </p:cNvPr>
@@ -5644,7 +5651,7 @@
           <p:cNvPr id="116" name="Rectangle 115">
             <a:extLst>
               <a:ext uri="{FF2B5EF4-FFF2-40B4-BE49-F238E27FC236}">
-                <a16:creationId xmlns:a16="http://schemas.microsoft.com/office/drawing/2014/main" id="{99282A71-10D1-4170-B0C4-6844F4573936}"/>
+                <a16:creationId xmlns:a16="http://schemas.microsoft.com/office/drawing/2014/main" xmlns="" id="{99282A71-10D1-4170-B0C4-6844F4573936}"/>
               </a:ext>
             </a:extLst>
           </p:cNvPr>
@@ -5693,7 +5700,7 @@
           <p:cNvPr id="119" name="Straight Connector 118">
             <a:extLst>
               <a:ext uri="{FF2B5EF4-FFF2-40B4-BE49-F238E27FC236}">
-                <a16:creationId xmlns:a16="http://schemas.microsoft.com/office/drawing/2014/main" id="{C7509B67-EA51-404C-8DE8-66B400ACCD76}"/>
+                <a16:creationId xmlns:a16="http://schemas.microsoft.com/office/drawing/2014/main" xmlns="" id="{C7509B67-EA51-404C-8DE8-66B400ACCD76}"/>
               </a:ext>
             </a:extLst>
           </p:cNvPr>
@@ -5736,7 +5743,7 @@
           <p:cNvPr id="121" name="Straight Connector 120">
             <a:extLst>
               <a:ext uri="{FF2B5EF4-FFF2-40B4-BE49-F238E27FC236}">
-                <a16:creationId xmlns:a16="http://schemas.microsoft.com/office/drawing/2014/main" id="{18C9E76C-38DF-41A8-9797-AA8A09C8B17C}"/>
+                <a16:creationId xmlns:a16="http://schemas.microsoft.com/office/drawing/2014/main" xmlns="" id="{18C9E76C-38DF-41A8-9797-AA8A09C8B17C}"/>
               </a:ext>
             </a:extLst>
           </p:cNvPr>
@@ -5779,7 +5786,7 @@
           <p:cNvPr id="131" name="Oval 130">
             <a:extLst>
               <a:ext uri="{FF2B5EF4-FFF2-40B4-BE49-F238E27FC236}">
-                <a16:creationId xmlns:a16="http://schemas.microsoft.com/office/drawing/2014/main" id="{8B49E7B7-A774-4409-B0CB-E07BD1CD13FF}"/>
+                <a16:creationId xmlns:a16="http://schemas.microsoft.com/office/drawing/2014/main" xmlns="" id="{8B49E7B7-A774-4409-B0CB-E07BD1CD13FF}"/>
               </a:ext>
             </a:extLst>
           </p:cNvPr>
@@ -5831,7 +5838,7 @@
           <p:cNvPr id="132" name="Oval 131">
             <a:extLst>
               <a:ext uri="{FF2B5EF4-FFF2-40B4-BE49-F238E27FC236}">
-                <a16:creationId xmlns:a16="http://schemas.microsoft.com/office/drawing/2014/main" id="{CFAFCFE2-57E9-4EFD-A8F6-2D73670CB779}"/>
+                <a16:creationId xmlns:a16="http://schemas.microsoft.com/office/drawing/2014/main" xmlns="" id="{CFAFCFE2-57E9-4EFD-A8F6-2D73670CB779}"/>
               </a:ext>
             </a:extLst>
           </p:cNvPr>
@@ -5883,7 +5890,7 @@
           <p:cNvPr id="134" name="Straight Connector 133">
             <a:extLst>
               <a:ext uri="{FF2B5EF4-FFF2-40B4-BE49-F238E27FC236}">
-                <a16:creationId xmlns:a16="http://schemas.microsoft.com/office/drawing/2014/main" id="{C409D989-2357-487F-93EB-F4C1A832AAC1}"/>
+                <a16:creationId xmlns:a16="http://schemas.microsoft.com/office/drawing/2014/main" xmlns="" id="{C409D989-2357-487F-93EB-F4C1A832AAC1}"/>
               </a:ext>
             </a:extLst>
           </p:cNvPr>
@@ -5922,7 +5929,7 @@
           <p:cNvPr id="135" name="Straight Connector 134">
             <a:extLst>
               <a:ext uri="{FF2B5EF4-FFF2-40B4-BE49-F238E27FC236}">
-                <a16:creationId xmlns:a16="http://schemas.microsoft.com/office/drawing/2014/main" id="{476A7F6F-5EF7-4A76-821E-3F2B2984CA72}"/>
+                <a16:creationId xmlns:a16="http://schemas.microsoft.com/office/drawing/2014/main" xmlns="" id="{476A7F6F-5EF7-4A76-821E-3F2B2984CA72}"/>
               </a:ext>
             </a:extLst>
           </p:cNvPr>
@@ -5961,7 +5968,7 @@
           <p:cNvPr id="149" name="Rectangle 148">
             <a:extLst>
               <a:ext uri="{FF2B5EF4-FFF2-40B4-BE49-F238E27FC236}">
-                <a16:creationId xmlns:a16="http://schemas.microsoft.com/office/drawing/2014/main" id="{111CF9EA-FFD5-48BA-B2D5-B150588013C2}"/>
+                <a16:creationId xmlns:a16="http://schemas.microsoft.com/office/drawing/2014/main" xmlns="" id="{111CF9EA-FFD5-48BA-B2D5-B150588013C2}"/>
               </a:ext>
             </a:extLst>
           </p:cNvPr>
@@ -6010,7 +6017,7 @@
           <p:cNvPr id="150" name="Straight Connector 149">
             <a:extLst>
               <a:ext uri="{FF2B5EF4-FFF2-40B4-BE49-F238E27FC236}">
-                <a16:creationId xmlns:a16="http://schemas.microsoft.com/office/drawing/2014/main" id="{B7D6C4CD-0B9D-4452-8F44-D289543DBB28}"/>
+                <a16:creationId xmlns:a16="http://schemas.microsoft.com/office/drawing/2014/main" xmlns="" id="{B7D6C4CD-0B9D-4452-8F44-D289543DBB28}"/>
               </a:ext>
             </a:extLst>
           </p:cNvPr>
@@ -6053,7 +6060,7 @@
           <p:cNvPr id="151" name="Straight Connector 150">
             <a:extLst>
               <a:ext uri="{FF2B5EF4-FFF2-40B4-BE49-F238E27FC236}">
-                <a16:creationId xmlns:a16="http://schemas.microsoft.com/office/drawing/2014/main" id="{931DA392-1ABD-4921-AAF2-EB6956E0E79F}"/>
+                <a16:creationId xmlns:a16="http://schemas.microsoft.com/office/drawing/2014/main" xmlns="" id="{931DA392-1ABD-4921-AAF2-EB6956E0E79F}"/>
               </a:ext>
             </a:extLst>
           </p:cNvPr>
@@ -6096,7 +6103,7 @@
           <p:cNvPr id="152" name="Oval 151">
             <a:extLst>
               <a:ext uri="{FF2B5EF4-FFF2-40B4-BE49-F238E27FC236}">
-                <a16:creationId xmlns:a16="http://schemas.microsoft.com/office/drawing/2014/main" id="{B891E40C-F374-4122-A659-46054D345EAF}"/>
+                <a16:creationId xmlns:a16="http://schemas.microsoft.com/office/drawing/2014/main" xmlns="" id="{B891E40C-F374-4122-A659-46054D345EAF}"/>
               </a:ext>
             </a:extLst>
           </p:cNvPr>
@@ -6148,7 +6155,7 @@
           <p:cNvPr id="153" name="Oval 152">
             <a:extLst>
               <a:ext uri="{FF2B5EF4-FFF2-40B4-BE49-F238E27FC236}">
-                <a16:creationId xmlns:a16="http://schemas.microsoft.com/office/drawing/2014/main" id="{08E39259-A539-4C7F-A5E5-60B9C60D601C}"/>
+                <a16:creationId xmlns:a16="http://schemas.microsoft.com/office/drawing/2014/main" xmlns="" id="{08E39259-A539-4C7F-A5E5-60B9C60D601C}"/>
               </a:ext>
             </a:extLst>
           </p:cNvPr>
@@ -6200,7 +6207,7 @@
           <p:cNvPr id="154" name="Straight Connector 153">
             <a:extLst>
               <a:ext uri="{FF2B5EF4-FFF2-40B4-BE49-F238E27FC236}">
-                <a16:creationId xmlns:a16="http://schemas.microsoft.com/office/drawing/2014/main" id="{1E21DF0D-F0D0-4DD7-9DAB-46B0E504556B}"/>
+                <a16:creationId xmlns:a16="http://schemas.microsoft.com/office/drawing/2014/main" xmlns="" id="{1E21DF0D-F0D0-4DD7-9DAB-46B0E504556B}"/>
               </a:ext>
             </a:extLst>
           </p:cNvPr>
@@ -6239,7 +6246,7 @@
           <p:cNvPr id="155" name="Straight Connector 154">
             <a:extLst>
               <a:ext uri="{FF2B5EF4-FFF2-40B4-BE49-F238E27FC236}">
-                <a16:creationId xmlns:a16="http://schemas.microsoft.com/office/drawing/2014/main" id="{37656C3C-77C2-41EA-A402-2441CF00C422}"/>
+                <a16:creationId xmlns:a16="http://schemas.microsoft.com/office/drawing/2014/main" xmlns="" id="{37656C3C-77C2-41EA-A402-2441CF00C422}"/>
               </a:ext>
             </a:extLst>
           </p:cNvPr>
@@ -6278,7 +6285,7 @@
           <p:cNvPr id="179" name="Rectangle 178">
             <a:extLst>
               <a:ext uri="{FF2B5EF4-FFF2-40B4-BE49-F238E27FC236}">
-                <a16:creationId xmlns:a16="http://schemas.microsoft.com/office/drawing/2014/main" id="{42540937-F07D-43B7-85B0-24A746AB2E87}"/>
+                <a16:creationId xmlns:a16="http://schemas.microsoft.com/office/drawing/2014/main" xmlns="" id="{42540937-F07D-43B7-85B0-24A746AB2E87}"/>
               </a:ext>
             </a:extLst>
           </p:cNvPr>
@@ -6327,7 +6334,7 @@
           <p:cNvPr id="182" name="Straight Connector 181">
             <a:extLst>
               <a:ext uri="{FF2B5EF4-FFF2-40B4-BE49-F238E27FC236}">
-                <a16:creationId xmlns:a16="http://schemas.microsoft.com/office/drawing/2014/main" id="{53316DE0-60DE-49A3-B166-CF734BB167DB}"/>
+                <a16:creationId xmlns:a16="http://schemas.microsoft.com/office/drawing/2014/main" xmlns="" id="{53316DE0-60DE-49A3-B166-CF734BB167DB}"/>
               </a:ext>
             </a:extLst>
           </p:cNvPr>
@@ -6370,7 +6377,7 @@
           <p:cNvPr id="185" name="Straight Connector 184">
             <a:extLst>
               <a:ext uri="{FF2B5EF4-FFF2-40B4-BE49-F238E27FC236}">
-                <a16:creationId xmlns:a16="http://schemas.microsoft.com/office/drawing/2014/main" id="{A4A12242-3687-4F1C-9D54-54334E6AA80D}"/>
+                <a16:creationId xmlns:a16="http://schemas.microsoft.com/office/drawing/2014/main" xmlns="" id="{A4A12242-3687-4F1C-9D54-54334E6AA80D}"/>
               </a:ext>
             </a:extLst>
           </p:cNvPr>
@@ -6413,7 +6420,7 @@
           <p:cNvPr id="189" name="Rectangle 188">
             <a:extLst>
               <a:ext uri="{FF2B5EF4-FFF2-40B4-BE49-F238E27FC236}">
-                <a16:creationId xmlns:a16="http://schemas.microsoft.com/office/drawing/2014/main" id="{EA4C455F-E985-4004-82F6-4836C9DA71D1}"/>
+                <a16:creationId xmlns:a16="http://schemas.microsoft.com/office/drawing/2014/main" xmlns="" id="{EA4C455F-E985-4004-82F6-4836C9DA71D1}"/>
               </a:ext>
             </a:extLst>
           </p:cNvPr>
@@ -6462,7 +6469,7 @@
           <p:cNvPr id="190" name="Straight Connector 189">
             <a:extLst>
               <a:ext uri="{FF2B5EF4-FFF2-40B4-BE49-F238E27FC236}">
-                <a16:creationId xmlns:a16="http://schemas.microsoft.com/office/drawing/2014/main" id="{3DEA41FB-B63B-48F2-8D22-C896AC113958}"/>
+                <a16:creationId xmlns:a16="http://schemas.microsoft.com/office/drawing/2014/main" xmlns="" id="{3DEA41FB-B63B-48F2-8D22-C896AC113958}"/>
               </a:ext>
             </a:extLst>
           </p:cNvPr>
@@ -6505,7 +6512,7 @@
           <p:cNvPr id="191" name="Straight Connector 190">
             <a:extLst>
               <a:ext uri="{FF2B5EF4-FFF2-40B4-BE49-F238E27FC236}">
-                <a16:creationId xmlns:a16="http://schemas.microsoft.com/office/drawing/2014/main" id="{08D4E321-CC7F-4763-A4BF-1CC1D68B1B03}"/>
+                <a16:creationId xmlns:a16="http://schemas.microsoft.com/office/drawing/2014/main" xmlns="" id="{08D4E321-CC7F-4763-A4BF-1CC1D68B1B03}"/>
               </a:ext>
             </a:extLst>
           </p:cNvPr>
@@ -6548,7 +6555,7 @@
           <p:cNvPr id="201" name="Connector: Elbow 200">
             <a:extLst>
               <a:ext uri="{FF2B5EF4-FFF2-40B4-BE49-F238E27FC236}">
-                <a16:creationId xmlns:a16="http://schemas.microsoft.com/office/drawing/2014/main" id="{FD7B3A60-9494-420B-8BD2-0EA87C1DF3FD}"/>
+                <a16:creationId xmlns:a16="http://schemas.microsoft.com/office/drawing/2014/main" xmlns="" id="{FD7B3A60-9494-420B-8BD2-0EA87C1DF3FD}"/>
               </a:ext>
             </a:extLst>
           </p:cNvPr>
@@ -6590,7 +6597,7 @@
           <p:cNvPr id="203" name="Connector: Elbow 202">
             <a:extLst>
               <a:ext uri="{FF2B5EF4-FFF2-40B4-BE49-F238E27FC236}">
-                <a16:creationId xmlns:a16="http://schemas.microsoft.com/office/drawing/2014/main" id="{E7F16296-BB56-486B-B9A2-6370B5EAC9DF}"/>
+                <a16:creationId xmlns:a16="http://schemas.microsoft.com/office/drawing/2014/main" xmlns="" id="{E7F16296-BB56-486B-B9A2-6370B5EAC9DF}"/>
               </a:ext>
             </a:extLst>
           </p:cNvPr>
@@ -6634,7 +6641,7 @@
           <p:cNvPr id="205" name="Straight Arrow Connector 204">
             <a:extLst>
               <a:ext uri="{FF2B5EF4-FFF2-40B4-BE49-F238E27FC236}">
-                <a16:creationId xmlns:a16="http://schemas.microsoft.com/office/drawing/2014/main" id="{A2B24D75-9EF5-4720-9D02-AF9CC87E4B4A}"/>
+                <a16:creationId xmlns:a16="http://schemas.microsoft.com/office/drawing/2014/main" xmlns="" id="{A2B24D75-9EF5-4720-9D02-AF9CC87E4B4A}"/>
               </a:ext>
             </a:extLst>
           </p:cNvPr>
@@ -6676,7 +6683,7 @@
           <p:cNvPr id="207" name="Straight Arrow Connector 206">
             <a:extLst>
               <a:ext uri="{FF2B5EF4-FFF2-40B4-BE49-F238E27FC236}">
-                <a16:creationId xmlns:a16="http://schemas.microsoft.com/office/drawing/2014/main" id="{CF0F1D86-8133-4EA4-96DC-293B47E8B9AE}"/>
+                <a16:creationId xmlns:a16="http://schemas.microsoft.com/office/drawing/2014/main" xmlns="" id="{CF0F1D86-8133-4EA4-96DC-293B47E8B9AE}"/>
               </a:ext>
             </a:extLst>
           </p:cNvPr>
@@ -6718,7 +6725,7 @@
           <p:cNvPr id="209" name="Straight Arrow Connector 208">
             <a:extLst>
               <a:ext uri="{FF2B5EF4-FFF2-40B4-BE49-F238E27FC236}">
-                <a16:creationId xmlns:a16="http://schemas.microsoft.com/office/drawing/2014/main" id="{C4833948-27AB-4D19-86A7-A5A869994B5B}"/>
+                <a16:creationId xmlns:a16="http://schemas.microsoft.com/office/drawing/2014/main" xmlns="" id="{C4833948-27AB-4D19-86A7-A5A869994B5B}"/>
               </a:ext>
             </a:extLst>
           </p:cNvPr>
@@ -6760,7 +6767,7 @@
           <p:cNvPr id="212" name="Straight Connector 211">
             <a:extLst>
               <a:ext uri="{FF2B5EF4-FFF2-40B4-BE49-F238E27FC236}">
-                <a16:creationId xmlns:a16="http://schemas.microsoft.com/office/drawing/2014/main" id="{B59AA29F-796E-4717-9B6C-E469BBBDD541}"/>
+                <a16:creationId xmlns:a16="http://schemas.microsoft.com/office/drawing/2014/main" xmlns="" id="{B59AA29F-796E-4717-9B6C-E469BBBDD541}"/>
               </a:ext>
             </a:extLst>
           </p:cNvPr>
@@ -6799,7 +6806,7 @@
           <p:cNvPr id="226" name="Straight Connector 225">
             <a:extLst>
               <a:ext uri="{FF2B5EF4-FFF2-40B4-BE49-F238E27FC236}">
-                <a16:creationId xmlns:a16="http://schemas.microsoft.com/office/drawing/2014/main" id="{A8AA42FC-A023-4B5B-8E91-E50E0E0F620E}"/>
+                <a16:creationId xmlns:a16="http://schemas.microsoft.com/office/drawing/2014/main" xmlns="" id="{A8AA42FC-A023-4B5B-8E91-E50E0E0F620E}"/>
               </a:ext>
             </a:extLst>
           </p:cNvPr>
@@ -6838,7 +6845,7 @@
           <p:cNvPr id="229" name="Straight Arrow Connector 228">
             <a:extLst>
               <a:ext uri="{FF2B5EF4-FFF2-40B4-BE49-F238E27FC236}">
-                <a16:creationId xmlns:a16="http://schemas.microsoft.com/office/drawing/2014/main" id="{71B7A8FB-843D-4052-A349-6393BAB47875}"/>
+                <a16:creationId xmlns:a16="http://schemas.microsoft.com/office/drawing/2014/main" xmlns="" id="{71B7A8FB-843D-4052-A349-6393BAB47875}"/>
               </a:ext>
             </a:extLst>
           </p:cNvPr>
@@ -6879,7 +6886,7 @@
           <p:cNvPr id="230" name="Straight Arrow Connector 229">
             <a:extLst>
               <a:ext uri="{FF2B5EF4-FFF2-40B4-BE49-F238E27FC236}">
-                <a16:creationId xmlns:a16="http://schemas.microsoft.com/office/drawing/2014/main" id="{2AAA4B8B-972F-40AC-A063-97647B8DF817}"/>
+                <a16:creationId xmlns:a16="http://schemas.microsoft.com/office/drawing/2014/main" xmlns="" id="{2AAA4B8B-972F-40AC-A063-97647B8DF817}"/>
               </a:ext>
             </a:extLst>
           </p:cNvPr>
@@ -6920,7 +6927,7 @@
           <p:cNvPr id="231" name="Straight Arrow Connector 230">
             <a:extLst>
               <a:ext uri="{FF2B5EF4-FFF2-40B4-BE49-F238E27FC236}">
-                <a16:creationId xmlns:a16="http://schemas.microsoft.com/office/drawing/2014/main" id="{B1E01892-C30E-4A66-BB7E-27C21865D71B}"/>
+                <a16:creationId xmlns:a16="http://schemas.microsoft.com/office/drawing/2014/main" xmlns="" id="{B1E01892-C30E-4A66-BB7E-27C21865D71B}"/>
               </a:ext>
             </a:extLst>
           </p:cNvPr>
@@ -6961,7 +6968,7 @@
           <p:cNvPr id="232" name="Straight Connector 231">
             <a:extLst>
               <a:ext uri="{FF2B5EF4-FFF2-40B4-BE49-F238E27FC236}">
-                <a16:creationId xmlns:a16="http://schemas.microsoft.com/office/drawing/2014/main" id="{2A4430AB-128C-49FF-98DD-69E2D19027A4}"/>
+                <a16:creationId xmlns:a16="http://schemas.microsoft.com/office/drawing/2014/main" xmlns="" id="{2A4430AB-128C-49FF-98DD-69E2D19027A4}"/>
               </a:ext>
             </a:extLst>
           </p:cNvPr>
@@ -7000,7 +7007,7 @@
           <p:cNvPr id="233" name="Straight Connector 232">
             <a:extLst>
               <a:ext uri="{FF2B5EF4-FFF2-40B4-BE49-F238E27FC236}">
-                <a16:creationId xmlns:a16="http://schemas.microsoft.com/office/drawing/2014/main" id="{74EA7550-2EC9-486E-9224-6AE026EF7285}"/>
+                <a16:creationId xmlns:a16="http://schemas.microsoft.com/office/drawing/2014/main" xmlns="" id="{74EA7550-2EC9-486E-9224-6AE026EF7285}"/>
               </a:ext>
             </a:extLst>
           </p:cNvPr>
@@ -7039,7 +7046,7 @@
           <p:cNvPr id="237" name="Straight Connector 236">
             <a:extLst>
               <a:ext uri="{FF2B5EF4-FFF2-40B4-BE49-F238E27FC236}">
-                <a16:creationId xmlns:a16="http://schemas.microsoft.com/office/drawing/2014/main" id="{A4DF407A-E540-4A5A-A5BB-A006F3CF8A1B}"/>
+                <a16:creationId xmlns:a16="http://schemas.microsoft.com/office/drawing/2014/main" xmlns="" id="{A4DF407A-E540-4A5A-A5BB-A006F3CF8A1B}"/>
               </a:ext>
             </a:extLst>
           </p:cNvPr>
@@ -7078,7 +7085,7 @@
           <p:cNvPr id="244" name="Connector: Elbow 243">
             <a:extLst>
               <a:ext uri="{FF2B5EF4-FFF2-40B4-BE49-F238E27FC236}">
-                <a16:creationId xmlns:a16="http://schemas.microsoft.com/office/drawing/2014/main" id="{A1F6C52D-368F-4B6B-B28C-E0580806C655}"/>
+                <a16:creationId xmlns:a16="http://schemas.microsoft.com/office/drawing/2014/main" xmlns="" id="{A1F6C52D-368F-4B6B-B28C-E0580806C655}"/>
               </a:ext>
             </a:extLst>
           </p:cNvPr>
@@ -7125,7 +7132,7 @@
           <p:cNvPr id="247" name="Oval 246">
             <a:extLst>
               <a:ext uri="{FF2B5EF4-FFF2-40B4-BE49-F238E27FC236}">
-                <a16:creationId xmlns:a16="http://schemas.microsoft.com/office/drawing/2014/main" id="{751AEA12-81F0-4E28-A04C-46129C788C19}"/>
+                <a16:creationId xmlns:a16="http://schemas.microsoft.com/office/drawing/2014/main" xmlns="" id="{751AEA12-81F0-4E28-A04C-46129C788C19}"/>
               </a:ext>
             </a:extLst>
           </p:cNvPr>
@@ -7177,7 +7184,7 @@
           <p:cNvPr id="248" name="Oval 247">
             <a:extLst>
               <a:ext uri="{FF2B5EF4-FFF2-40B4-BE49-F238E27FC236}">
-                <a16:creationId xmlns:a16="http://schemas.microsoft.com/office/drawing/2014/main" id="{355CA2DB-CF84-46A3-A2C9-9F258C1EB8A9}"/>
+                <a16:creationId xmlns:a16="http://schemas.microsoft.com/office/drawing/2014/main" xmlns="" id="{355CA2DB-CF84-46A3-A2C9-9F258C1EB8A9}"/>
               </a:ext>
             </a:extLst>
           </p:cNvPr>
@@ -7229,7 +7236,7 @@
           <p:cNvPr id="249" name="Oval 248">
             <a:extLst>
               <a:ext uri="{FF2B5EF4-FFF2-40B4-BE49-F238E27FC236}">
-                <a16:creationId xmlns:a16="http://schemas.microsoft.com/office/drawing/2014/main" id="{27458010-F9B9-40FA-B75A-EABF44C8272D}"/>
+                <a16:creationId xmlns:a16="http://schemas.microsoft.com/office/drawing/2014/main" xmlns="" id="{27458010-F9B9-40FA-B75A-EABF44C8272D}"/>
               </a:ext>
             </a:extLst>
           </p:cNvPr>
@@ -7281,7 +7288,7 @@
           <p:cNvPr id="250" name="Oval 249">
             <a:extLst>
               <a:ext uri="{FF2B5EF4-FFF2-40B4-BE49-F238E27FC236}">
-                <a16:creationId xmlns:a16="http://schemas.microsoft.com/office/drawing/2014/main" id="{07A90E16-D005-4E11-AF55-E09143ECFD11}"/>
+                <a16:creationId xmlns:a16="http://schemas.microsoft.com/office/drawing/2014/main" xmlns="" id="{07A90E16-D005-4E11-AF55-E09143ECFD11}"/>
               </a:ext>
             </a:extLst>
           </p:cNvPr>
@@ -7333,7 +7340,7 @@
           <p:cNvPr id="251" name="Straight Connector 250">
             <a:extLst>
               <a:ext uri="{FF2B5EF4-FFF2-40B4-BE49-F238E27FC236}">
-                <a16:creationId xmlns:a16="http://schemas.microsoft.com/office/drawing/2014/main" id="{60AE0C0D-2511-40B3-8CF3-1346A8B72DB2}"/>
+                <a16:creationId xmlns:a16="http://schemas.microsoft.com/office/drawing/2014/main" xmlns="" id="{60AE0C0D-2511-40B3-8CF3-1346A8B72DB2}"/>
               </a:ext>
             </a:extLst>
           </p:cNvPr>
@@ -7376,7 +7383,7 @@
           <p:cNvPr id="252" name="Straight Connector 251">
             <a:extLst>
               <a:ext uri="{FF2B5EF4-FFF2-40B4-BE49-F238E27FC236}">
-                <a16:creationId xmlns:a16="http://schemas.microsoft.com/office/drawing/2014/main" id="{5D5A5603-99C0-482B-9ECA-F2A7A28A0AB4}"/>
+                <a16:creationId xmlns:a16="http://schemas.microsoft.com/office/drawing/2014/main" xmlns="" id="{5D5A5603-99C0-482B-9ECA-F2A7A28A0AB4}"/>
               </a:ext>
             </a:extLst>
           </p:cNvPr>
@@ -7419,7 +7426,7 @@
           <p:cNvPr id="253" name="Oval 252">
             <a:extLst>
               <a:ext uri="{FF2B5EF4-FFF2-40B4-BE49-F238E27FC236}">
-                <a16:creationId xmlns:a16="http://schemas.microsoft.com/office/drawing/2014/main" id="{556F3104-EC3B-4657-90EE-F35146647E5A}"/>
+                <a16:creationId xmlns:a16="http://schemas.microsoft.com/office/drawing/2014/main" xmlns="" id="{556F3104-EC3B-4657-90EE-F35146647E5A}"/>
               </a:ext>
             </a:extLst>
           </p:cNvPr>
@@ -7471,7 +7478,7 @@
           <p:cNvPr id="254" name="Oval 253">
             <a:extLst>
               <a:ext uri="{FF2B5EF4-FFF2-40B4-BE49-F238E27FC236}">
-                <a16:creationId xmlns:a16="http://schemas.microsoft.com/office/drawing/2014/main" id="{BE5949C4-939B-42C1-825B-E8F26B772DDF}"/>
+                <a16:creationId xmlns:a16="http://schemas.microsoft.com/office/drawing/2014/main" xmlns="" id="{BE5949C4-939B-42C1-825B-E8F26B772DDF}"/>
               </a:ext>
             </a:extLst>
           </p:cNvPr>
@@ -7523,7 +7530,7 @@
           <p:cNvPr id="267" name="Straight Connector 266">
             <a:extLst>
               <a:ext uri="{FF2B5EF4-FFF2-40B4-BE49-F238E27FC236}">
-                <a16:creationId xmlns:a16="http://schemas.microsoft.com/office/drawing/2014/main" id="{9E5E5712-A685-447E-A108-390DC2CA2FF8}"/>
+                <a16:creationId xmlns:a16="http://schemas.microsoft.com/office/drawing/2014/main" xmlns="" id="{9E5E5712-A685-447E-A108-390DC2CA2FF8}"/>
               </a:ext>
             </a:extLst>
           </p:cNvPr>
@@ -7566,7 +7573,7 @@
           <p:cNvPr id="273" name="Straight Connector 272">
             <a:extLst>
               <a:ext uri="{FF2B5EF4-FFF2-40B4-BE49-F238E27FC236}">
-                <a16:creationId xmlns:a16="http://schemas.microsoft.com/office/drawing/2014/main" id="{3C742BAA-0E67-4A0E-952E-9A93421B357F}"/>
+                <a16:creationId xmlns:a16="http://schemas.microsoft.com/office/drawing/2014/main" xmlns="" id="{3C742BAA-0E67-4A0E-952E-9A93421B357F}"/>
               </a:ext>
             </a:extLst>
           </p:cNvPr>
@@ -7609,7 +7616,7 @@
           <p:cNvPr id="278" name="Rectangle 277">
             <a:extLst>
               <a:ext uri="{FF2B5EF4-FFF2-40B4-BE49-F238E27FC236}">
-                <a16:creationId xmlns:a16="http://schemas.microsoft.com/office/drawing/2014/main" id="{E6C1BD71-D13A-42B3-AFFB-E9DAE6C804A3}"/>
+                <a16:creationId xmlns:a16="http://schemas.microsoft.com/office/drawing/2014/main" xmlns="" id="{E6C1BD71-D13A-42B3-AFFB-E9DAE6C804A3}"/>
               </a:ext>
             </a:extLst>
           </p:cNvPr>
@@ -7658,7 +7665,7 @@
           <p:cNvPr id="280" name="Straight Connector 279">
             <a:extLst>
               <a:ext uri="{FF2B5EF4-FFF2-40B4-BE49-F238E27FC236}">
-                <a16:creationId xmlns:a16="http://schemas.microsoft.com/office/drawing/2014/main" id="{09936BFA-90E5-4E90-AFE4-FEDB02306BD7}"/>
+                <a16:creationId xmlns:a16="http://schemas.microsoft.com/office/drawing/2014/main" xmlns="" id="{09936BFA-90E5-4E90-AFE4-FEDB02306BD7}"/>
               </a:ext>
             </a:extLst>
           </p:cNvPr>
@@ -7701,7 +7708,7 @@
           <p:cNvPr id="284" name="Straight Connector 283">
             <a:extLst>
               <a:ext uri="{FF2B5EF4-FFF2-40B4-BE49-F238E27FC236}">
-                <a16:creationId xmlns:a16="http://schemas.microsoft.com/office/drawing/2014/main" id="{B42BD37C-768B-4C01-83D6-04116B9586A0}"/>
+                <a16:creationId xmlns:a16="http://schemas.microsoft.com/office/drawing/2014/main" xmlns="" id="{B42BD37C-768B-4C01-83D6-04116B9586A0}"/>
               </a:ext>
             </a:extLst>
           </p:cNvPr>
@@ -7744,7 +7751,7 @@
           <p:cNvPr id="288" name="Connector: Elbow 287">
             <a:extLst>
               <a:ext uri="{FF2B5EF4-FFF2-40B4-BE49-F238E27FC236}">
-                <a16:creationId xmlns:a16="http://schemas.microsoft.com/office/drawing/2014/main" id="{6A42492F-7907-42EF-A999-8E94426A8F0A}"/>
+                <a16:creationId xmlns:a16="http://schemas.microsoft.com/office/drawing/2014/main" xmlns="" id="{6A42492F-7907-42EF-A999-8E94426A8F0A}"/>
               </a:ext>
             </a:extLst>
           </p:cNvPr>
@@ -7786,7 +7793,7 @@
           <p:cNvPr id="289" name="Rectangle 288">
             <a:extLst>
               <a:ext uri="{FF2B5EF4-FFF2-40B4-BE49-F238E27FC236}">
-                <a16:creationId xmlns:a16="http://schemas.microsoft.com/office/drawing/2014/main" id="{39A464D8-9BD2-40F4-8269-4194B396DCA8}"/>
+                <a16:creationId xmlns:a16="http://schemas.microsoft.com/office/drawing/2014/main" xmlns="" id="{39A464D8-9BD2-40F4-8269-4194B396DCA8}"/>
               </a:ext>
             </a:extLst>
           </p:cNvPr>
@@ -7835,7 +7842,7 @@
           <p:cNvPr id="297" name="TextBox 296">
             <a:extLst>
               <a:ext uri="{FF2B5EF4-FFF2-40B4-BE49-F238E27FC236}">
-                <a16:creationId xmlns:a16="http://schemas.microsoft.com/office/drawing/2014/main" id="{90A549A5-EF7E-4BA7-B913-EAFE3A488048}"/>
+                <a16:creationId xmlns:a16="http://schemas.microsoft.com/office/drawing/2014/main" xmlns="" id="{90A549A5-EF7E-4BA7-B913-EAFE3A488048}"/>
               </a:ext>
             </a:extLst>
           </p:cNvPr>
@@ -7876,7 +7883,7 @@
           <p:cNvPr id="307" name="Group 306">
             <a:extLst>
               <a:ext uri="{FF2B5EF4-FFF2-40B4-BE49-F238E27FC236}">
-                <a16:creationId xmlns:a16="http://schemas.microsoft.com/office/drawing/2014/main" id="{97A0FACF-40C2-45BD-AE5E-1CFFF4EB8AC2}"/>
+                <a16:creationId xmlns:a16="http://schemas.microsoft.com/office/drawing/2014/main" xmlns="" id="{97A0FACF-40C2-45BD-AE5E-1CFFF4EB8AC2}"/>
               </a:ext>
             </a:extLst>
           </p:cNvPr>
@@ -7896,7 +7903,7 @@
             <p:cNvPr id="298" name="TextBox 297">
               <a:extLst>
                 <a:ext uri="{FF2B5EF4-FFF2-40B4-BE49-F238E27FC236}">
-                  <a16:creationId xmlns:a16="http://schemas.microsoft.com/office/drawing/2014/main" id="{8D86C882-7256-460A-A907-74A7952AAF34}"/>
+                  <a16:creationId xmlns:a16="http://schemas.microsoft.com/office/drawing/2014/main" xmlns="" id="{8D86C882-7256-460A-A907-74A7952AAF34}"/>
                 </a:ext>
               </a:extLst>
             </p:cNvPr>
@@ -7955,7 +7962,7 @@
             <p:cNvPr id="299" name="Straight Connector 298">
               <a:extLst>
                 <a:ext uri="{FF2B5EF4-FFF2-40B4-BE49-F238E27FC236}">
-                  <a16:creationId xmlns:a16="http://schemas.microsoft.com/office/drawing/2014/main" id="{0DF7762D-93E4-46E8-92EB-007CA70CA1F7}"/>
+                  <a16:creationId xmlns:a16="http://schemas.microsoft.com/office/drawing/2014/main" xmlns="" id="{0DF7762D-93E4-46E8-92EB-007CA70CA1F7}"/>
                 </a:ext>
               </a:extLst>
             </p:cNvPr>
@@ -7998,7 +8005,7 @@
             <p:cNvPr id="300" name="Straight Connector 299">
               <a:extLst>
                 <a:ext uri="{FF2B5EF4-FFF2-40B4-BE49-F238E27FC236}">
-                  <a16:creationId xmlns:a16="http://schemas.microsoft.com/office/drawing/2014/main" id="{7C062950-86DD-437A-9EC6-BDE6A725E84C}"/>
+                  <a16:creationId xmlns:a16="http://schemas.microsoft.com/office/drawing/2014/main" xmlns="" id="{7C062950-86DD-437A-9EC6-BDE6A725E84C}"/>
                 </a:ext>
               </a:extLst>
             </p:cNvPr>
@@ -8041,7 +8048,7 @@
             <p:cNvPr id="302" name="Straight Connector 301">
               <a:extLst>
                 <a:ext uri="{FF2B5EF4-FFF2-40B4-BE49-F238E27FC236}">
-                  <a16:creationId xmlns:a16="http://schemas.microsoft.com/office/drawing/2014/main" id="{B59A06D9-E7C3-4CE0-9C01-A2098EBDDC67}"/>
+                  <a16:creationId xmlns:a16="http://schemas.microsoft.com/office/drawing/2014/main" xmlns="" id="{B59A06D9-E7C3-4CE0-9C01-A2098EBDDC67}"/>
                 </a:ext>
               </a:extLst>
             </p:cNvPr>
@@ -8080,7 +8087,7 @@
             <p:cNvPr id="304" name="Rectangle 303">
               <a:extLst>
                 <a:ext uri="{FF2B5EF4-FFF2-40B4-BE49-F238E27FC236}">
-                  <a16:creationId xmlns:a16="http://schemas.microsoft.com/office/drawing/2014/main" id="{1A9F1BD1-EF3A-44FF-8F2F-B1EBC082E95B}"/>
+                  <a16:creationId xmlns:a16="http://schemas.microsoft.com/office/drawing/2014/main" xmlns="" id="{1A9F1BD1-EF3A-44FF-8F2F-B1EBC082E95B}"/>
                 </a:ext>
               </a:extLst>
             </p:cNvPr>
@@ -8127,7 +8134,7 @@
           <p:cNvPr id="308" name="Rectangle 307">
             <a:extLst>
               <a:ext uri="{FF2B5EF4-FFF2-40B4-BE49-F238E27FC236}">
-                <a16:creationId xmlns:a16="http://schemas.microsoft.com/office/drawing/2014/main" id="{3F34487E-1590-4797-9A40-F0315FF7B287}"/>
+                <a16:creationId xmlns:a16="http://schemas.microsoft.com/office/drawing/2014/main" xmlns="" id="{3F34487E-1590-4797-9A40-F0315FF7B287}"/>
               </a:ext>
             </a:extLst>
           </p:cNvPr>
@@ -8183,7 +8190,7 @@
           <p:cNvPr id="310" name="Connector: Elbow 309">
             <a:extLst>
               <a:ext uri="{FF2B5EF4-FFF2-40B4-BE49-F238E27FC236}">
-                <a16:creationId xmlns:a16="http://schemas.microsoft.com/office/drawing/2014/main" id="{F93FFA4F-29B9-4F94-9C5C-E874C818DFFC}"/>
+                <a16:creationId xmlns:a16="http://schemas.microsoft.com/office/drawing/2014/main" xmlns="" id="{F93FFA4F-29B9-4F94-9C5C-E874C818DFFC}"/>
               </a:ext>
             </a:extLst>
           </p:cNvPr>
@@ -8227,7 +8234,7 @@
           <p:cNvPr id="312" name="Straight Connector 311">
             <a:extLst>
               <a:ext uri="{FF2B5EF4-FFF2-40B4-BE49-F238E27FC236}">
-                <a16:creationId xmlns:a16="http://schemas.microsoft.com/office/drawing/2014/main" id="{FBE0FF93-6773-4F9F-9157-5D177BA15CC3}"/>
+                <a16:creationId xmlns:a16="http://schemas.microsoft.com/office/drawing/2014/main" xmlns="" id="{FBE0FF93-6773-4F9F-9157-5D177BA15CC3}"/>
               </a:ext>
             </a:extLst>
           </p:cNvPr>
@@ -8270,7 +8277,7 @@
           <p:cNvPr id="313" name="Straight Connector 312">
             <a:extLst>
               <a:ext uri="{FF2B5EF4-FFF2-40B4-BE49-F238E27FC236}">
-                <a16:creationId xmlns:a16="http://schemas.microsoft.com/office/drawing/2014/main" id="{6EDF0F38-BBEF-4319-8384-2B93F09AFDC5}"/>
+                <a16:creationId xmlns:a16="http://schemas.microsoft.com/office/drawing/2014/main" xmlns="" id="{6EDF0F38-BBEF-4319-8384-2B93F09AFDC5}"/>
               </a:ext>
             </a:extLst>
           </p:cNvPr>
@@ -8343,7 +8350,7 @@
           <p:cNvPr id="4" name="Rectangle 3">
             <a:extLst>
               <a:ext uri="{FF2B5EF4-FFF2-40B4-BE49-F238E27FC236}">
-                <a16:creationId xmlns:a16="http://schemas.microsoft.com/office/drawing/2014/main" id="{9D823031-FCF0-43EB-B9DD-9BD6BBD91E51}"/>
+                <a16:creationId xmlns:a16="http://schemas.microsoft.com/office/drawing/2014/main" xmlns="" id="{9D823031-FCF0-43EB-B9DD-9BD6BBD91E51}"/>
               </a:ext>
             </a:extLst>
           </p:cNvPr>
@@ -8352,8 +8359,8 @@
         </p:nvSpPr>
         <p:spPr>
           <a:xfrm>
-            <a:off x="4267200" y="685800"/>
-            <a:ext cx="3657600" cy="5486400"/>
+            <a:off x="4267200" y="2514600"/>
+            <a:ext cx="3657600" cy="3657600"/>
           </a:xfrm>
           <a:prstGeom prst="rect">
             <a:avLst/>
@@ -8401,7 +8408,7 @@
           <p:cNvPr id="5" name="Rectangle 4">
             <a:extLst>
               <a:ext uri="{FF2B5EF4-FFF2-40B4-BE49-F238E27FC236}">
-                <a16:creationId xmlns:a16="http://schemas.microsoft.com/office/drawing/2014/main" id="{6EE5C258-2DEB-420D-A240-8783B677F8DD}"/>
+                <a16:creationId xmlns:a16="http://schemas.microsoft.com/office/drawing/2014/main" xmlns="" id="{6EE5C258-2DEB-420D-A240-8783B677F8DD}"/>
               </a:ext>
             </a:extLst>
           </p:cNvPr>
@@ -8459,7 +8466,7 @@
           <p:cNvPr id="6" name="Rectangle 5">
             <a:extLst>
               <a:ext uri="{FF2B5EF4-FFF2-40B4-BE49-F238E27FC236}">
-                <a16:creationId xmlns:a16="http://schemas.microsoft.com/office/drawing/2014/main" id="{E9F7A872-4557-4AAB-BCA0-8504092F48CD}"/>
+                <a16:creationId xmlns:a16="http://schemas.microsoft.com/office/drawing/2014/main" xmlns="" id="{E9F7A872-4557-4AAB-BCA0-8504092F48CD}"/>
               </a:ext>
             </a:extLst>
           </p:cNvPr>
@@ -8517,7 +8524,7 @@
           <p:cNvPr id="8" name="TextBox 7">
             <a:extLst>
               <a:ext uri="{FF2B5EF4-FFF2-40B4-BE49-F238E27FC236}">
-                <a16:creationId xmlns:a16="http://schemas.microsoft.com/office/drawing/2014/main" id="{D1C3BC9D-CAB0-4745-BD01-8A14BFB76E58}"/>
+                <a16:creationId xmlns:a16="http://schemas.microsoft.com/office/drawing/2014/main" xmlns="" id="{D1C3BC9D-CAB0-4745-BD01-8A14BFB76E58}"/>
               </a:ext>
             </a:extLst>
           </p:cNvPr>
@@ -8561,7 +8568,7 @@
           <p:cNvPr id="9" name="TextBox 8">
             <a:extLst>
               <a:ext uri="{FF2B5EF4-FFF2-40B4-BE49-F238E27FC236}">
-                <a16:creationId xmlns:a16="http://schemas.microsoft.com/office/drawing/2014/main" id="{D23C4869-5198-4AAC-9D5A-7AC6104F8F98}"/>
+                <a16:creationId xmlns:a16="http://schemas.microsoft.com/office/drawing/2014/main" xmlns="" id="{D23C4869-5198-4AAC-9D5A-7AC6104F8F98}"/>
               </a:ext>
             </a:extLst>
           </p:cNvPr>
@@ -8570,7 +8577,7 @@
         </p:nvSpPr>
         <p:spPr>
           <a:xfrm>
-            <a:off x="5524500" y="3105833"/>
+            <a:off x="5524500" y="4343400"/>
             <a:ext cx="1143000" cy="646331"/>
           </a:xfrm>
           <a:prstGeom prst="rect">
@@ -8605,7 +8612,7 @@
           <p:cNvPr id="11" name="TextBox 10">
             <a:extLst>
               <a:ext uri="{FF2B5EF4-FFF2-40B4-BE49-F238E27FC236}">
-                <a16:creationId xmlns:a16="http://schemas.microsoft.com/office/drawing/2014/main" id="{0CECDD40-E6B5-44BE-AF24-D49D7262A424}"/>
+                <a16:creationId xmlns:a16="http://schemas.microsoft.com/office/drawing/2014/main" xmlns="" id="{0CECDD40-E6B5-44BE-AF24-D49D7262A424}"/>
               </a:ext>
             </a:extLst>
           </p:cNvPr>
@@ -8649,7 +8656,7 @@
           <p:cNvPr id="27" name="Straight Arrow Connector 26">
             <a:extLst>
               <a:ext uri="{FF2B5EF4-FFF2-40B4-BE49-F238E27FC236}">
-                <a16:creationId xmlns:a16="http://schemas.microsoft.com/office/drawing/2014/main" id="{C12B7711-4E47-435F-BD9D-D06B6F3DA79C}"/>
+                <a16:creationId xmlns:a16="http://schemas.microsoft.com/office/drawing/2014/main" xmlns="" id="{C12B7711-4E47-435F-BD9D-D06B6F3DA79C}"/>
               </a:ext>
             </a:extLst>
           </p:cNvPr>
@@ -8660,9 +8667,9 @@
           <p:nvPr/>
         </p:nvCxnSpPr>
         <p:spPr>
-          <a:xfrm flipH="1" flipV="1">
-            <a:off x="6667500" y="3428999"/>
-            <a:ext cx="1485900" cy="2"/>
+          <a:xfrm flipH="1">
+            <a:off x="6667500" y="3429001"/>
+            <a:ext cx="1485900" cy="1237565"/>
           </a:xfrm>
           <a:prstGeom prst="straightConnector1">
             <a:avLst/>
@@ -8692,7 +8699,7 @@
           <p:cNvPr id="30" name="Connector: Elbow 29">
             <a:extLst>
               <a:ext uri="{FF2B5EF4-FFF2-40B4-BE49-F238E27FC236}">
-                <a16:creationId xmlns:a16="http://schemas.microsoft.com/office/drawing/2014/main" id="{3C711B30-83AD-4C64-BFEC-43A54B8B18DF}"/>
+                <a16:creationId xmlns:a16="http://schemas.microsoft.com/office/drawing/2014/main" xmlns="" id="{3C711B30-83AD-4C64-BFEC-43A54B8B18DF}"/>
               </a:ext>
             </a:extLst>
           </p:cNvPr>
@@ -8704,8 +8711,8 @@
         </p:nvCxnSpPr>
         <p:spPr>
           <a:xfrm rot="10800000">
-            <a:off x="4038600" y="2978835"/>
-            <a:ext cx="1485900" cy="450164"/>
+            <a:off x="4038600" y="2978836"/>
+            <a:ext cx="1485900" cy="1687731"/>
           </a:xfrm>
           <a:prstGeom prst="bentConnector3">
             <a:avLst/>
@@ -8735,7 +8742,7 @@
           <p:cNvPr id="33" name="Rectangle 32">
             <a:extLst>
               <a:ext uri="{FF2B5EF4-FFF2-40B4-BE49-F238E27FC236}">
-                <a16:creationId xmlns:a16="http://schemas.microsoft.com/office/drawing/2014/main" id="{EA082D52-2DFB-455E-A5DC-B14C6309F7DB}"/>
+                <a16:creationId xmlns:a16="http://schemas.microsoft.com/office/drawing/2014/main" xmlns="" id="{EA082D52-2DFB-455E-A5DC-B14C6309F7DB}"/>
               </a:ext>
             </a:extLst>
           </p:cNvPr>
@@ -8753,7 +8760,10 @@
           <a:noFill/>
           <a:ln w="19050">
             <a:solidFill>
-              <a:schemeClr val="accent1"/>
+              <a:schemeClr val="accent1">
+                <a:lumMod val="60000"/>
+                <a:lumOff val="40000"/>
+              </a:schemeClr>
             </a:solidFill>
           </a:ln>
         </p:spPr>
@@ -8780,7 +8790,10 @@
             <a:r>
               <a:rPr lang="en-US" dirty="0">
                 <a:solidFill>
-                  <a:schemeClr val="tx1"/>
+                  <a:schemeClr val="tx1">
+                    <a:lumMod val="50000"/>
+                    <a:lumOff val="50000"/>
+                  </a:schemeClr>
                 </a:solidFill>
               </a:rPr>
               <a:t>External Debug</a:t>
@@ -8789,7 +8802,10 @@
           <a:p>
             <a:endParaRPr lang="en-US" dirty="0">
               <a:solidFill>
-                <a:schemeClr val="tx1"/>
+                <a:schemeClr val="tx1">
+                  <a:lumMod val="50000"/>
+                  <a:lumOff val="50000"/>
+                </a:schemeClr>
               </a:solidFill>
             </a:endParaRPr>
           </a:p>
@@ -8797,7 +8813,10 @@
             <a:r>
               <a:rPr lang="en-US" dirty="0">
                 <a:solidFill>
-                  <a:schemeClr val="tx1"/>
+                  <a:schemeClr val="tx1">
+                    <a:lumMod val="50000"/>
+                    <a:lumOff val="50000"/>
+                  </a:schemeClr>
                 </a:solidFill>
               </a:rPr>
               <a:t>(Sees everything, renders whatever we need to the user)</a:t>
@@ -8807,7 +8826,10 @@
             <a:r>
               <a:rPr lang="en-US" dirty="0">
                 <a:solidFill>
-                  <a:schemeClr val="tx1"/>
+                  <a:schemeClr val="tx1">
+                    <a:lumMod val="50000"/>
+                    <a:lumOff val="50000"/>
+                  </a:schemeClr>
                 </a:solidFill>
               </a:rPr>
               <a:t>(May comprise of </a:t>
@@ -8815,7 +8837,10 @@
             <a:r>
               <a:rPr lang="en-US" dirty="0" err="1">
                 <a:solidFill>
-                  <a:schemeClr val="tx1"/>
+                  <a:schemeClr val="tx1">
+                    <a:lumMod val="50000"/>
+                    <a:lumOff val="50000"/>
+                  </a:schemeClr>
                 </a:solidFill>
               </a:rPr>
               <a:t>rqt</a:t>
@@ -8823,7 +8848,10 @@
             <a:r>
               <a:rPr lang="en-US" dirty="0">
                 <a:solidFill>
-                  <a:schemeClr val="tx1"/>
+                  <a:schemeClr val="tx1">
+                    <a:lumMod val="50000"/>
+                    <a:lumOff val="50000"/>
+                  </a:schemeClr>
                 </a:solidFill>
               </a:rPr>
               <a:t> tools)</a:t>
@@ -8836,7 +8864,7 @@
           <p:cNvPr id="81" name="Group 80">
             <a:extLst>
               <a:ext uri="{FF2B5EF4-FFF2-40B4-BE49-F238E27FC236}">
-                <a16:creationId xmlns:a16="http://schemas.microsoft.com/office/drawing/2014/main" id="{13495F10-E6C9-4544-8755-6D2269B71611}"/>
+                <a16:creationId xmlns:a16="http://schemas.microsoft.com/office/drawing/2014/main" xmlns="" id="{13495F10-E6C9-4544-8755-6D2269B71611}"/>
               </a:ext>
             </a:extLst>
           </p:cNvPr>
@@ -8856,7 +8884,7 @@
             <p:cNvPr id="47" name="TextBox 46">
               <a:extLst>
                 <a:ext uri="{FF2B5EF4-FFF2-40B4-BE49-F238E27FC236}">
-                  <a16:creationId xmlns:a16="http://schemas.microsoft.com/office/drawing/2014/main" id="{1274791D-1E6B-4A6C-8E69-E990CC0B7181}"/>
+                  <a16:creationId xmlns:a16="http://schemas.microsoft.com/office/drawing/2014/main" xmlns="" id="{1274791D-1E6B-4A6C-8E69-E990CC0B7181}"/>
                 </a:ext>
               </a:extLst>
             </p:cNvPr>
@@ -8896,7 +8924,7 @@
             <p:cNvPr id="55" name="TextBox 54">
               <a:extLst>
                 <a:ext uri="{FF2B5EF4-FFF2-40B4-BE49-F238E27FC236}">
-                  <a16:creationId xmlns:a16="http://schemas.microsoft.com/office/drawing/2014/main" id="{822FF986-6A2A-42A1-AAA1-4EED2312A0C2}"/>
+                  <a16:creationId xmlns:a16="http://schemas.microsoft.com/office/drawing/2014/main" xmlns="" id="{822FF986-6A2A-42A1-AAA1-4EED2312A0C2}"/>
                 </a:ext>
               </a:extLst>
             </p:cNvPr>
@@ -8934,7 +8962,7 @@
             <p:cNvPr id="64" name="TextBox 63">
               <a:extLst>
                 <a:ext uri="{FF2B5EF4-FFF2-40B4-BE49-F238E27FC236}">
-                  <a16:creationId xmlns:a16="http://schemas.microsoft.com/office/drawing/2014/main" id="{B25CDA6E-D0BC-406C-AE9E-781715A9294F}"/>
+                  <a16:creationId xmlns:a16="http://schemas.microsoft.com/office/drawing/2014/main" xmlns="" id="{B25CDA6E-D0BC-406C-AE9E-781715A9294F}"/>
                 </a:ext>
               </a:extLst>
             </p:cNvPr>
@@ -8973,7 +9001,7 @@
           <p:cNvPr id="75" name="TextBox 74">
             <a:extLst>
               <a:ext uri="{FF2B5EF4-FFF2-40B4-BE49-F238E27FC236}">
-                <a16:creationId xmlns:a16="http://schemas.microsoft.com/office/drawing/2014/main" id="{B052E701-0B3F-4144-BB1C-1AEF72B3DA27}"/>
+                <a16:creationId xmlns:a16="http://schemas.microsoft.com/office/drawing/2014/main" xmlns="" id="{B052E701-0B3F-4144-BB1C-1AEF72B3DA27}"/>
               </a:ext>
             </a:extLst>
           </p:cNvPr>
@@ -9013,7 +9041,7 @@
           <p:cNvPr id="93" name="Group 92">
             <a:extLst>
               <a:ext uri="{FF2B5EF4-FFF2-40B4-BE49-F238E27FC236}">
-                <a16:creationId xmlns:a16="http://schemas.microsoft.com/office/drawing/2014/main" id="{608F14CA-CBCE-48AB-8896-C9CD79E9976C}"/>
+                <a16:creationId xmlns:a16="http://schemas.microsoft.com/office/drawing/2014/main" xmlns="" id="{608F14CA-CBCE-48AB-8896-C9CD79E9976C}"/>
               </a:ext>
             </a:extLst>
           </p:cNvPr>
@@ -9033,7 +9061,7 @@
             <p:cNvPr id="76" name="TextBox 75">
               <a:extLst>
                 <a:ext uri="{FF2B5EF4-FFF2-40B4-BE49-F238E27FC236}">
-                  <a16:creationId xmlns:a16="http://schemas.microsoft.com/office/drawing/2014/main" id="{917C0848-C0F7-4A57-AE37-D453B6684A23}"/>
+                  <a16:creationId xmlns:a16="http://schemas.microsoft.com/office/drawing/2014/main" xmlns="" id="{917C0848-C0F7-4A57-AE37-D453B6684A23}"/>
                 </a:ext>
               </a:extLst>
             </p:cNvPr>
@@ -9071,7 +9099,7 @@
             <p:cNvPr id="77" name="TextBox 76">
               <a:extLst>
                 <a:ext uri="{FF2B5EF4-FFF2-40B4-BE49-F238E27FC236}">
-                  <a16:creationId xmlns:a16="http://schemas.microsoft.com/office/drawing/2014/main" id="{0849F1F6-E2F5-4E5F-B298-5FA40A4F2F16}"/>
+                  <a16:creationId xmlns:a16="http://schemas.microsoft.com/office/drawing/2014/main" xmlns="" id="{0849F1F6-E2F5-4E5F-B298-5FA40A4F2F16}"/>
                 </a:ext>
               </a:extLst>
             </p:cNvPr>
@@ -9110,7 +9138,7 @@
           <p:cNvPr id="83" name="Straight Arrow Connector 82">
             <a:extLst>
               <a:ext uri="{FF2B5EF4-FFF2-40B4-BE49-F238E27FC236}">
-                <a16:creationId xmlns:a16="http://schemas.microsoft.com/office/drawing/2014/main" id="{1057093E-272A-41A2-BA65-25B8B051D866}"/>
+                <a16:creationId xmlns:a16="http://schemas.microsoft.com/office/drawing/2014/main" xmlns="" id="{1057093E-272A-41A2-BA65-25B8B051D866}"/>
               </a:ext>
             </a:extLst>
           </p:cNvPr>
@@ -9154,7 +9182,7 @@
           <p:cNvPr id="85" name="Straight Arrow Connector 84">
             <a:extLst>
               <a:ext uri="{FF2B5EF4-FFF2-40B4-BE49-F238E27FC236}">
-                <a16:creationId xmlns:a16="http://schemas.microsoft.com/office/drawing/2014/main" id="{D6CC3582-AB21-48CD-9040-4486EB2FB552}"/>
+                <a16:creationId xmlns:a16="http://schemas.microsoft.com/office/drawing/2014/main" xmlns="" id="{D6CC3582-AB21-48CD-9040-4486EB2FB552}"/>
               </a:ext>
             </a:extLst>
           </p:cNvPr>
@@ -9198,7 +9226,7 @@
           <p:cNvPr id="94" name="Group 93">
             <a:extLst>
               <a:ext uri="{FF2B5EF4-FFF2-40B4-BE49-F238E27FC236}">
-                <a16:creationId xmlns:a16="http://schemas.microsoft.com/office/drawing/2014/main" id="{5B71DE7E-0DF0-428F-AA6B-B108814313FF}"/>
+                <a16:creationId xmlns:a16="http://schemas.microsoft.com/office/drawing/2014/main" xmlns="" id="{5B71DE7E-0DF0-428F-AA6B-B108814313FF}"/>
               </a:ext>
             </a:extLst>
           </p:cNvPr>
@@ -9218,7 +9246,7 @@
             <p:cNvPr id="95" name="TextBox 94">
               <a:extLst>
                 <a:ext uri="{FF2B5EF4-FFF2-40B4-BE49-F238E27FC236}">
-                  <a16:creationId xmlns:a16="http://schemas.microsoft.com/office/drawing/2014/main" id="{895F2993-E4C5-415F-86BA-72C0C851E084}"/>
+                  <a16:creationId xmlns:a16="http://schemas.microsoft.com/office/drawing/2014/main" xmlns="" id="{895F2993-E4C5-415F-86BA-72C0C851E084}"/>
                 </a:ext>
               </a:extLst>
             </p:cNvPr>
@@ -9256,7 +9284,7 @@
             <p:cNvPr id="96" name="TextBox 95">
               <a:extLst>
                 <a:ext uri="{FF2B5EF4-FFF2-40B4-BE49-F238E27FC236}">
-                  <a16:creationId xmlns:a16="http://schemas.microsoft.com/office/drawing/2014/main" id="{49ACBD59-0474-400C-BCAB-3A6C1E2FD2AE}"/>
+                  <a16:creationId xmlns:a16="http://schemas.microsoft.com/office/drawing/2014/main" xmlns="" id="{49ACBD59-0474-400C-BCAB-3A6C1E2FD2AE}"/>
                 </a:ext>
               </a:extLst>
             </p:cNvPr>
@@ -9295,7 +9323,7 @@
           <p:cNvPr id="97" name="Straight Arrow Connector 96">
             <a:extLst>
               <a:ext uri="{FF2B5EF4-FFF2-40B4-BE49-F238E27FC236}">
-                <a16:creationId xmlns:a16="http://schemas.microsoft.com/office/drawing/2014/main" id="{DD2FDE0C-DEE8-4C1E-B74D-F620BCDC1DBB}"/>
+                <a16:creationId xmlns:a16="http://schemas.microsoft.com/office/drawing/2014/main" xmlns="" id="{DD2FDE0C-DEE8-4C1E-B74D-F620BCDC1DBB}"/>
               </a:ext>
             </a:extLst>
           </p:cNvPr>
@@ -9337,7 +9365,7 @@
           <p:cNvPr id="98" name="Straight Arrow Connector 97">
             <a:extLst>
               <a:ext uri="{FF2B5EF4-FFF2-40B4-BE49-F238E27FC236}">
-                <a16:creationId xmlns:a16="http://schemas.microsoft.com/office/drawing/2014/main" id="{95EBF16D-D73D-4AF9-8C8A-817209A4AC19}"/>
+                <a16:creationId xmlns:a16="http://schemas.microsoft.com/office/drawing/2014/main" xmlns="" id="{95EBF16D-D73D-4AF9-8C8A-817209A4AC19}"/>
               </a:ext>
             </a:extLst>
           </p:cNvPr>
@@ -9379,7 +9407,7 @@
           <p:cNvPr id="100" name="TextBox 99">
             <a:extLst>
               <a:ext uri="{FF2B5EF4-FFF2-40B4-BE49-F238E27FC236}">
-                <a16:creationId xmlns:a16="http://schemas.microsoft.com/office/drawing/2014/main" id="{7E0B5FAC-DEE6-4184-BCB2-4655CB1BEBC9}"/>
+                <a16:creationId xmlns:a16="http://schemas.microsoft.com/office/drawing/2014/main" xmlns="" id="{7E0B5FAC-DEE6-4184-BCB2-4655CB1BEBC9}"/>
               </a:ext>
             </a:extLst>
           </p:cNvPr>
@@ -9419,7 +9447,7 @@
           <p:cNvPr id="103" name="Connector: Elbow 102">
             <a:extLst>
               <a:ext uri="{FF2B5EF4-FFF2-40B4-BE49-F238E27FC236}">
-                <a16:creationId xmlns:a16="http://schemas.microsoft.com/office/drawing/2014/main" id="{CCEE9DB4-8755-40EC-B5FB-4E2C629B6393}"/>
+                <a16:creationId xmlns:a16="http://schemas.microsoft.com/office/drawing/2014/main" xmlns="" id="{CCEE9DB4-8755-40EC-B5FB-4E2C629B6393}"/>
               </a:ext>
             </a:extLst>
           </p:cNvPr>
@@ -9432,8 +9460,8 @@
         </p:nvCxnSpPr>
         <p:spPr>
           <a:xfrm rot="5400000" flipH="1" flipV="1">
-            <a:off x="4218890" y="4220259"/>
-            <a:ext cx="2096870" cy="514350"/>
+            <a:off x="4837674" y="4839043"/>
+            <a:ext cx="859303" cy="514350"/>
           </a:xfrm>
           <a:prstGeom prst="bentConnector2">
             <a:avLst/>
@@ -9463,7 +9491,7 @@
           <p:cNvPr id="108" name="TextBox 107">
             <a:extLst>
               <a:ext uri="{FF2B5EF4-FFF2-40B4-BE49-F238E27FC236}">
-                <a16:creationId xmlns:a16="http://schemas.microsoft.com/office/drawing/2014/main" id="{4DA6C68B-7A79-4B68-80E2-F42273630CED}"/>
+                <a16:creationId xmlns:a16="http://schemas.microsoft.com/office/drawing/2014/main" xmlns="" id="{4DA6C68B-7A79-4B68-80E2-F42273630CED}"/>
               </a:ext>
             </a:extLst>
           </p:cNvPr>
@@ -9472,7 +9500,7 @@
         </p:nvSpPr>
         <p:spPr>
           <a:xfrm rot="5400000">
-            <a:off x="4305984" y="3510350"/>
+            <a:off x="4305984" y="4767650"/>
             <a:ext cx="461665" cy="527566"/>
           </a:xfrm>
           <a:prstGeom prst="rect">
@@ -9503,7 +9531,7 @@
           <p:cNvPr id="114" name="Connector: Elbow 113">
             <a:extLst>
               <a:ext uri="{FF2B5EF4-FFF2-40B4-BE49-F238E27FC236}">
-                <a16:creationId xmlns:a16="http://schemas.microsoft.com/office/drawing/2014/main" id="{0C4C8D8A-5CB8-496F-B974-0BB2B0EBEA0E}"/>
+                <a16:creationId xmlns:a16="http://schemas.microsoft.com/office/drawing/2014/main" xmlns="" id="{0C4C8D8A-5CB8-496F-B974-0BB2B0EBEA0E}"/>
               </a:ext>
             </a:extLst>
           </p:cNvPr>
@@ -9516,8 +9544,8 @@
         </p:nvCxnSpPr>
         <p:spPr>
           <a:xfrm rot="5400000" flipH="1" flipV="1">
-            <a:off x="4973507" y="2992309"/>
-            <a:ext cx="114302" cy="987683"/>
+            <a:off x="4963641" y="4239743"/>
+            <a:ext cx="134035" cy="987683"/>
           </a:xfrm>
           <a:prstGeom prst="bentConnector2">
             <a:avLst/>
@@ -9546,7 +9574,7 @@
           <p:cNvPr id="120" name="TextBox 119">
             <a:extLst>
               <a:ext uri="{FF2B5EF4-FFF2-40B4-BE49-F238E27FC236}">
-                <a16:creationId xmlns:a16="http://schemas.microsoft.com/office/drawing/2014/main" id="{4D4C479C-CB39-4C7F-95CF-198B344B230F}"/>
+                <a16:creationId xmlns:a16="http://schemas.microsoft.com/office/drawing/2014/main" xmlns="" id="{4D4C479C-CB39-4C7F-95CF-198B344B230F}"/>
               </a:ext>
             </a:extLst>
           </p:cNvPr>
@@ -9586,7 +9614,7 @@
           <p:cNvPr id="122" name="Connector: Elbow 121">
             <a:extLst>
               <a:ext uri="{FF2B5EF4-FFF2-40B4-BE49-F238E27FC236}">
-                <a16:creationId xmlns:a16="http://schemas.microsoft.com/office/drawing/2014/main" id="{CE33AD4B-8FF0-4C2D-8371-C14D73193802}"/>
+                <a16:creationId xmlns:a16="http://schemas.microsoft.com/office/drawing/2014/main" xmlns="" id="{CE33AD4B-8FF0-4C2D-8371-C14D73193802}"/>
               </a:ext>
             </a:extLst>
           </p:cNvPr>
@@ -9598,8 +9626,8 @@
         </p:nvCxnSpPr>
         <p:spPr>
           <a:xfrm>
-            <a:off x="6667500" y="3428999"/>
-            <a:ext cx="382905" cy="2096867"/>
+            <a:off x="6667500" y="4666566"/>
+            <a:ext cx="382905" cy="859300"/>
           </a:xfrm>
           <a:prstGeom prst="bentConnector2">
             <a:avLst/>
@@ -9628,7 +9656,7 @@
           <p:cNvPr id="123" name="TextBox 122">
             <a:extLst>
               <a:ext uri="{FF2B5EF4-FFF2-40B4-BE49-F238E27FC236}">
-                <a16:creationId xmlns:a16="http://schemas.microsoft.com/office/drawing/2014/main" id="{54F4E47A-859B-4158-AEDA-A3870077F1D1}"/>
+                <a16:creationId xmlns:a16="http://schemas.microsoft.com/office/drawing/2014/main" xmlns="" id="{54F4E47A-859B-4158-AEDA-A3870077F1D1}"/>
               </a:ext>
             </a:extLst>
           </p:cNvPr>
@@ -9665,7 +9693,7 @@
           <p:cNvPr id="124" name="TextBox 123">
             <a:extLst>
               <a:ext uri="{FF2B5EF4-FFF2-40B4-BE49-F238E27FC236}">
-                <a16:creationId xmlns:a16="http://schemas.microsoft.com/office/drawing/2014/main" id="{B891E5F0-F377-4F88-AF08-3CCA03030FE4}"/>
+                <a16:creationId xmlns:a16="http://schemas.microsoft.com/office/drawing/2014/main" xmlns="" id="{B891E5F0-F377-4F88-AF08-3CCA03030FE4}"/>
               </a:ext>
             </a:extLst>
           </p:cNvPr>
@@ -9702,7 +9730,7 @@
           <p:cNvPr id="125" name="TextBox 124">
             <a:extLst>
               <a:ext uri="{FF2B5EF4-FFF2-40B4-BE49-F238E27FC236}">
-                <a16:creationId xmlns:a16="http://schemas.microsoft.com/office/drawing/2014/main" id="{B48602C8-E8C1-479A-AD19-FAB589F086BA}"/>
+                <a16:creationId xmlns:a16="http://schemas.microsoft.com/office/drawing/2014/main" xmlns="" id="{B48602C8-E8C1-479A-AD19-FAB589F086BA}"/>
               </a:ext>
             </a:extLst>
           </p:cNvPr>
@@ -9742,7 +9770,7 @@
           <p:cNvPr id="128" name="TextBox 127">
             <a:extLst>
               <a:ext uri="{FF2B5EF4-FFF2-40B4-BE49-F238E27FC236}">
-                <a16:creationId xmlns:a16="http://schemas.microsoft.com/office/drawing/2014/main" id="{BD679E7D-E186-40B2-9295-B28D4D1C1AB3}"/>
+                <a16:creationId xmlns:a16="http://schemas.microsoft.com/office/drawing/2014/main" xmlns="" id="{BD679E7D-E186-40B2-9295-B28D4D1C1AB3}"/>
               </a:ext>
             </a:extLst>
           </p:cNvPr>
@@ -9779,7 +9807,7 @@
           <p:cNvPr id="129" name="TextBox 128">
             <a:extLst>
               <a:ext uri="{FF2B5EF4-FFF2-40B4-BE49-F238E27FC236}">
-                <a16:creationId xmlns:a16="http://schemas.microsoft.com/office/drawing/2014/main" id="{763DB1C5-E708-4E94-8ED4-5B13B4E73F24}"/>
+                <a16:creationId xmlns:a16="http://schemas.microsoft.com/office/drawing/2014/main" xmlns="" id="{763DB1C5-E708-4E94-8ED4-5B13B4E73F24}"/>
               </a:ext>
             </a:extLst>
           </p:cNvPr>
@@ -9816,7 +9844,7 @@
           <p:cNvPr id="130" name="TextBox 129">
             <a:extLst>
               <a:ext uri="{FF2B5EF4-FFF2-40B4-BE49-F238E27FC236}">
-                <a16:creationId xmlns:a16="http://schemas.microsoft.com/office/drawing/2014/main" id="{3C0F30FB-8FC0-47B7-ACB8-3519915B963A}"/>
+                <a16:creationId xmlns:a16="http://schemas.microsoft.com/office/drawing/2014/main" xmlns="" id="{3C0F30FB-8FC0-47B7-ACB8-3519915B963A}"/>
               </a:ext>
             </a:extLst>
           </p:cNvPr>
@@ -9868,7 +9896,7 @@
           <p:cNvPr id="131" name="TextBox 130">
             <a:extLst>
               <a:ext uri="{FF2B5EF4-FFF2-40B4-BE49-F238E27FC236}">
-                <a16:creationId xmlns:a16="http://schemas.microsoft.com/office/drawing/2014/main" id="{EE674B17-F606-42D3-9BC7-BC6D94116CDB}"/>
+                <a16:creationId xmlns:a16="http://schemas.microsoft.com/office/drawing/2014/main" xmlns="" id="{EE674B17-F606-42D3-9BC7-BC6D94116CDB}"/>
               </a:ext>
             </a:extLst>
           </p:cNvPr>
@@ -9878,7 +9906,7 @@
         <p:spPr>
           <a:xfrm>
             <a:off x="9639300" y="3105833"/>
-            <a:ext cx="1359946" cy="646331"/>
+            <a:ext cx="1714500" cy="646331"/>
           </a:xfrm>
           <a:prstGeom prst="rect">
             <a:avLst/>
@@ -9898,8 +9926,13 @@
           <a:p>
             <a:r>
               <a:rPr lang="en-US" dirty="0"/>
-              <a:t>Inverse Kinematics</a:t>
-            </a:r>
+              <a:t>Inverse </a:t>
+            </a:r>
+            <a:r>
+              <a:rPr lang="en-US" dirty="0" smtClean="0"/>
+              <a:t>Kinematics (opt)</a:t>
+            </a:r>
+            <a:endParaRPr lang="en-US" dirty="0"/>
           </a:p>
         </p:txBody>
       </p:sp>
@@ -9908,7 +9941,7 @@
           <p:cNvPr id="133" name="Straight Arrow Connector 132">
             <a:extLst>
               <a:ext uri="{FF2B5EF4-FFF2-40B4-BE49-F238E27FC236}">
-                <a16:creationId xmlns:a16="http://schemas.microsoft.com/office/drawing/2014/main" id="{499678DD-72AB-4CA2-8671-2F59582343EC}"/>
+                <a16:creationId xmlns:a16="http://schemas.microsoft.com/office/drawing/2014/main" xmlns="" id="{499678DD-72AB-4CA2-8671-2F59582343EC}"/>
               </a:ext>
             </a:extLst>
           </p:cNvPr>
@@ -9951,7 +9984,7 @@
           <p:cNvPr id="135" name="Connector: Elbow 134">
             <a:extLst>
               <a:ext uri="{FF2B5EF4-FFF2-40B4-BE49-F238E27FC236}">
-                <a16:creationId xmlns:a16="http://schemas.microsoft.com/office/drawing/2014/main" id="{78DF9FC0-A69F-405A-9826-928C2E720A35}"/>
+                <a16:creationId xmlns:a16="http://schemas.microsoft.com/office/drawing/2014/main" xmlns="" id="{78DF9FC0-A69F-405A-9826-928C2E720A35}"/>
               </a:ext>
             </a:extLst>
           </p:cNvPr>
@@ -9963,8 +9996,8 @@
         </p:nvCxnSpPr>
         <p:spPr>
           <a:xfrm rot="16200000" flipV="1">
-            <a:off x="9577255" y="2363814"/>
-            <a:ext cx="852922" cy="631115"/>
+            <a:off x="9665893" y="2275176"/>
+            <a:ext cx="852922" cy="808392"/>
           </a:xfrm>
           <a:prstGeom prst="bentConnector3">
             <a:avLst/>
@@ -9993,7 +10026,7 @@
           <p:cNvPr id="141" name="Connector: Elbow 140">
             <a:extLst>
               <a:ext uri="{FF2B5EF4-FFF2-40B4-BE49-F238E27FC236}">
-                <a16:creationId xmlns:a16="http://schemas.microsoft.com/office/drawing/2014/main" id="{2946BB67-7982-42C3-B808-6A97BE23269C}"/>
+                <a16:creationId xmlns:a16="http://schemas.microsoft.com/office/drawing/2014/main" xmlns="" id="{2946BB67-7982-42C3-B808-6A97BE23269C}"/>
               </a:ext>
             </a:extLst>
           </p:cNvPr>
@@ -10005,8 +10038,8 @@
         </p:nvCxnSpPr>
         <p:spPr>
           <a:xfrm rot="16200000" flipV="1">
-            <a:off x="9505612" y="2292171"/>
-            <a:ext cx="947351" cy="679973"/>
+            <a:off x="9594251" y="2203534"/>
+            <a:ext cx="947350" cy="857248"/>
           </a:xfrm>
           <a:prstGeom prst="bentConnector3">
             <a:avLst/>
@@ -10035,7 +10068,7 @@
           <p:cNvPr id="145" name="Connector: Elbow 144">
             <a:extLst>
               <a:ext uri="{FF2B5EF4-FFF2-40B4-BE49-F238E27FC236}">
-                <a16:creationId xmlns:a16="http://schemas.microsoft.com/office/drawing/2014/main" id="{AB8E9E8C-A231-453E-A812-9605D329E68E}"/>
+                <a16:creationId xmlns:a16="http://schemas.microsoft.com/office/drawing/2014/main" xmlns="" id="{AB8E9E8C-A231-453E-A812-9605D329E68E}"/>
               </a:ext>
             </a:extLst>
           </p:cNvPr>
@@ -10047,8 +10080,8 @@
         </p:nvCxnSpPr>
         <p:spPr>
           <a:xfrm rot="16200000" flipV="1">
-            <a:off x="9426496" y="2213055"/>
-            <a:ext cx="1048433" cy="737123"/>
+            <a:off x="9515135" y="2124418"/>
+            <a:ext cx="1048432" cy="914398"/>
           </a:xfrm>
           <a:prstGeom prst="bentConnector3">
             <a:avLst/>
@@ -10077,7 +10110,7 @@
           <p:cNvPr id="151" name="Connector: Elbow 150">
             <a:extLst>
               <a:ext uri="{FF2B5EF4-FFF2-40B4-BE49-F238E27FC236}">
-                <a16:creationId xmlns:a16="http://schemas.microsoft.com/office/drawing/2014/main" id="{0E491CAE-232E-42D5-ABD7-0F06EAB465E9}"/>
+                <a16:creationId xmlns:a16="http://schemas.microsoft.com/office/drawing/2014/main" xmlns="" id="{0E491CAE-232E-42D5-ABD7-0F06EAB465E9}"/>
               </a:ext>
             </a:extLst>
           </p:cNvPr>
@@ -10089,8 +10122,8 @@
         </p:nvCxnSpPr>
         <p:spPr>
           <a:xfrm rot="5400000">
-            <a:off x="9848169" y="4175308"/>
-            <a:ext cx="894248" cy="47961"/>
+            <a:off x="9936807" y="4086669"/>
+            <a:ext cx="894248" cy="225238"/>
           </a:xfrm>
           <a:prstGeom prst="bentConnector3">
             <a:avLst/>
@@ -10119,7 +10152,7 @@
           <p:cNvPr id="153" name="Connector: Elbow 152">
             <a:extLst>
               <a:ext uri="{FF2B5EF4-FFF2-40B4-BE49-F238E27FC236}">
-                <a16:creationId xmlns:a16="http://schemas.microsoft.com/office/drawing/2014/main" id="{111D75ED-96B9-4C54-80F1-7994D9A458DE}"/>
+                <a16:creationId xmlns:a16="http://schemas.microsoft.com/office/drawing/2014/main" xmlns="" id="{111D75ED-96B9-4C54-80F1-7994D9A458DE}"/>
               </a:ext>
             </a:extLst>
           </p:cNvPr>
@@ -10130,9 +10163,9 @@
           <p:nvPr/>
         </p:nvCxnSpPr>
         <p:spPr>
-          <a:xfrm rot="16200000" flipH="1">
-            <a:off x="9854777" y="4216659"/>
-            <a:ext cx="995330" cy="66339"/>
+          <a:xfrm rot="5400000">
+            <a:off x="9943416" y="4194360"/>
+            <a:ext cx="995330" cy="110938"/>
           </a:xfrm>
           <a:prstGeom prst="bentConnector3">
             <a:avLst/>
@@ -10161,7 +10194,7 @@
           <p:cNvPr id="155" name="Connector: Elbow 154">
             <a:extLst>
               <a:ext uri="{FF2B5EF4-FFF2-40B4-BE49-F238E27FC236}">
-                <a16:creationId xmlns:a16="http://schemas.microsoft.com/office/drawing/2014/main" id="{1ADFA978-5847-4F00-83CA-B046638D8F1A}"/>
+                <a16:creationId xmlns:a16="http://schemas.microsoft.com/office/drawing/2014/main" xmlns="" id="{1ADFA978-5847-4F00-83CA-B046638D8F1A}"/>
               </a:ext>
             </a:extLst>
           </p:cNvPr>
@@ -10173,8 +10206,8 @@
         </p:nvCxnSpPr>
         <p:spPr>
           <a:xfrm rot="16200000" flipH="1">
-            <a:off x="9853995" y="4217441"/>
-            <a:ext cx="1111194" cy="180639"/>
+            <a:off x="9942634" y="4306080"/>
+            <a:ext cx="1111194" cy="3362"/>
           </a:xfrm>
           <a:prstGeom prst="bentConnector3">
             <a:avLst/>
@@ -10203,7 +10236,7 @@
           <p:cNvPr id="157" name="TextBox 156">
             <a:extLst>
               <a:ext uri="{FF2B5EF4-FFF2-40B4-BE49-F238E27FC236}">
-                <a16:creationId xmlns:a16="http://schemas.microsoft.com/office/drawing/2014/main" id="{3F35F5F5-821C-459E-8CF4-3C1F267C13E1}"/>
+                <a16:creationId xmlns:a16="http://schemas.microsoft.com/office/drawing/2014/main" xmlns="" id="{3F35F5F5-821C-459E-8CF4-3C1F267C13E1}"/>
               </a:ext>
             </a:extLst>
           </p:cNvPr>
@@ -10212,8 +10245,8 @@
         </p:nvSpPr>
         <p:spPr>
           <a:xfrm>
-            <a:off x="4262270" y="1871945"/>
-            <a:ext cx="1262230" cy="923330"/>
+            <a:off x="4267200" y="685800"/>
+            <a:ext cx="3657600" cy="1600200"/>
           </a:xfrm>
           <a:prstGeom prst="rect">
             <a:avLst/>
@@ -10227,7 +10260,7 @@
         </p:spPr>
         <p:txBody>
           <a:bodyPr wrap="square" rtlCol="0">
-            <a:spAutoFit/>
+            <a:noAutofit/>
           </a:bodyPr>
           <a:lstStyle/>
           <a:p>
@@ -10243,27 +10276,222 @@
           <p:cNvPr id="159" name="Connector: Elbow 158">
             <a:extLst>
               <a:ext uri="{FF2B5EF4-FFF2-40B4-BE49-F238E27FC236}">
-                <a16:creationId xmlns:a16="http://schemas.microsoft.com/office/drawing/2014/main" id="{8D0556B9-E26D-4D06-9E45-C6408F6B6734}"/>
+                <a16:creationId xmlns:a16="http://schemas.microsoft.com/office/drawing/2014/main" xmlns="" id="{8D0556B9-E26D-4D06-9E45-C6408F6B6734}"/>
               </a:ext>
             </a:extLst>
           </p:cNvPr>
           <p:cNvCxnSpPr>
             <a:cxnSpLocks/>
-            <a:stCxn id="157" idx="2"/>
-            <a:endCxn id="9" idx="1"/>
+            <a:stCxn id="74" idx="2"/>
+            <a:endCxn id="9" idx="3"/>
           </p:cNvCxnSpPr>
           <p:nvPr/>
         </p:nvCxnSpPr>
         <p:spPr>
-          <a:xfrm rot="16200000" flipH="1">
-            <a:off x="4892080" y="2796579"/>
-            <a:ext cx="633724" cy="631115"/>
+          <a:xfrm rot="5400000">
+            <a:off x="5820117" y="3133383"/>
+            <a:ext cx="2380566" cy="685800"/>
           </a:xfrm>
           <a:prstGeom prst="bentConnector2">
             <a:avLst/>
           </a:prstGeom>
           <a:ln>
             <a:headEnd type="triangle"/>
+            <a:tailEnd type="triangle"/>
+          </a:ln>
+        </p:spPr>
+        <p:style>
+          <a:lnRef idx="1">
+            <a:schemeClr val="accent1"/>
+          </a:lnRef>
+          <a:fillRef idx="0">
+            <a:schemeClr val="accent1"/>
+          </a:fillRef>
+          <a:effectRef idx="0">
+            <a:schemeClr val="accent1"/>
+          </a:effectRef>
+          <a:fontRef idx="minor">
+            <a:schemeClr val="tx1"/>
+          </a:fontRef>
+        </p:style>
+      </p:cxnSp>
+      <p:sp>
+        <p:nvSpPr>
+          <p:cNvPr id="74" name="TextBox 73">
+            <a:extLst>
+              <a:ext uri="{FF2B5EF4-FFF2-40B4-BE49-F238E27FC236}">
+                <a16:creationId xmlns:a16="http://schemas.microsoft.com/office/drawing/2014/main" xmlns="" id="{D23C4869-5198-4AAC-9D5A-7AC6104F8F98}"/>
+              </a:ext>
+            </a:extLst>
+          </p:cNvPr>
+          <p:cNvSpPr txBox="1"/>
+          <p:nvPr/>
+        </p:nvSpPr>
+        <p:spPr>
+          <a:xfrm>
+            <a:off x="6781800" y="1600200"/>
+            <a:ext cx="1143000" cy="685800"/>
+          </a:xfrm>
+          <a:prstGeom prst="rect">
+            <a:avLst/>
+          </a:prstGeom>
+          <a:noFill/>
+          <a:ln>
+            <a:solidFill>
+              <a:schemeClr val="tx2"/>
+            </a:solidFill>
+          </a:ln>
+        </p:spPr>
+        <p:txBody>
+          <a:bodyPr wrap="square" rtlCol="0">
+            <a:noAutofit/>
+          </a:bodyPr>
+          <a:lstStyle/>
+          <a:p>
+            <a:r>
+              <a:rPr lang="en-US" dirty="0" err="1"/>
+              <a:t>Comms</a:t>
+            </a:r>
+            <a:r>
+              <a:rPr lang="en-US" dirty="0"/>
+              <a:t>. Interface</a:t>
+            </a:r>
+          </a:p>
+        </p:txBody>
+      </p:sp>
+      <p:sp>
+        <p:nvSpPr>
+          <p:cNvPr id="78" name="TextBox 77">
+            <a:extLst>
+              <a:ext uri="{FF2B5EF4-FFF2-40B4-BE49-F238E27FC236}">
+                <a16:creationId xmlns:a16="http://schemas.microsoft.com/office/drawing/2014/main" xmlns="" id="{D23C4869-5198-4AAC-9D5A-7AC6104F8F98}"/>
+              </a:ext>
+            </a:extLst>
+          </p:cNvPr>
+          <p:cNvSpPr txBox="1"/>
+          <p:nvPr/>
+        </p:nvSpPr>
+        <p:spPr>
+          <a:xfrm>
+            <a:off x="4381500" y="1143000"/>
+            <a:ext cx="2171700" cy="971550"/>
+          </a:xfrm>
+          <a:prstGeom prst="rect">
+            <a:avLst/>
+          </a:prstGeom>
+          <a:noFill/>
+          <a:ln>
+            <a:solidFill>
+              <a:schemeClr val="tx2"/>
+            </a:solidFill>
+          </a:ln>
+        </p:spPr>
+        <p:txBody>
+          <a:bodyPr wrap="square" rtlCol="0">
+            <a:noAutofit/>
+          </a:bodyPr>
+          <a:lstStyle/>
+          <a:p>
+            <a:r>
+              <a:rPr lang="en-US" dirty="0" smtClean="0"/>
+              <a:t>Controller</a:t>
+            </a:r>
+          </a:p>
+          <a:p>
+            <a:pPr>
+              <a:tabLst>
+                <a:tab pos="2001838" algn="r"/>
+              </a:tabLst>
+            </a:pPr>
+            <a:r>
+              <a:rPr lang="en-US" dirty="0" smtClean="0"/>
+              <a:t>	Collection</a:t>
+            </a:r>
+          </a:p>
+          <a:p>
+            <a:pPr>
+              <a:tabLst>
+                <a:tab pos="2001838" algn="r"/>
+              </a:tabLst>
+            </a:pPr>
+            <a:r>
+              <a:rPr lang="en-US" dirty="0"/>
+              <a:t>	</a:t>
+            </a:r>
+            <a:r>
+              <a:rPr lang="en-US" dirty="0" smtClean="0"/>
+              <a:t>Sensors</a:t>
+            </a:r>
+            <a:endParaRPr lang="en-US" dirty="0"/>
+          </a:p>
+        </p:txBody>
+      </p:sp>
+      <p:cxnSp>
+        <p:nvCxnSpPr>
+          <p:cNvPr id="79" name="Straight Arrow Connector 78">
+            <a:extLst>
+              <a:ext uri="{FF2B5EF4-FFF2-40B4-BE49-F238E27FC236}">
+                <a16:creationId xmlns:a16="http://schemas.microsoft.com/office/drawing/2014/main" xmlns="" id="{95EBF16D-D73D-4AF9-8C8A-817209A4AC19}"/>
+              </a:ext>
+            </a:extLst>
+          </p:cNvPr>
+          <p:cNvCxnSpPr>
+            <a:cxnSpLocks/>
+          </p:cNvCxnSpPr>
+          <p:nvPr/>
+        </p:nvCxnSpPr>
+        <p:spPr>
+          <a:xfrm>
+            <a:off x="6553200" y="2000250"/>
+            <a:ext cx="228600" cy="0"/>
+          </a:xfrm>
+          <a:prstGeom prst="straightConnector1">
+            <a:avLst/>
+          </a:prstGeom>
+          <a:ln>
+            <a:headEnd type="none"/>
+            <a:tailEnd type="triangle"/>
+          </a:ln>
+        </p:spPr>
+        <p:style>
+          <a:lnRef idx="1">
+            <a:schemeClr val="accent1"/>
+          </a:lnRef>
+          <a:fillRef idx="0">
+            <a:schemeClr val="accent1"/>
+          </a:fillRef>
+          <a:effectRef idx="0">
+            <a:schemeClr val="accent1"/>
+          </a:effectRef>
+          <a:fontRef idx="minor">
+            <a:schemeClr val="tx1"/>
+          </a:fontRef>
+        </p:style>
+      </p:cxnSp>
+      <p:cxnSp>
+        <p:nvCxnSpPr>
+          <p:cNvPr id="82" name="Straight Arrow Connector 81">
+            <a:extLst>
+              <a:ext uri="{FF2B5EF4-FFF2-40B4-BE49-F238E27FC236}">
+                <a16:creationId xmlns:a16="http://schemas.microsoft.com/office/drawing/2014/main" xmlns="" id="{95EBF16D-D73D-4AF9-8C8A-817209A4AC19}"/>
+              </a:ext>
+            </a:extLst>
+          </p:cNvPr>
+          <p:cNvCxnSpPr>
+            <a:cxnSpLocks/>
+          </p:cNvCxnSpPr>
+          <p:nvPr/>
+        </p:nvCxnSpPr>
+        <p:spPr>
+          <a:xfrm flipH="1">
+            <a:off x="6553200" y="1714500"/>
+            <a:ext cx="228600" cy="0"/>
+          </a:xfrm>
+          <a:prstGeom prst="straightConnector1">
+            <a:avLst/>
+          </a:prstGeom>
+          <a:ln>
+            <a:headEnd type="none"/>
             <a:tailEnd type="triangle"/>
           </a:ln>
         </p:spPr>

</xml_diff>

<commit_message>
Minor update to the ROS arch diagram
</commit_message>
<xml_diff>
--- a/Architecture.pptx
+++ b/Architecture.pptx
@@ -648,14 +648,10 @@
           <a:p>
             <a:r>
               <a:rPr lang="en-US" dirty="0"/>
-              <a:t>The Inverse </a:t>
-            </a:r>
-            <a:r>
-              <a:rPr lang="en-US"/>
-              <a:t>Kinematics </a:t>
-            </a:r>
-            <a:r>
-              <a:rPr lang="en-US" smtClean="0"/>
+              <a:t>The Inverse Kinematics </a:t>
+            </a:r>
+            <a:r>
+              <a:rPr lang="en-US" dirty="0" smtClean="0"/>
               <a:t>node may </a:t>
             </a:r>
             <a:r>
@@ -8653,49 +8649,6 @@
       </p:sp>
       <p:cxnSp>
         <p:nvCxnSpPr>
-          <p:cNvPr id="27" name="Straight Arrow Connector 26">
-            <a:extLst>
-              <a:ext uri="{FF2B5EF4-FFF2-40B4-BE49-F238E27FC236}">
-                <a16:creationId xmlns:a16="http://schemas.microsoft.com/office/drawing/2014/main" xmlns="" id="{C12B7711-4E47-435F-BD9D-D06B6F3DA79C}"/>
-              </a:ext>
-            </a:extLst>
-          </p:cNvPr>
-          <p:cNvCxnSpPr>
-            <a:stCxn id="11" idx="1"/>
-            <a:endCxn id="9" idx="3"/>
-          </p:cNvCxnSpPr>
-          <p:nvPr/>
-        </p:nvCxnSpPr>
-        <p:spPr>
-          <a:xfrm flipH="1">
-            <a:off x="6667500" y="3429001"/>
-            <a:ext cx="1485900" cy="1237565"/>
-          </a:xfrm>
-          <a:prstGeom prst="straightConnector1">
-            <a:avLst/>
-          </a:prstGeom>
-          <a:ln>
-            <a:headEnd type="triangle"/>
-            <a:tailEnd type="triangle"/>
-          </a:ln>
-        </p:spPr>
-        <p:style>
-          <a:lnRef idx="1">
-            <a:schemeClr val="accent1"/>
-          </a:lnRef>
-          <a:fillRef idx="0">
-            <a:schemeClr val="accent1"/>
-          </a:fillRef>
-          <a:effectRef idx="0">
-            <a:schemeClr val="accent1"/>
-          </a:effectRef>
-          <a:fontRef idx="minor">
-            <a:schemeClr val="tx1"/>
-          </a:fontRef>
-        </p:style>
-      </p:cxnSp>
-      <p:cxnSp>
-        <p:nvCxnSpPr>
           <p:cNvPr id="30" name="Connector: Elbow 29">
             <a:extLst>
               <a:ext uri="{FF2B5EF4-FFF2-40B4-BE49-F238E27FC236}">
@@ -10252,9 +10205,9 @@
             <a:avLst/>
           </a:prstGeom>
           <a:noFill/>
-          <a:ln>
+          <a:ln w="19050">
             <a:solidFill>
-              <a:schemeClr val="tx2"/>
+              <a:schemeClr val="accent1"/>
             </a:solidFill>
           </a:ln>
         </p:spPr>
@@ -10492,6 +10445,44 @@
           </a:prstGeom>
           <a:ln>
             <a:headEnd type="none"/>
+            <a:tailEnd type="triangle"/>
+          </a:ln>
+        </p:spPr>
+        <p:style>
+          <a:lnRef idx="1">
+            <a:schemeClr val="accent1"/>
+          </a:lnRef>
+          <a:fillRef idx="0">
+            <a:schemeClr val="accent1"/>
+          </a:fillRef>
+          <a:effectRef idx="0">
+            <a:schemeClr val="accent1"/>
+          </a:effectRef>
+          <a:fontRef idx="minor">
+            <a:schemeClr val="tx1"/>
+          </a:fontRef>
+        </p:style>
+      </p:cxnSp>
+      <p:cxnSp>
+        <p:nvCxnSpPr>
+          <p:cNvPr id="54" name="Elbow Connector 53"/>
+          <p:cNvCxnSpPr>
+            <a:stCxn id="9" idx="3"/>
+            <a:endCxn id="11" idx="1"/>
+          </p:cNvCxnSpPr>
+          <p:nvPr/>
+        </p:nvCxnSpPr>
+        <p:spPr>
+          <a:xfrm flipV="1">
+            <a:off x="6667500" y="3429001"/>
+            <a:ext cx="1485900" cy="1237565"/>
+          </a:xfrm>
+          <a:prstGeom prst="bentConnector3">
+            <a:avLst>
+              <a:gd name="adj1" fmla="val 45540"/>
+            </a:avLst>
+          </a:prstGeom>
+          <a:ln>
             <a:tailEnd type="triangle"/>
           </a:ln>
         </p:spPr>

</xml_diff>

<commit_message>
Updates to power budget and diagrams
</commit_message>
<xml_diff>
--- a/Architecture.pptx
+++ b/Architecture.pptx
@@ -212,7 +212,7 @@
           <a:p>
             <a:fld id="{7207C0AE-1CF7-4A0B-B9C2-6CA9E4371059}" type="datetimeFigureOut">
               <a:rPr lang="en-US" smtClean="0"/>
-              <a:t>3/2/2018</a:t>
+              <a:t>3/26/2018</a:t>
             </a:fld>
             <a:endParaRPr lang="en-US"/>
           </a:p>
@@ -1093,7 +1093,7 @@
           <a:p>
             <a:fld id="{1522C3F5-FD30-402A-BDF3-0D99E299B33B}" type="datetimeFigureOut">
               <a:rPr lang="en-US" smtClean="0"/>
-              <a:t>3/2/2018</a:t>
+              <a:t>3/26/2018</a:t>
             </a:fld>
             <a:endParaRPr lang="en-US"/>
           </a:p>
@@ -1291,7 +1291,7 @@
           <a:p>
             <a:fld id="{1522C3F5-FD30-402A-BDF3-0D99E299B33B}" type="datetimeFigureOut">
               <a:rPr lang="en-US" smtClean="0"/>
-              <a:t>3/2/2018</a:t>
+              <a:t>3/26/2018</a:t>
             </a:fld>
             <a:endParaRPr lang="en-US"/>
           </a:p>
@@ -1499,7 +1499,7 @@
           <a:p>
             <a:fld id="{1522C3F5-FD30-402A-BDF3-0D99E299B33B}" type="datetimeFigureOut">
               <a:rPr lang="en-US" smtClean="0"/>
-              <a:t>3/2/2018</a:t>
+              <a:t>3/26/2018</a:t>
             </a:fld>
             <a:endParaRPr lang="en-US"/>
           </a:p>
@@ -1697,7 +1697,7 @@
           <a:p>
             <a:fld id="{1522C3F5-FD30-402A-BDF3-0D99E299B33B}" type="datetimeFigureOut">
               <a:rPr lang="en-US" smtClean="0"/>
-              <a:t>3/2/2018</a:t>
+              <a:t>3/26/2018</a:t>
             </a:fld>
             <a:endParaRPr lang="en-US"/>
           </a:p>
@@ -1972,7 +1972,7 @@
           <a:p>
             <a:fld id="{1522C3F5-FD30-402A-BDF3-0D99E299B33B}" type="datetimeFigureOut">
               <a:rPr lang="en-US" smtClean="0"/>
-              <a:t>3/2/2018</a:t>
+              <a:t>3/26/2018</a:t>
             </a:fld>
             <a:endParaRPr lang="en-US"/>
           </a:p>
@@ -2237,7 +2237,7 @@
           <a:p>
             <a:fld id="{1522C3F5-FD30-402A-BDF3-0D99E299B33B}" type="datetimeFigureOut">
               <a:rPr lang="en-US" smtClean="0"/>
-              <a:t>3/2/2018</a:t>
+              <a:t>3/26/2018</a:t>
             </a:fld>
             <a:endParaRPr lang="en-US"/>
           </a:p>
@@ -2649,7 +2649,7 @@
           <a:p>
             <a:fld id="{1522C3F5-FD30-402A-BDF3-0D99E299B33B}" type="datetimeFigureOut">
               <a:rPr lang="en-US" smtClean="0"/>
-              <a:t>3/2/2018</a:t>
+              <a:t>3/26/2018</a:t>
             </a:fld>
             <a:endParaRPr lang="en-US"/>
           </a:p>
@@ -2790,7 +2790,7 @@
           <a:p>
             <a:fld id="{1522C3F5-FD30-402A-BDF3-0D99E299B33B}" type="datetimeFigureOut">
               <a:rPr lang="en-US" smtClean="0"/>
-              <a:t>3/2/2018</a:t>
+              <a:t>3/26/2018</a:t>
             </a:fld>
             <a:endParaRPr lang="en-US"/>
           </a:p>
@@ -2903,7 +2903,7 @@
           <a:p>
             <a:fld id="{1522C3F5-FD30-402A-BDF3-0D99E299B33B}" type="datetimeFigureOut">
               <a:rPr lang="en-US" smtClean="0"/>
-              <a:t>3/2/2018</a:t>
+              <a:t>3/26/2018</a:t>
             </a:fld>
             <a:endParaRPr lang="en-US"/>
           </a:p>
@@ -3214,7 +3214,7 @@
           <a:p>
             <a:fld id="{1522C3F5-FD30-402A-BDF3-0D99E299B33B}" type="datetimeFigureOut">
               <a:rPr lang="en-US" smtClean="0"/>
-              <a:t>3/2/2018</a:t>
+              <a:t>3/26/2018</a:t>
             </a:fld>
             <a:endParaRPr lang="en-US"/>
           </a:p>
@@ -3502,7 +3502,7 @@
           <a:p>
             <a:fld id="{1522C3F5-FD30-402A-BDF3-0D99E299B33B}" type="datetimeFigureOut">
               <a:rPr lang="en-US" smtClean="0"/>
-              <a:t>3/2/2018</a:t>
+              <a:t>3/26/2018</a:t>
             </a:fld>
             <a:endParaRPr lang="en-US"/>
           </a:p>
@@ -3743,7 +3743,7 @@
           <a:p>
             <a:fld id="{1522C3F5-FD30-402A-BDF3-0D99E299B33B}" type="datetimeFigureOut">
               <a:rPr lang="en-US" smtClean="0"/>
-              <a:t>3/2/2018</a:t>
+              <a:t>3/26/2018</a:t>
             </a:fld>
             <a:endParaRPr lang="en-US"/>
           </a:p>
@@ -12664,6 +12664,16 @@
 <file path=ppt/slides/slide3.xml><?xml version="1.0" encoding="utf-8"?>
 <p:sld xmlns:a="http://schemas.openxmlformats.org/drawingml/2006/main" xmlns:r="http://schemas.openxmlformats.org/officeDocument/2006/relationships" xmlns:p="http://schemas.openxmlformats.org/presentationml/2006/main">
   <p:cSld>
+    <p:bg>
+      <p:bgPr>
+        <a:solidFill>
+          <a:schemeClr val="bg2">
+            <a:lumMod val="50000"/>
+          </a:schemeClr>
+        </a:solidFill>
+        <a:effectLst/>
+      </p:bgPr>
+    </p:bg>
     <p:spTree>
       <p:nvGrpSpPr>
         <p:cNvPr id="1" name=""/>
@@ -12701,7 +12711,10 @@
           <a:noFill/>
           <a:ln w="19050">
             <a:solidFill>
-              <a:schemeClr val="accent1"/>
+              <a:schemeClr val="accent1">
+                <a:lumMod val="60000"/>
+                <a:lumOff val="40000"/>
+              </a:schemeClr>
             </a:solidFill>
           </a:ln>
         </p:spPr>
@@ -12728,7 +12741,10 @@
             <a:r>
               <a:rPr lang="en-US" dirty="0">
                 <a:solidFill>
-                  <a:schemeClr val="tx1"/>
+                  <a:schemeClr val="accent1">
+                    <a:lumMod val="20000"/>
+                    <a:lumOff val="80000"/>
+                  </a:schemeClr>
                 </a:solidFill>
               </a:rPr>
               <a:t>Master Control Board</a:t>
@@ -12752,297 +12768,6 @@
           <a:xfrm>
             <a:off x="8153400" y="685800"/>
             <a:ext cx="3657600" cy="5486400"/>
-          </a:xfrm>
-          <a:prstGeom prst="rect">
-            <a:avLst/>
-          </a:prstGeom>
-          <a:noFill/>
-          <a:ln w="19050">
-            <a:solidFill>
-              <a:schemeClr val="accent1"/>
-            </a:solidFill>
-          </a:ln>
-        </p:spPr>
-        <p:style>
-          <a:lnRef idx="2">
-            <a:schemeClr val="accent1">
-              <a:shade val="50000"/>
-            </a:schemeClr>
-          </a:lnRef>
-          <a:fillRef idx="1">
-            <a:schemeClr val="accent1"/>
-          </a:fillRef>
-          <a:effectRef idx="0">
-            <a:schemeClr val="accent1"/>
-          </a:effectRef>
-          <a:fontRef idx="minor">
-            <a:schemeClr val="lt1"/>
-          </a:fontRef>
-        </p:style>
-        <p:txBody>
-          <a:bodyPr rtlCol="0" anchor="t"/>
-          <a:lstStyle/>
-          <a:p>
-            <a:r>
-              <a:rPr lang="en-US" dirty="0">
-                <a:solidFill>
-                  <a:schemeClr val="tx1"/>
-                </a:solidFill>
-              </a:rPr>
-              <a:t>Arm Control Board</a:t>
-            </a:r>
-          </a:p>
-        </p:txBody>
-      </p:sp>
-      <p:sp>
-        <p:nvSpPr>
-          <p:cNvPr id="6" name="Rectangle 5">
-            <a:extLst>
-              <a:ext uri="{FF2B5EF4-FFF2-40B4-BE49-F238E27FC236}">
-                <a16:creationId xmlns:a16="http://schemas.microsoft.com/office/drawing/2014/main" id="{E9F7A872-4557-4AAB-BCA0-8504092F48CD}"/>
-              </a:ext>
-            </a:extLst>
-          </p:cNvPr>
-          <p:cNvSpPr/>
-          <p:nvPr/>
-        </p:nvSpPr>
-        <p:spPr>
-          <a:xfrm>
-            <a:off x="381000" y="685801"/>
-            <a:ext cx="3657600" cy="2616199"/>
-          </a:xfrm>
-          <a:prstGeom prst="rect">
-            <a:avLst/>
-          </a:prstGeom>
-          <a:noFill/>
-          <a:ln w="19050">
-            <a:solidFill>
-              <a:schemeClr val="accent1"/>
-            </a:solidFill>
-          </a:ln>
-        </p:spPr>
-        <p:style>
-          <a:lnRef idx="2">
-            <a:schemeClr val="accent1">
-              <a:shade val="50000"/>
-            </a:schemeClr>
-          </a:lnRef>
-          <a:fillRef idx="1">
-            <a:schemeClr val="accent1"/>
-          </a:fillRef>
-          <a:effectRef idx="0">
-            <a:schemeClr val="accent1"/>
-          </a:effectRef>
-          <a:fontRef idx="minor">
-            <a:schemeClr val="lt1"/>
-          </a:fontRef>
-        </p:style>
-        <p:txBody>
-          <a:bodyPr rtlCol="0" anchor="t"/>
-          <a:lstStyle/>
-          <a:p>
-            <a:r>
-              <a:rPr lang="en-US" dirty="0">
-                <a:solidFill>
-                  <a:schemeClr val="tx1"/>
-                </a:solidFill>
-              </a:rPr>
-              <a:t>Drive Control Board</a:t>
-            </a:r>
-          </a:p>
-        </p:txBody>
-      </p:sp>
-      <p:sp>
-        <p:nvSpPr>
-          <p:cNvPr id="8" name="TextBox 7">
-            <a:extLst>
-              <a:ext uri="{FF2B5EF4-FFF2-40B4-BE49-F238E27FC236}">
-                <a16:creationId xmlns:a16="http://schemas.microsoft.com/office/drawing/2014/main" id="{D1C3BC9D-CAB0-4745-BD01-8A14BFB76E58}"/>
-              </a:ext>
-            </a:extLst>
-          </p:cNvPr>
-          <p:cNvSpPr txBox="1"/>
-          <p:nvPr/>
-        </p:nvSpPr>
-        <p:spPr>
-          <a:xfrm>
-            <a:off x="2895600" y="2655669"/>
-            <a:ext cx="1143000" cy="646331"/>
-          </a:xfrm>
-          <a:prstGeom prst="rect">
-            <a:avLst/>
-          </a:prstGeom>
-          <a:noFill/>
-          <a:ln>
-            <a:solidFill>
-              <a:schemeClr val="tx2"/>
-            </a:solidFill>
-          </a:ln>
-        </p:spPr>
-        <p:txBody>
-          <a:bodyPr wrap="square" rtlCol="0">
-            <a:spAutoFit/>
-          </a:bodyPr>
-          <a:lstStyle/>
-          <a:p>
-            <a:r>
-              <a:rPr lang="en-US" dirty="0" err="1"/>
-              <a:t>Comms</a:t>
-            </a:r>
-            <a:r>
-              <a:rPr lang="en-US" dirty="0"/>
-              <a:t>. Interface</a:t>
-            </a:r>
-          </a:p>
-        </p:txBody>
-      </p:sp>
-      <p:sp>
-        <p:nvSpPr>
-          <p:cNvPr id="9" name="TextBox 8">
-            <a:extLst>
-              <a:ext uri="{FF2B5EF4-FFF2-40B4-BE49-F238E27FC236}">
-                <a16:creationId xmlns:a16="http://schemas.microsoft.com/office/drawing/2014/main" id="{D23C4869-5198-4AAC-9D5A-7AC6104F8F98}"/>
-              </a:ext>
-            </a:extLst>
-          </p:cNvPr>
-          <p:cNvSpPr txBox="1"/>
-          <p:nvPr/>
-        </p:nvSpPr>
-        <p:spPr>
-          <a:xfrm>
-            <a:off x="5524500" y="4343400"/>
-            <a:ext cx="1143000" cy="646331"/>
-          </a:xfrm>
-          <a:prstGeom prst="rect">
-            <a:avLst/>
-          </a:prstGeom>
-          <a:noFill/>
-          <a:ln>
-            <a:solidFill>
-              <a:schemeClr val="tx2"/>
-            </a:solidFill>
-          </a:ln>
-        </p:spPr>
-        <p:txBody>
-          <a:bodyPr wrap="square" rtlCol="0">
-            <a:spAutoFit/>
-          </a:bodyPr>
-          <a:lstStyle/>
-          <a:p>
-            <a:r>
-              <a:rPr lang="en-US" dirty="0" err="1"/>
-              <a:t>Comms</a:t>
-            </a:r>
-            <a:r>
-              <a:rPr lang="en-US" dirty="0"/>
-              <a:t>. Interface</a:t>
-            </a:r>
-          </a:p>
-        </p:txBody>
-      </p:sp>
-      <p:sp>
-        <p:nvSpPr>
-          <p:cNvPr id="11" name="TextBox 10">
-            <a:extLst>
-              <a:ext uri="{FF2B5EF4-FFF2-40B4-BE49-F238E27FC236}">
-                <a16:creationId xmlns:a16="http://schemas.microsoft.com/office/drawing/2014/main" id="{0CECDD40-E6B5-44BE-AF24-D49D7262A424}"/>
-              </a:ext>
-            </a:extLst>
-          </p:cNvPr>
-          <p:cNvSpPr txBox="1"/>
-          <p:nvPr/>
-        </p:nvSpPr>
-        <p:spPr>
-          <a:xfrm>
-            <a:off x="8153400" y="3105835"/>
-            <a:ext cx="1143000" cy="646331"/>
-          </a:xfrm>
-          <a:prstGeom prst="rect">
-            <a:avLst/>
-          </a:prstGeom>
-          <a:noFill/>
-          <a:ln>
-            <a:solidFill>
-              <a:schemeClr val="tx2"/>
-            </a:solidFill>
-          </a:ln>
-        </p:spPr>
-        <p:txBody>
-          <a:bodyPr wrap="square" rtlCol="0">
-            <a:spAutoFit/>
-          </a:bodyPr>
-          <a:lstStyle/>
-          <a:p>
-            <a:r>
-              <a:rPr lang="en-US" dirty="0" err="1"/>
-              <a:t>Comms</a:t>
-            </a:r>
-            <a:r>
-              <a:rPr lang="en-US" dirty="0"/>
-              <a:t>. Interface</a:t>
-            </a:r>
-          </a:p>
-        </p:txBody>
-      </p:sp>
-      <p:cxnSp>
-        <p:nvCxnSpPr>
-          <p:cNvPr id="30" name="Connector: Elbow 29">
-            <a:extLst>
-              <a:ext uri="{FF2B5EF4-FFF2-40B4-BE49-F238E27FC236}">
-                <a16:creationId xmlns:a16="http://schemas.microsoft.com/office/drawing/2014/main" id="{3C711B30-83AD-4C64-BFEC-43A54B8B18DF}"/>
-              </a:ext>
-            </a:extLst>
-          </p:cNvPr>
-          <p:cNvCxnSpPr>
-            <a:stCxn id="9" idx="1"/>
-            <a:endCxn id="8" idx="3"/>
-          </p:cNvCxnSpPr>
-          <p:nvPr/>
-        </p:nvCxnSpPr>
-        <p:spPr>
-          <a:xfrm rot="10800000">
-            <a:off x="4038600" y="2978836"/>
-            <a:ext cx="1485900" cy="1687731"/>
-          </a:xfrm>
-          <a:prstGeom prst="bentConnector3">
-            <a:avLst/>
-          </a:prstGeom>
-          <a:ln>
-            <a:headEnd type="triangle"/>
-            <a:tailEnd type="triangle"/>
-          </a:ln>
-        </p:spPr>
-        <p:style>
-          <a:lnRef idx="1">
-            <a:schemeClr val="accent1"/>
-          </a:lnRef>
-          <a:fillRef idx="0">
-            <a:schemeClr val="accent1"/>
-          </a:fillRef>
-          <a:effectRef idx="0">
-            <a:schemeClr val="accent1"/>
-          </a:effectRef>
-          <a:fontRef idx="minor">
-            <a:schemeClr val="tx1"/>
-          </a:fontRef>
-        </p:style>
-      </p:cxnSp>
-      <p:sp>
-        <p:nvSpPr>
-          <p:cNvPr id="33" name="Rectangle 32">
-            <a:extLst>
-              <a:ext uri="{FF2B5EF4-FFF2-40B4-BE49-F238E27FC236}">
-                <a16:creationId xmlns:a16="http://schemas.microsoft.com/office/drawing/2014/main" id="{EA082D52-2DFB-455E-A5DC-B14C6309F7DB}"/>
-              </a:ext>
-            </a:extLst>
-          </p:cNvPr>
-          <p:cNvSpPr/>
-          <p:nvPr/>
-        </p:nvSpPr>
-        <p:spPr>
-          <a:xfrm>
-            <a:off x="400050" y="3543300"/>
-            <a:ext cx="3657600" cy="2628900"/>
           </a:xfrm>
           <a:prstGeom prst="rect">
             <a:avLst/>
@@ -13080,9 +12805,336 @@
             <a:r>
               <a:rPr lang="en-US" dirty="0">
                 <a:solidFill>
-                  <a:schemeClr val="tx1">
-                    <a:lumMod val="50000"/>
-                    <a:lumOff val="50000"/>
+                  <a:schemeClr val="accent1">
+                    <a:lumMod val="20000"/>
+                    <a:lumOff val="80000"/>
+                  </a:schemeClr>
+                </a:solidFill>
+              </a:rPr>
+              <a:t>Arm Control Board</a:t>
+            </a:r>
+          </a:p>
+        </p:txBody>
+      </p:sp>
+      <p:sp>
+        <p:nvSpPr>
+          <p:cNvPr id="6" name="Rectangle 5">
+            <a:extLst>
+              <a:ext uri="{FF2B5EF4-FFF2-40B4-BE49-F238E27FC236}">
+                <a16:creationId xmlns:a16="http://schemas.microsoft.com/office/drawing/2014/main" id="{E9F7A872-4557-4AAB-BCA0-8504092F48CD}"/>
+              </a:ext>
+            </a:extLst>
+          </p:cNvPr>
+          <p:cNvSpPr/>
+          <p:nvPr/>
+        </p:nvSpPr>
+        <p:spPr>
+          <a:xfrm>
+            <a:off x="381000" y="685801"/>
+            <a:ext cx="3657600" cy="2616199"/>
+          </a:xfrm>
+          <a:prstGeom prst="rect">
+            <a:avLst/>
+          </a:prstGeom>
+          <a:noFill/>
+          <a:ln w="19050">
+            <a:solidFill>
+              <a:schemeClr val="accent1">
+                <a:lumMod val="60000"/>
+                <a:lumOff val="40000"/>
+              </a:schemeClr>
+            </a:solidFill>
+          </a:ln>
+        </p:spPr>
+        <p:style>
+          <a:lnRef idx="2">
+            <a:schemeClr val="accent1">
+              <a:shade val="50000"/>
+            </a:schemeClr>
+          </a:lnRef>
+          <a:fillRef idx="1">
+            <a:schemeClr val="accent1"/>
+          </a:fillRef>
+          <a:effectRef idx="0">
+            <a:schemeClr val="accent1"/>
+          </a:effectRef>
+          <a:fontRef idx="minor">
+            <a:schemeClr val="lt1"/>
+          </a:fontRef>
+        </p:style>
+        <p:txBody>
+          <a:bodyPr rtlCol="0" anchor="t"/>
+          <a:lstStyle/>
+          <a:p>
+            <a:r>
+              <a:rPr lang="en-US" dirty="0">
+                <a:solidFill>
+                  <a:schemeClr val="accent1">
+                    <a:lumMod val="20000"/>
+                    <a:lumOff val="80000"/>
+                  </a:schemeClr>
+                </a:solidFill>
+              </a:rPr>
+              <a:t>Drive Control Board</a:t>
+            </a:r>
+          </a:p>
+        </p:txBody>
+      </p:sp>
+      <p:sp>
+        <p:nvSpPr>
+          <p:cNvPr id="8" name="TextBox 7">
+            <a:extLst>
+              <a:ext uri="{FF2B5EF4-FFF2-40B4-BE49-F238E27FC236}">
+                <a16:creationId xmlns:a16="http://schemas.microsoft.com/office/drawing/2014/main" id="{D1C3BC9D-CAB0-4745-BD01-8A14BFB76E58}"/>
+              </a:ext>
+            </a:extLst>
+          </p:cNvPr>
+          <p:cNvSpPr txBox="1"/>
+          <p:nvPr/>
+        </p:nvSpPr>
+        <p:spPr>
+          <a:xfrm>
+            <a:off x="2895600" y="2655669"/>
+            <a:ext cx="1143000" cy="646331"/>
+          </a:xfrm>
+          <a:prstGeom prst="rect">
+            <a:avLst/>
+          </a:prstGeom>
+          <a:noFill/>
+          <a:ln>
+            <a:solidFill>
+              <a:schemeClr val="accent1">
+                <a:lumMod val="60000"/>
+                <a:lumOff val="40000"/>
+              </a:schemeClr>
+            </a:solidFill>
+          </a:ln>
+        </p:spPr>
+        <p:txBody>
+          <a:bodyPr wrap="square" rtlCol="0">
+            <a:spAutoFit/>
+          </a:bodyPr>
+          <a:lstStyle/>
+          <a:p>
+            <a:r>
+              <a:rPr lang="en-US" dirty="0">
+                <a:solidFill>
+                  <a:schemeClr val="accent1">
+                    <a:lumMod val="20000"/>
+                    <a:lumOff val="80000"/>
+                  </a:schemeClr>
+                </a:solidFill>
+              </a:rPr>
+              <a:t>ROS Interface</a:t>
+            </a:r>
+          </a:p>
+        </p:txBody>
+      </p:sp>
+      <p:sp>
+        <p:nvSpPr>
+          <p:cNvPr id="9" name="TextBox 8">
+            <a:extLst>
+              <a:ext uri="{FF2B5EF4-FFF2-40B4-BE49-F238E27FC236}">
+                <a16:creationId xmlns:a16="http://schemas.microsoft.com/office/drawing/2014/main" id="{D23C4869-5198-4AAC-9D5A-7AC6104F8F98}"/>
+              </a:ext>
+            </a:extLst>
+          </p:cNvPr>
+          <p:cNvSpPr txBox="1"/>
+          <p:nvPr/>
+        </p:nvSpPr>
+        <p:spPr>
+          <a:xfrm>
+            <a:off x="5524500" y="4343400"/>
+            <a:ext cx="1143000" cy="646331"/>
+          </a:xfrm>
+          <a:prstGeom prst="rect">
+            <a:avLst/>
+          </a:prstGeom>
+          <a:noFill/>
+          <a:ln>
+            <a:solidFill>
+              <a:schemeClr val="accent1">
+                <a:lumMod val="60000"/>
+                <a:lumOff val="40000"/>
+              </a:schemeClr>
+            </a:solidFill>
+          </a:ln>
+        </p:spPr>
+        <p:txBody>
+          <a:bodyPr wrap="square" rtlCol="0">
+            <a:spAutoFit/>
+          </a:bodyPr>
+          <a:lstStyle/>
+          <a:p>
+            <a:r>
+              <a:rPr lang="en-US" dirty="0">
+                <a:solidFill>
+                  <a:schemeClr val="accent1">
+                    <a:lumMod val="20000"/>
+                    <a:lumOff val="80000"/>
+                  </a:schemeClr>
+                </a:solidFill>
+              </a:rPr>
+              <a:t>ROS Interface</a:t>
+            </a:r>
+          </a:p>
+        </p:txBody>
+      </p:sp>
+      <p:sp>
+        <p:nvSpPr>
+          <p:cNvPr id="11" name="TextBox 10">
+            <a:extLst>
+              <a:ext uri="{FF2B5EF4-FFF2-40B4-BE49-F238E27FC236}">
+                <a16:creationId xmlns:a16="http://schemas.microsoft.com/office/drawing/2014/main" id="{0CECDD40-E6B5-44BE-AF24-D49D7262A424}"/>
+              </a:ext>
+            </a:extLst>
+          </p:cNvPr>
+          <p:cNvSpPr txBox="1"/>
+          <p:nvPr/>
+        </p:nvSpPr>
+        <p:spPr>
+          <a:xfrm>
+            <a:off x="8153400" y="3105835"/>
+            <a:ext cx="1143000" cy="646331"/>
+          </a:xfrm>
+          <a:prstGeom prst="rect">
+            <a:avLst/>
+          </a:prstGeom>
+          <a:noFill/>
+          <a:ln>
+            <a:solidFill>
+              <a:schemeClr val="accent1">
+                <a:lumMod val="60000"/>
+                <a:lumOff val="40000"/>
+              </a:schemeClr>
+            </a:solidFill>
+          </a:ln>
+        </p:spPr>
+        <p:txBody>
+          <a:bodyPr wrap="square" rtlCol="0">
+            <a:spAutoFit/>
+          </a:bodyPr>
+          <a:lstStyle/>
+          <a:p>
+            <a:r>
+              <a:rPr lang="en-US" dirty="0">
+                <a:solidFill>
+                  <a:schemeClr val="accent1">
+                    <a:lumMod val="20000"/>
+                    <a:lumOff val="80000"/>
+                  </a:schemeClr>
+                </a:solidFill>
+              </a:rPr>
+              <a:t>ROS Interface</a:t>
+            </a:r>
+          </a:p>
+        </p:txBody>
+      </p:sp>
+      <p:cxnSp>
+        <p:nvCxnSpPr>
+          <p:cNvPr id="30" name="Connector: Elbow 29">
+            <a:extLst>
+              <a:ext uri="{FF2B5EF4-FFF2-40B4-BE49-F238E27FC236}">
+                <a16:creationId xmlns:a16="http://schemas.microsoft.com/office/drawing/2014/main" id="{3C711B30-83AD-4C64-BFEC-43A54B8B18DF}"/>
+              </a:ext>
+            </a:extLst>
+          </p:cNvPr>
+          <p:cNvCxnSpPr>
+            <a:stCxn id="9" idx="1"/>
+            <a:endCxn id="8" idx="3"/>
+          </p:cNvCxnSpPr>
+          <p:nvPr/>
+        </p:nvCxnSpPr>
+        <p:spPr>
+          <a:xfrm rot="10800000">
+            <a:off x="4038600" y="2978836"/>
+            <a:ext cx="1485900" cy="1687731"/>
+          </a:xfrm>
+          <a:prstGeom prst="bentConnector3">
+            <a:avLst/>
+          </a:prstGeom>
+          <a:ln>
+            <a:solidFill>
+              <a:schemeClr val="accent1">
+                <a:lumMod val="60000"/>
+                <a:lumOff val="40000"/>
+              </a:schemeClr>
+            </a:solidFill>
+            <a:headEnd type="triangle"/>
+            <a:tailEnd type="triangle"/>
+          </a:ln>
+        </p:spPr>
+        <p:style>
+          <a:lnRef idx="1">
+            <a:schemeClr val="accent1"/>
+          </a:lnRef>
+          <a:fillRef idx="0">
+            <a:schemeClr val="accent1"/>
+          </a:fillRef>
+          <a:effectRef idx="0">
+            <a:schemeClr val="accent1"/>
+          </a:effectRef>
+          <a:fontRef idx="minor">
+            <a:schemeClr val="tx1"/>
+          </a:fontRef>
+        </p:style>
+      </p:cxnSp>
+      <p:sp>
+        <p:nvSpPr>
+          <p:cNvPr id="33" name="Rectangle 32">
+            <a:extLst>
+              <a:ext uri="{FF2B5EF4-FFF2-40B4-BE49-F238E27FC236}">
+                <a16:creationId xmlns:a16="http://schemas.microsoft.com/office/drawing/2014/main" id="{EA082D52-2DFB-455E-A5DC-B14C6309F7DB}"/>
+              </a:ext>
+            </a:extLst>
+          </p:cNvPr>
+          <p:cNvSpPr/>
+          <p:nvPr/>
+        </p:nvSpPr>
+        <p:spPr>
+          <a:xfrm>
+            <a:off x="400050" y="3543300"/>
+            <a:ext cx="3657600" cy="2628900"/>
+          </a:xfrm>
+          <a:prstGeom prst="rect">
+            <a:avLst/>
+          </a:prstGeom>
+          <a:noFill/>
+          <a:ln w="19050">
+            <a:solidFill>
+              <a:schemeClr val="accent1">
+                <a:lumMod val="60000"/>
+                <a:lumOff val="40000"/>
+              </a:schemeClr>
+            </a:solidFill>
+          </a:ln>
+        </p:spPr>
+        <p:style>
+          <a:lnRef idx="2">
+            <a:schemeClr val="accent1">
+              <a:shade val="50000"/>
+            </a:schemeClr>
+          </a:lnRef>
+          <a:fillRef idx="1">
+            <a:schemeClr val="accent1"/>
+          </a:fillRef>
+          <a:effectRef idx="0">
+            <a:schemeClr val="accent1"/>
+          </a:effectRef>
+          <a:fontRef idx="minor">
+            <a:schemeClr val="lt1"/>
+          </a:fontRef>
+        </p:style>
+        <p:txBody>
+          <a:bodyPr rtlCol="0" anchor="t"/>
+          <a:lstStyle/>
+          <a:p>
+            <a:r>
+              <a:rPr lang="en-US" dirty="0">
+                <a:solidFill>
+                  <a:schemeClr val="accent1">
+                    <a:lumMod val="20000"/>
+                    <a:lumOff val="80000"/>
                   </a:schemeClr>
                 </a:solidFill>
               </a:rPr>
@@ -13092,9 +13144,9 @@
           <a:p>
             <a:endParaRPr lang="en-US" dirty="0">
               <a:solidFill>
-                <a:schemeClr val="tx1">
-                  <a:lumMod val="50000"/>
-                  <a:lumOff val="50000"/>
+                <a:schemeClr val="accent1">
+                  <a:lumMod val="20000"/>
+                  <a:lumOff val="80000"/>
                 </a:schemeClr>
               </a:solidFill>
             </a:endParaRPr>
@@ -13103,9 +13155,9 @@
             <a:r>
               <a:rPr lang="en-US" dirty="0">
                 <a:solidFill>
-                  <a:schemeClr val="tx1">
-                    <a:lumMod val="50000"/>
-                    <a:lumOff val="50000"/>
+                  <a:schemeClr val="accent1">
+                    <a:lumMod val="20000"/>
+                    <a:lumOff val="80000"/>
                   </a:schemeClr>
                 </a:solidFill>
               </a:rPr>
@@ -13116,9 +13168,9 @@
             <a:r>
               <a:rPr lang="en-US" dirty="0">
                 <a:solidFill>
-                  <a:schemeClr val="tx1">
-                    <a:lumMod val="50000"/>
-                    <a:lumOff val="50000"/>
+                  <a:schemeClr val="accent1">
+                    <a:lumMod val="20000"/>
+                    <a:lumOff val="80000"/>
                   </a:schemeClr>
                 </a:solidFill>
               </a:rPr>
@@ -13127,9 +13179,9 @@
             <a:r>
               <a:rPr lang="en-US" dirty="0" err="1">
                 <a:solidFill>
-                  <a:schemeClr val="tx1">
-                    <a:lumMod val="50000"/>
-                    <a:lumOff val="50000"/>
+                  <a:schemeClr val="accent1">
+                    <a:lumMod val="20000"/>
+                    <a:lumOff val="80000"/>
                   </a:schemeClr>
                 </a:solidFill>
               </a:rPr>
@@ -13138,9 +13190,9 @@
             <a:r>
               <a:rPr lang="en-US" dirty="0">
                 <a:solidFill>
-                  <a:schemeClr val="tx1">
-                    <a:lumMod val="50000"/>
-                    <a:lumOff val="50000"/>
+                  <a:schemeClr val="accent1">
+                    <a:lumMod val="20000"/>
+                    <a:lumOff val="80000"/>
                   </a:schemeClr>
                 </a:solidFill>
               </a:rPr>
@@ -13192,7 +13244,10 @@
             <a:noFill/>
             <a:ln>
               <a:solidFill>
-                <a:schemeClr val="tx2"/>
+                <a:schemeClr val="accent1">
+                  <a:lumMod val="60000"/>
+                  <a:lumOff val="40000"/>
+                </a:schemeClr>
               </a:solidFill>
             </a:ln>
           </p:spPr>
@@ -13203,7 +13258,14 @@
             <a:lstStyle/>
             <a:p>
               <a:r>
-                <a:rPr lang="en-US" dirty="0"/>
+                <a:rPr lang="en-US" dirty="0">
+                  <a:solidFill>
+                    <a:schemeClr val="accent1">
+                      <a:lumMod val="20000"/>
+                      <a:lumOff val="80000"/>
+                    </a:schemeClr>
+                  </a:solidFill>
+                </a:rPr>
                 <a:t>Wheel Control</a:t>
               </a:r>
             </a:p>
@@ -13241,7 +13303,14 @@
             <a:lstStyle/>
             <a:p>
               <a:r>
-                <a:rPr lang="en-US" dirty="0"/>
+                <a:rPr lang="en-US" dirty="0">
+                  <a:solidFill>
+                    <a:schemeClr val="accent1">
+                      <a:lumMod val="20000"/>
+                      <a:lumOff val="80000"/>
+                    </a:schemeClr>
+                  </a:solidFill>
+                </a:rPr>
                 <a:t>Left</a:t>
               </a:r>
             </a:p>
@@ -13279,7 +13348,14 @@
             <a:lstStyle/>
             <a:p>
               <a:r>
-                <a:rPr lang="en-US" dirty="0"/>
+                <a:rPr lang="en-US" dirty="0">
+                  <a:solidFill>
+                    <a:schemeClr val="accent1">
+                      <a:lumMod val="20000"/>
+                      <a:lumOff val="80000"/>
+                    </a:schemeClr>
+                  </a:solidFill>
+                </a:rPr>
                 <a:t>Right</a:t>
               </a:r>
             </a:p>
@@ -13309,7 +13385,10 @@
           <a:noFill/>
           <a:ln>
             <a:solidFill>
-              <a:schemeClr val="tx2"/>
+              <a:schemeClr val="accent1">
+                <a:lumMod val="60000"/>
+                <a:lumOff val="40000"/>
+              </a:schemeClr>
             </a:solidFill>
           </a:ln>
         </p:spPr>
@@ -13320,7 +13399,14 @@
           <a:lstStyle/>
           <a:p>
             <a:r>
-              <a:rPr lang="en-US" dirty="0"/>
+              <a:rPr lang="en-US" dirty="0">
+                <a:solidFill>
+                  <a:schemeClr val="accent1">
+                    <a:lumMod val="20000"/>
+                    <a:lumOff val="80000"/>
+                  </a:schemeClr>
+                </a:solidFill>
+              </a:rPr>
               <a:t>Speed Control</a:t>
             </a:r>
           </a:p>
@@ -13378,7 +13464,14 @@
             <a:lstStyle/>
             <a:p>
               <a:r>
-                <a:rPr lang="en-US" dirty="0"/>
+                <a:rPr lang="en-US" dirty="0">
+                  <a:solidFill>
+                    <a:schemeClr val="accent1">
+                      <a:lumMod val="20000"/>
+                      <a:lumOff val="80000"/>
+                    </a:schemeClr>
+                  </a:solidFill>
+                </a:rPr>
                 <a:t>Left</a:t>
               </a:r>
             </a:p>
@@ -13416,7 +13509,14 @@
             <a:lstStyle/>
             <a:p>
               <a:r>
-                <a:rPr lang="en-US" dirty="0"/>
+                <a:rPr lang="en-US" dirty="0">
+                  <a:solidFill>
+                    <a:schemeClr val="accent1">
+                      <a:lumMod val="20000"/>
+                      <a:lumOff val="80000"/>
+                    </a:schemeClr>
+                  </a:solidFill>
+                </a:rPr>
                 <a:t>Right</a:t>
               </a:r>
             </a:p>
@@ -13448,6 +13548,12 @@
             <a:avLst/>
           </a:prstGeom>
           <a:ln>
+            <a:solidFill>
+              <a:schemeClr val="accent1">
+                <a:lumMod val="60000"/>
+                <a:lumOff val="40000"/>
+              </a:schemeClr>
+            </a:solidFill>
             <a:headEnd type="none"/>
             <a:tailEnd type="triangle"/>
           </a:ln>
@@ -13492,187 +13598,12 @@
             <a:avLst/>
           </a:prstGeom>
           <a:ln>
-            <a:headEnd type="none"/>
-            <a:tailEnd type="triangle"/>
-          </a:ln>
-        </p:spPr>
-        <p:style>
-          <a:lnRef idx="1">
-            <a:schemeClr val="accent1"/>
-          </a:lnRef>
-          <a:fillRef idx="0">
-            <a:schemeClr val="accent1"/>
-          </a:fillRef>
-          <a:effectRef idx="0">
-            <a:schemeClr val="accent1"/>
-          </a:effectRef>
-          <a:fontRef idx="minor">
-            <a:schemeClr val="tx1"/>
-          </a:fontRef>
-        </p:style>
-      </p:cxnSp>
-      <p:grpSp>
-        <p:nvGrpSpPr>
-          <p:cNvPr id="94" name="Group 93">
-            <a:extLst>
-              <a:ext uri="{FF2B5EF4-FFF2-40B4-BE49-F238E27FC236}">
-                <a16:creationId xmlns:a16="http://schemas.microsoft.com/office/drawing/2014/main" id="{5B71DE7E-0DF0-428F-AA6B-B108814313FF}"/>
-              </a:ext>
-            </a:extLst>
-          </p:cNvPr>
-          <p:cNvGrpSpPr/>
-          <p:nvPr/>
-        </p:nvGrpSpPr>
-        <p:grpSpPr>
-          <a:xfrm>
-            <a:off x="2546615" y="1435100"/>
-            <a:ext cx="1377685" cy="369332"/>
-            <a:chOff x="908581" y="1733034"/>
-            <a:chExt cx="1377685" cy="369332"/>
-          </a:xfrm>
-        </p:grpSpPr>
-        <p:sp>
-          <p:nvSpPr>
-            <p:cNvPr id="95" name="TextBox 94">
-              <a:extLst>
-                <a:ext uri="{FF2B5EF4-FFF2-40B4-BE49-F238E27FC236}">
-                  <a16:creationId xmlns:a16="http://schemas.microsoft.com/office/drawing/2014/main" id="{895F2993-E4C5-415F-86BA-72C0C851E084}"/>
-                </a:ext>
-              </a:extLst>
-            </p:cNvPr>
-            <p:cNvSpPr txBox="1"/>
-            <p:nvPr/>
-          </p:nvSpPr>
-          <p:spPr>
-            <a:xfrm>
-              <a:off x="908581" y="1733034"/>
-              <a:ext cx="837934" cy="369332"/>
-            </a:xfrm>
-            <a:prstGeom prst="rect">
-              <a:avLst/>
-            </a:prstGeom>
-            <a:noFill/>
-            <a:ln>
-              <a:noFill/>
-            </a:ln>
-          </p:spPr>
-          <p:txBody>
-            <a:bodyPr wrap="square" rtlCol="0">
-              <a:spAutoFit/>
-            </a:bodyPr>
-            <a:lstStyle/>
-            <a:p>
-              <a:r>
-                <a:rPr lang="en-US" dirty="0"/>
-                <a:t>Speed</a:t>
-              </a:r>
-            </a:p>
-          </p:txBody>
-        </p:sp>
-        <p:sp>
-          <p:nvSpPr>
-            <p:cNvPr id="96" name="TextBox 95">
-              <a:extLst>
-                <a:ext uri="{FF2B5EF4-FFF2-40B4-BE49-F238E27FC236}">
-                  <a16:creationId xmlns:a16="http://schemas.microsoft.com/office/drawing/2014/main" id="{49ACBD59-0474-400C-BCAB-3A6C1E2FD2AE}"/>
-                </a:ext>
-              </a:extLst>
-            </p:cNvPr>
-            <p:cNvSpPr txBox="1"/>
-            <p:nvPr/>
-          </p:nvSpPr>
-          <p:spPr>
-            <a:xfrm>
-              <a:off x="1588296" y="1733034"/>
-              <a:ext cx="697970" cy="369332"/>
-            </a:xfrm>
-            <a:prstGeom prst="rect">
-              <a:avLst/>
-            </a:prstGeom>
-            <a:noFill/>
-            <a:ln>
-              <a:noFill/>
-            </a:ln>
-          </p:spPr>
-          <p:txBody>
-            <a:bodyPr wrap="square" rtlCol="0">
-              <a:spAutoFit/>
-            </a:bodyPr>
-            <a:lstStyle/>
-            <a:p>
-              <a:r>
-                <a:rPr lang="en-US" dirty="0"/>
-                <a:t>Turn</a:t>
-              </a:r>
-            </a:p>
-          </p:txBody>
-        </p:sp>
-      </p:grpSp>
-      <p:cxnSp>
-        <p:nvCxnSpPr>
-          <p:cNvPr id="97" name="Straight Arrow Connector 96">
-            <a:extLst>
-              <a:ext uri="{FF2B5EF4-FFF2-40B4-BE49-F238E27FC236}">
-                <a16:creationId xmlns:a16="http://schemas.microsoft.com/office/drawing/2014/main" id="{DD2FDE0C-DEE8-4C1E-B74D-F620BCDC1DBB}"/>
-              </a:ext>
-            </a:extLst>
-          </p:cNvPr>
-          <p:cNvCxnSpPr>
-            <a:cxnSpLocks/>
-          </p:cNvCxnSpPr>
-          <p:nvPr/>
-        </p:nvCxnSpPr>
-        <p:spPr>
-          <a:xfrm rot="10800000">
-            <a:off x="3620294" y="1804432"/>
-            <a:ext cx="0" cy="851237"/>
-          </a:xfrm>
-          <a:prstGeom prst="straightConnector1">
-            <a:avLst/>
-          </a:prstGeom>
-          <a:ln>
-            <a:headEnd type="none"/>
-            <a:tailEnd type="triangle"/>
-          </a:ln>
-        </p:spPr>
-        <p:style>
-          <a:lnRef idx="1">
-            <a:schemeClr val="accent1"/>
-          </a:lnRef>
-          <a:fillRef idx="0">
-            <a:schemeClr val="accent1"/>
-          </a:fillRef>
-          <a:effectRef idx="0">
-            <a:schemeClr val="accent1"/>
-          </a:effectRef>
-          <a:fontRef idx="minor">
-            <a:schemeClr val="tx1"/>
-          </a:fontRef>
-        </p:style>
-      </p:cxnSp>
-      <p:cxnSp>
-        <p:nvCxnSpPr>
-          <p:cNvPr id="98" name="Straight Arrow Connector 97">
-            <a:extLst>
-              <a:ext uri="{FF2B5EF4-FFF2-40B4-BE49-F238E27FC236}">
-                <a16:creationId xmlns:a16="http://schemas.microsoft.com/office/drawing/2014/main" id="{95EBF16D-D73D-4AF9-8C8A-817209A4AC19}"/>
-              </a:ext>
-            </a:extLst>
-          </p:cNvPr>
-          <p:cNvCxnSpPr>
-            <a:cxnSpLocks/>
-          </p:cNvCxnSpPr>
-          <p:nvPr/>
-        </p:nvCxnSpPr>
-        <p:spPr>
-          <a:xfrm rot="10800000">
-            <a:off x="2914160" y="1804432"/>
-            <a:ext cx="0" cy="851237"/>
-          </a:xfrm>
-          <a:prstGeom prst="straightConnector1">
-            <a:avLst/>
-          </a:prstGeom>
-          <a:ln>
+            <a:solidFill>
+              <a:schemeClr val="accent1">
+                <a:lumMod val="60000"/>
+                <a:lumOff val="40000"/>
+              </a:schemeClr>
+            </a:solidFill>
             <a:headEnd type="none"/>
             <a:tailEnd type="triangle"/>
           </a:ln>
@@ -13694,10 +13625,10 @@
       </p:cxnSp>
       <p:sp>
         <p:nvSpPr>
-          <p:cNvPr id="100" name="TextBox 99">
-            <a:extLst>
-              <a:ext uri="{FF2B5EF4-FFF2-40B4-BE49-F238E27FC236}">
-                <a16:creationId xmlns:a16="http://schemas.microsoft.com/office/drawing/2014/main" id="{7E0B5FAC-DEE6-4184-BCB2-4655CB1BEBC9}"/>
+          <p:cNvPr id="96" name="TextBox 95">
+            <a:extLst>
+              <a:ext uri="{FF2B5EF4-FFF2-40B4-BE49-F238E27FC236}">
+                <a16:creationId xmlns:a16="http://schemas.microsoft.com/office/drawing/2014/main" id="{49ACBD59-0474-400C-BCAB-3A6C1E2FD2AE}"/>
               </a:ext>
             </a:extLst>
           </p:cNvPr>
@@ -13706,17 +13637,15 @@
         </p:nvSpPr>
         <p:spPr>
           <a:xfrm>
-            <a:off x="4267200" y="5525869"/>
-            <a:ext cx="1485900" cy="646331"/>
+            <a:off x="2547257" y="1435100"/>
+            <a:ext cx="1262743" cy="369332"/>
           </a:xfrm>
           <a:prstGeom prst="rect">
             <a:avLst/>
           </a:prstGeom>
           <a:noFill/>
           <a:ln>
-            <a:solidFill>
-              <a:schemeClr val="tx2"/>
-            </a:solidFill>
+            <a:noFill/>
           </a:ln>
         </p:spPr>
         <p:txBody>
@@ -13726,7 +13655,112 @@
           <a:lstStyle/>
           <a:p>
             <a:r>
-              <a:rPr lang="en-US" dirty="0"/>
+              <a:rPr lang="en-US" dirty="0">
+                <a:solidFill>
+                  <a:schemeClr val="accent1">
+                    <a:lumMod val="20000"/>
+                    <a:lumOff val="80000"/>
+                  </a:schemeClr>
+                </a:solidFill>
+              </a:rPr>
+              <a:t>Commands</a:t>
+            </a:r>
+          </a:p>
+        </p:txBody>
+      </p:sp>
+      <p:cxnSp>
+        <p:nvCxnSpPr>
+          <p:cNvPr id="97" name="Straight Arrow Connector 96">
+            <a:extLst>
+              <a:ext uri="{FF2B5EF4-FFF2-40B4-BE49-F238E27FC236}">
+                <a16:creationId xmlns:a16="http://schemas.microsoft.com/office/drawing/2014/main" id="{DD2FDE0C-DEE8-4C1E-B74D-F620BCDC1DBB}"/>
+              </a:ext>
+            </a:extLst>
+          </p:cNvPr>
+          <p:cNvCxnSpPr>
+            <a:cxnSpLocks/>
+          </p:cNvCxnSpPr>
+          <p:nvPr/>
+        </p:nvCxnSpPr>
+        <p:spPr>
+          <a:xfrm rot="10800000">
+            <a:off x="3620294" y="1804432"/>
+            <a:ext cx="0" cy="851237"/>
+          </a:xfrm>
+          <a:prstGeom prst="straightConnector1">
+            <a:avLst/>
+          </a:prstGeom>
+          <a:ln>
+            <a:solidFill>
+              <a:schemeClr val="accent1">
+                <a:lumMod val="60000"/>
+                <a:lumOff val="40000"/>
+              </a:schemeClr>
+            </a:solidFill>
+            <a:headEnd type="none"/>
+            <a:tailEnd type="triangle"/>
+          </a:ln>
+        </p:spPr>
+        <p:style>
+          <a:lnRef idx="1">
+            <a:schemeClr val="accent1"/>
+          </a:lnRef>
+          <a:fillRef idx="0">
+            <a:schemeClr val="accent1"/>
+          </a:fillRef>
+          <a:effectRef idx="0">
+            <a:schemeClr val="accent1"/>
+          </a:effectRef>
+          <a:fontRef idx="minor">
+            <a:schemeClr val="tx1"/>
+          </a:fontRef>
+        </p:style>
+      </p:cxnSp>
+      <p:sp>
+        <p:nvSpPr>
+          <p:cNvPr id="100" name="TextBox 99">
+            <a:extLst>
+              <a:ext uri="{FF2B5EF4-FFF2-40B4-BE49-F238E27FC236}">
+                <a16:creationId xmlns:a16="http://schemas.microsoft.com/office/drawing/2014/main" id="{7E0B5FAC-DEE6-4184-BCB2-4655CB1BEBC9}"/>
+              </a:ext>
+            </a:extLst>
+          </p:cNvPr>
+          <p:cNvSpPr txBox="1"/>
+          <p:nvPr/>
+        </p:nvSpPr>
+        <p:spPr>
+          <a:xfrm>
+            <a:off x="4267200" y="5525869"/>
+            <a:ext cx="1485900" cy="646331"/>
+          </a:xfrm>
+          <a:prstGeom prst="rect">
+            <a:avLst/>
+          </a:prstGeom>
+          <a:noFill/>
+          <a:ln>
+            <a:solidFill>
+              <a:schemeClr val="accent1">
+                <a:lumMod val="60000"/>
+                <a:lumOff val="40000"/>
+              </a:schemeClr>
+            </a:solidFill>
+          </a:ln>
+        </p:spPr>
+        <p:txBody>
+          <a:bodyPr wrap="square" rtlCol="0">
+            <a:spAutoFit/>
+          </a:bodyPr>
+          <a:lstStyle/>
+          <a:p>
+            <a:r>
+              <a:rPr lang="en-US" dirty="0">
+                <a:solidFill>
+                  <a:schemeClr val="accent1">
+                    <a:lumMod val="20000"/>
+                    <a:lumOff val="80000"/>
+                  </a:schemeClr>
+                </a:solidFill>
+              </a:rPr>
               <a:t>Base Station Interface</a:t>
             </a:r>
           </a:p>
@@ -13757,6 +13791,12 @@
             <a:avLst/>
           </a:prstGeom>
           <a:ln>
+            <a:solidFill>
+              <a:schemeClr val="accent1">
+                <a:lumMod val="60000"/>
+                <a:lumOff val="40000"/>
+              </a:schemeClr>
+            </a:solidFill>
             <a:headEnd type="triangle"/>
             <a:tailEnd type="triangle"/>
           </a:ln>
@@ -13799,7 +13839,10 @@
           <a:noFill/>
           <a:ln>
             <a:solidFill>
-              <a:schemeClr val="tx2"/>
+              <a:schemeClr val="accent1">
+                <a:lumMod val="60000"/>
+                <a:lumOff val="40000"/>
+              </a:schemeClr>
             </a:solidFill>
           </a:ln>
         </p:spPr>
@@ -13810,7 +13853,14 @@
           <a:lstStyle/>
           <a:p>
             <a:r>
-              <a:rPr lang="en-US" dirty="0"/>
+              <a:rPr lang="en-US" dirty="0">
+                <a:solidFill>
+                  <a:schemeClr val="accent1">
+                    <a:lumMod val="20000"/>
+                    <a:lumOff val="80000"/>
+                  </a:schemeClr>
+                </a:solidFill>
+              </a:rPr>
               <a:t>GPS</a:t>
             </a:r>
           </a:p>
@@ -13841,6 +13891,12 @@
             <a:avLst/>
           </a:prstGeom>
           <a:ln>
+            <a:solidFill>
+              <a:schemeClr val="accent1">
+                <a:lumMod val="60000"/>
+                <a:lumOff val="40000"/>
+              </a:schemeClr>
+            </a:solidFill>
             <a:tailEnd type="triangle"/>
           </a:ln>
         </p:spPr>
@@ -13861,10 +13917,10 @@
       </p:cxnSp>
       <p:sp>
         <p:nvSpPr>
-          <p:cNvPr id="120" name="TextBox 119">
-            <a:extLst>
-              <a:ext uri="{FF2B5EF4-FFF2-40B4-BE49-F238E27FC236}">
-                <a16:creationId xmlns:a16="http://schemas.microsoft.com/office/drawing/2014/main" id="{4D4C479C-CB39-4C7F-95CF-198B344B230F}"/>
+          <p:cNvPr id="123" name="TextBox 122">
+            <a:extLst>
+              <a:ext uri="{FF2B5EF4-FFF2-40B4-BE49-F238E27FC236}">
+                <a16:creationId xmlns:a16="http://schemas.microsoft.com/office/drawing/2014/main" id="{54F4E47A-859B-4158-AEDA-A3870077F1D1}"/>
               </a:ext>
             </a:extLst>
           </p:cNvPr>
@@ -13873,8 +13929,8 @@
         </p:nvSpPr>
         <p:spPr>
           <a:xfrm>
-            <a:off x="6176010" y="5525866"/>
-            <a:ext cx="1748790" cy="646331"/>
+            <a:off x="8153400" y="1011534"/>
+            <a:ext cx="2622176" cy="1045866"/>
           </a:xfrm>
           <a:prstGeom prst="rect">
             <a:avLst/>
@@ -13882,7 +13938,337 @@
           <a:noFill/>
           <a:ln>
             <a:solidFill>
-              <a:schemeClr val="tx2"/>
+              <a:schemeClr val="accent1">
+                <a:lumMod val="60000"/>
+                <a:lumOff val="40000"/>
+              </a:schemeClr>
+            </a:solidFill>
+          </a:ln>
+        </p:spPr>
+        <p:txBody>
+          <a:bodyPr wrap="square" rtlCol="0">
+            <a:noAutofit/>
+          </a:bodyPr>
+          <a:lstStyle/>
+          <a:p>
+            <a:endParaRPr lang="en-US" dirty="0">
+              <a:solidFill>
+                <a:schemeClr val="accent1">
+                  <a:lumMod val="20000"/>
+                  <a:lumOff val="80000"/>
+                </a:schemeClr>
+              </a:solidFill>
+            </a:endParaRPr>
+          </a:p>
+        </p:txBody>
+      </p:sp>
+      <p:sp>
+        <p:nvSpPr>
+          <p:cNvPr id="124" name="TextBox 123">
+            <a:extLst>
+              <a:ext uri="{FF2B5EF4-FFF2-40B4-BE49-F238E27FC236}">
+                <a16:creationId xmlns:a16="http://schemas.microsoft.com/office/drawing/2014/main" id="{B891E5F0-F377-4F88-AF08-3CCA03030FE4}"/>
+              </a:ext>
+            </a:extLst>
+          </p:cNvPr>
+          <p:cNvSpPr txBox="1"/>
+          <p:nvPr/>
+        </p:nvSpPr>
+        <p:spPr>
+          <a:xfrm>
+            <a:off x="8251116" y="1114945"/>
+            <a:ext cx="2622176" cy="1045866"/>
+          </a:xfrm>
+          <a:prstGeom prst="rect">
+            <a:avLst/>
+          </a:prstGeom>
+          <a:noFill/>
+          <a:ln>
+            <a:solidFill>
+              <a:schemeClr val="accent1">
+                <a:lumMod val="60000"/>
+                <a:lumOff val="40000"/>
+              </a:schemeClr>
+            </a:solidFill>
+          </a:ln>
+        </p:spPr>
+        <p:txBody>
+          <a:bodyPr wrap="square" rtlCol="0">
+            <a:noAutofit/>
+          </a:bodyPr>
+          <a:lstStyle/>
+          <a:p>
+            <a:endParaRPr lang="en-US" dirty="0">
+              <a:solidFill>
+                <a:schemeClr val="accent1">
+                  <a:lumMod val="20000"/>
+                  <a:lumOff val="80000"/>
+                </a:schemeClr>
+              </a:solidFill>
+            </a:endParaRPr>
+          </a:p>
+        </p:txBody>
+      </p:sp>
+      <p:sp>
+        <p:nvSpPr>
+          <p:cNvPr id="125" name="TextBox 124">
+            <a:extLst>
+              <a:ext uri="{FF2B5EF4-FFF2-40B4-BE49-F238E27FC236}">
+                <a16:creationId xmlns:a16="http://schemas.microsoft.com/office/drawing/2014/main" id="{B48602C8-E8C1-479A-AD19-FAB589F086BA}"/>
+              </a:ext>
+            </a:extLst>
+          </p:cNvPr>
+          <p:cNvSpPr txBox="1"/>
+          <p:nvPr/>
+        </p:nvSpPr>
+        <p:spPr>
+          <a:xfrm>
+            <a:off x="8377070" y="1207045"/>
+            <a:ext cx="2622176" cy="1045866"/>
+          </a:xfrm>
+          <a:prstGeom prst="rect">
+            <a:avLst/>
+          </a:prstGeom>
+          <a:noFill/>
+          <a:ln>
+            <a:solidFill>
+              <a:schemeClr val="accent1">
+                <a:lumMod val="60000"/>
+                <a:lumOff val="40000"/>
+              </a:schemeClr>
+            </a:solidFill>
+          </a:ln>
+        </p:spPr>
+        <p:txBody>
+          <a:bodyPr wrap="square" rtlCol="0">
+            <a:noAutofit/>
+          </a:bodyPr>
+          <a:lstStyle/>
+          <a:p>
+            <a:r>
+              <a:rPr lang="en-US" dirty="0">
+                <a:solidFill>
+                  <a:schemeClr val="accent1">
+                    <a:lumMod val="20000"/>
+                    <a:lumOff val="80000"/>
+                  </a:schemeClr>
+                </a:solidFill>
+              </a:rPr>
+              <a:t>- Linear Actuator Driver</a:t>
+            </a:r>
+          </a:p>
+          <a:p>
+            <a:r>
+              <a:rPr lang="en-US" dirty="0">
+                <a:solidFill>
+                  <a:schemeClr val="accent1">
+                    <a:lumMod val="20000"/>
+                    <a:lumOff val="80000"/>
+                  </a:schemeClr>
+                </a:solidFill>
+              </a:rPr>
+              <a:t>- DC Motor Driver</a:t>
+            </a:r>
+          </a:p>
+        </p:txBody>
+      </p:sp>
+      <p:sp>
+        <p:nvSpPr>
+          <p:cNvPr id="128" name="TextBox 127">
+            <a:extLst>
+              <a:ext uri="{FF2B5EF4-FFF2-40B4-BE49-F238E27FC236}">
+                <a16:creationId xmlns:a16="http://schemas.microsoft.com/office/drawing/2014/main" id="{BD679E7D-E186-40B2-9295-B28D4D1C1AB3}"/>
+              </a:ext>
+            </a:extLst>
+          </p:cNvPr>
+          <p:cNvSpPr txBox="1"/>
+          <p:nvPr/>
+        </p:nvSpPr>
+        <p:spPr>
+          <a:xfrm>
+            <a:off x="8960224" y="4646412"/>
+            <a:ext cx="2622176" cy="1298090"/>
+          </a:xfrm>
+          <a:prstGeom prst="rect">
+            <a:avLst/>
+          </a:prstGeom>
+          <a:noFill/>
+          <a:ln>
+            <a:solidFill>
+              <a:schemeClr val="accent1">
+                <a:lumMod val="60000"/>
+                <a:lumOff val="40000"/>
+              </a:schemeClr>
+            </a:solidFill>
+          </a:ln>
+        </p:spPr>
+        <p:txBody>
+          <a:bodyPr wrap="square" rtlCol="0">
+            <a:noAutofit/>
+          </a:bodyPr>
+          <a:lstStyle/>
+          <a:p>
+            <a:endParaRPr lang="en-US" dirty="0">
+              <a:solidFill>
+                <a:schemeClr val="accent1">
+                  <a:lumMod val="20000"/>
+                  <a:lumOff val="80000"/>
+                </a:schemeClr>
+              </a:solidFill>
+            </a:endParaRPr>
+          </a:p>
+        </p:txBody>
+      </p:sp>
+      <p:sp>
+        <p:nvSpPr>
+          <p:cNvPr id="129" name="TextBox 128">
+            <a:extLst>
+              <a:ext uri="{FF2B5EF4-FFF2-40B4-BE49-F238E27FC236}">
+                <a16:creationId xmlns:a16="http://schemas.microsoft.com/office/drawing/2014/main" id="{763DB1C5-E708-4E94-8ED4-5B13B4E73F24}"/>
+              </a:ext>
+            </a:extLst>
+          </p:cNvPr>
+          <p:cNvSpPr txBox="1"/>
+          <p:nvPr/>
+        </p:nvSpPr>
+        <p:spPr>
+          <a:xfrm>
+            <a:off x="9074524" y="4747494"/>
+            <a:ext cx="2622176" cy="1298090"/>
+          </a:xfrm>
+          <a:prstGeom prst="rect">
+            <a:avLst/>
+          </a:prstGeom>
+          <a:noFill/>
+          <a:ln>
+            <a:solidFill>
+              <a:schemeClr val="accent1">
+                <a:lumMod val="60000"/>
+                <a:lumOff val="40000"/>
+              </a:schemeClr>
+            </a:solidFill>
+          </a:ln>
+        </p:spPr>
+        <p:txBody>
+          <a:bodyPr wrap="square" rtlCol="0">
+            <a:noAutofit/>
+          </a:bodyPr>
+          <a:lstStyle/>
+          <a:p>
+            <a:endParaRPr lang="en-US" dirty="0">
+              <a:solidFill>
+                <a:schemeClr val="accent1">
+                  <a:lumMod val="20000"/>
+                  <a:lumOff val="80000"/>
+                </a:schemeClr>
+              </a:solidFill>
+            </a:endParaRPr>
+          </a:p>
+        </p:txBody>
+      </p:sp>
+      <p:sp>
+        <p:nvSpPr>
+          <p:cNvPr id="130" name="TextBox 129">
+            <a:extLst>
+              <a:ext uri="{FF2B5EF4-FFF2-40B4-BE49-F238E27FC236}">
+                <a16:creationId xmlns:a16="http://schemas.microsoft.com/office/drawing/2014/main" id="{3C0F30FB-8FC0-47B7-ACB8-3519915B963A}"/>
+              </a:ext>
+            </a:extLst>
+          </p:cNvPr>
+          <p:cNvSpPr txBox="1"/>
+          <p:nvPr/>
+        </p:nvSpPr>
+        <p:spPr>
+          <a:xfrm>
+            <a:off x="9188824" y="4863358"/>
+            <a:ext cx="2622176" cy="1298090"/>
+          </a:xfrm>
+          <a:prstGeom prst="rect">
+            <a:avLst/>
+          </a:prstGeom>
+          <a:noFill/>
+          <a:ln>
+            <a:solidFill>
+              <a:schemeClr val="accent1">
+                <a:lumMod val="60000"/>
+                <a:lumOff val="40000"/>
+              </a:schemeClr>
+            </a:solidFill>
+          </a:ln>
+        </p:spPr>
+        <p:txBody>
+          <a:bodyPr wrap="square" rtlCol="0">
+            <a:noAutofit/>
+          </a:bodyPr>
+          <a:lstStyle/>
+          <a:p>
+            <a:r>
+              <a:rPr lang="en-US" dirty="0">
+                <a:solidFill>
+                  <a:schemeClr val="accent1">
+                    <a:lumMod val="20000"/>
+                    <a:lumOff val="80000"/>
+                  </a:schemeClr>
+                </a:solidFill>
+              </a:rPr>
+              <a:t>Servo Driver</a:t>
+            </a:r>
+          </a:p>
+          <a:p>
+            <a:r>
+              <a:rPr lang="en-US" dirty="0">
+                <a:solidFill>
+                  <a:schemeClr val="accent1">
+                    <a:lumMod val="20000"/>
+                    <a:lumOff val="80000"/>
+                  </a:schemeClr>
+                </a:solidFill>
+              </a:rPr>
+              <a:t>(smoothing etc.</a:t>
+            </a:r>
+          </a:p>
+          <a:p>
+            <a:r>
+              <a:rPr lang="en-US" dirty="0">
+                <a:solidFill>
+                  <a:schemeClr val="accent1">
+                    <a:lumMod val="20000"/>
+                    <a:lumOff val="80000"/>
+                  </a:schemeClr>
+                </a:solidFill>
+              </a:rPr>
+              <a:t>included)</a:t>
+            </a:r>
+          </a:p>
+        </p:txBody>
+      </p:sp>
+      <p:sp>
+        <p:nvSpPr>
+          <p:cNvPr id="131" name="TextBox 130">
+            <a:extLst>
+              <a:ext uri="{FF2B5EF4-FFF2-40B4-BE49-F238E27FC236}">
+                <a16:creationId xmlns:a16="http://schemas.microsoft.com/office/drawing/2014/main" id="{EE674B17-F606-42D3-9BC7-BC6D94116CDB}"/>
+              </a:ext>
+            </a:extLst>
+          </p:cNvPr>
+          <p:cNvSpPr txBox="1"/>
+          <p:nvPr/>
+        </p:nvSpPr>
+        <p:spPr>
+          <a:xfrm>
+            <a:off x="9639300" y="3105833"/>
+            <a:ext cx="1714500" cy="646331"/>
+          </a:xfrm>
+          <a:prstGeom prst="rect">
+            <a:avLst/>
+          </a:prstGeom>
+          <a:noFill/>
+          <a:ln>
+            <a:solidFill>
+              <a:schemeClr val="accent1">
+                <a:lumMod val="60000"/>
+                <a:lumOff val="40000"/>
+              </a:schemeClr>
             </a:solidFill>
           </a:ln>
         </p:spPr>
@@ -13893,36 +14279,338 @@
           <a:lstStyle/>
           <a:p>
             <a:r>
-              <a:rPr lang="en-US" dirty="0"/>
-              <a:t>Status Indicators &amp; Debug GPIOs</a:t>
+              <a:rPr lang="en-US" dirty="0">
+                <a:solidFill>
+                  <a:schemeClr val="accent1">
+                    <a:lumMod val="20000"/>
+                    <a:lumOff val="80000"/>
+                  </a:schemeClr>
+                </a:solidFill>
+              </a:rPr>
+              <a:t>Inverse Kinematics (opt)</a:t>
             </a:r>
           </a:p>
         </p:txBody>
       </p:sp>
       <p:cxnSp>
         <p:nvCxnSpPr>
-          <p:cNvPr id="122" name="Connector: Elbow 121">
-            <a:extLst>
-              <a:ext uri="{FF2B5EF4-FFF2-40B4-BE49-F238E27FC236}">
-                <a16:creationId xmlns:a16="http://schemas.microsoft.com/office/drawing/2014/main" id="{CE33AD4B-8FF0-4C2D-8371-C14D73193802}"/>
+          <p:cNvPr id="133" name="Straight Arrow Connector 132">
+            <a:extLst>
+              <a:ext uri="{FF2B5EF4-FFF2-40B4-BE49-F238E27FC236}">
+                <a16:creationId xmlns:a16="http://schemas.microsoft.com/office/drawing/2014/main" id="{499678DD-72AB-4CA2-8671-2F59582343EC}"/>
               </a:ext>
             </a:extLst>
           </p:cNvPr>
           <p:cNvCxnSpPr>
-            <a:stCxn id="9" idx="3"/>
-            <a:endCxn id="120" idx="0"/>
+            <a:stCxn id="11" idx="3"/>
+            <a:endCxn id="131" idx="1"/>
           </p:cNvCxnSpPr>
           <p:nvPr/>
         </p:nvCxnSpPr>
         <p:spPr>
-          <a:xfrm>
-            <a:off x="6667500" y="4666566"/>
-            <a:ext cx="382905" cy="859300"/>
-          </a:xfrm>
-          <a:prstGeom prst="bentConnector2">
+          <a:xfrm flipV="1">
+            <a:off x="9296400" y="3428999"/>
+            <a:ext cx="342900" cy="2"/>
+          </a:xfrm>
+          <a:prstGeom prst="straightConnector1">
             <a:avLst/>
           </a:prstGeom>
           <a:ln>
+            <a:solidFill>
+              <a:schemeClr val="accent1">
+                <a:lumMod val="60000"/>
+                <a:lumOff val="40000"/>
+              </a:schemeClr>
+            </a:solidFill>
+            <a:headEnd type="triangle"/>
+            <a:tailEnd type="triangle"/>
+          </a:ln>
+        </p:spPr>
+        <p:style>
+          <a:lnRef idx="1">
+            <a:schemeClr val="accent1"/>
+          </a:lnRef>
+          <a:fillRef idx="0">
+            <a:schemeClr val="accent1"/>
+          </a:fillRef>
+          <a:effectRef idx="0">
+            <a:schemeClr val="accent1"/>
+          </a:effectRef>
+          <a:fontRef idx="minor">
+            <a:schemeClr val="tx1"/>
+          </a:fontRef>
+        </p:style>
+      </p:cxnSp>
+      <p:cxnSp>
+        <p:nvCxnSpPr>
+          <p:cNvPr id="135" name="Connector: Elbow 134">
+            <a:extLst>
+              <a:ext uri="{FF2B5EF4-FFF2-40B4-BE49-F238E27FC236}">
+                <a16:creationId xmlns:a16="http://schemas.microsoft.com/office/drawing/2014/main" id="{78DF9FC0-A69F-405A-9826-928C2E720A35}"/>
+              </a:ext>
+            </a:extLst>
+          </p:cNvPr>
+          <p:cNvCxnSpPr>
+            <a:stCxn id="131" idx="0"/>
+            <a:endCxn id="125" idx="2"/>
+          </p:cNvCxnSpPr>
+          <p:nvPr/>
+        </p:nvCxnSpPr>
+        <p:spPr>
+          <a:xfrm rot="16200000" flipV="1">
+            <a:off x="9665893" y="2275176"/>
+            <a:ext cx="852922" cy="808392"/>
+          </a:xfrm>
+          <a:prstGeom prst="bentConnector3">
+            <a:avLst/>
+          </a:prstGeom>
+          <a:ln>
+            <a:solidFill>
+              <a:schemeClr val="accent1">
+                <a:lumMod val="60000"/>
+                <a:lumOff val="40000"/>
+              </a:schemeClr>
+            </a:solidFill>
+            <a:tailEnd type="triangle"/>
+          </a:ln>
+        </p:spPr>
+        <p:style>
+          <a:lnRef idx="1">
+            <a:schemeClr val="accent1"/>
+          </a:lnRef>
+          <a:fillRef idx="0">
+            <a:schemeClr val="accent1"/>
+          </a:fillRef>
+          <a:effectRef idx="0">
+            <a:schemeClr val="accent1"/>
+          </a:effectRef>
+          <a:fontRef idx="minor">
+            <a:schemeClr val="tx1"/>
+          </a:fontRef>
+        </p:style>
+      </p:cxnSp>
+      <p:cxnSp>
+        <p:nvCxnSpPr>
+          <p:cNvPr id="141" name="Connector: Elbow 140">
+            <a:extLst>
+              <a:ext uri="{FF2B5EF4-FFF2-40B4-BE49-F238E27FC236}">
+                <a16:creationId xmlns:a16="http://schemas.microsoft.com/office/drawing/2014/main" id="{2946BB67-7982-42C3-B808-6A97BE23269C}"/>
+              </a:ext>
+            </a:extLst>
+          </p:cNvPr>
+          <p:cNvCxnSpPr>
+            <a:cxnSpLocks/>
+            <a:stCxn id="131" idx="0"/>
+          </p:cNvCxnSpPr>
+          <p:nvPr/>
+        </p:nvCxnSpPr>
+        <p:spPr>
+          <a:xfrm rot="16200000" flipV="1">
+            <a:off x="9594251" y="2203534"/>
+            <a:ext cx="947350" cy="857248"/>
+          </a:xfrm>
+          <a:prstGeom prst="bentConnector3">
+            <a:avLst/>
+          </a:prstGeom>
+          <a:ln>
+            <a:solidFill>
+              <a:schemeClr val="accent1">
+                <a:lumMod val="60000"/>
+                <a:lumOff val="40000"/>
+              </a:schemeClr>
+            </a:solidFill>
+            <a:tailEnd type="triangle"/>
+          </a:ln>
+        </p:spPr>
+        <p:style>
+          <a:lnRef idx="1">
+            <a:schemeClr val="accent1"/>
+          </a:lnRef>
+          <a:fillRef idx="0">
+            <a:schemeClr val="accent1"/>
+          </a:fillRef>
+          <a:effectRef idx="0">
+            <a:schemeClr val="accent1"/>
+          </a:effectRef>
+          <a:fontRef idx="minor">
+            <a:schemeClr val="tx1"/>
+          </a:fontRef>
+        </p:style>
+      </p:cxnSp>
+      <p:cxnSp>
+        <p:nvCxnSpPr>
+          <p:cNvPr id="145" name="Connector: Elbow 144">
+            <a:extLst>
+              <a:ext uri="{FF2B5EF4-FFF2-40B4-BE49-F238E27FC236}">
+                <a16:creationId xmlns:a16="http://schemas.microsoft.com/office/drawing/2014/main" id="{AB8E9E8C-A231-453E-A812-9605D329E68E}"/>
+              </a:ext>
+            </a:extLst>
+          </p:cNvPr>
+          <p:cNvCxnSpPr>
+            <a:cxnSpLocks/>
+            <a:stCxn id="131" idx="0"/>
+          </p:cNvCxnSpPr>
+          <p:nvPr/>
+        </p:nvCxnSpPr>
+        <p:spPr>
+          <a:xfrm rot="16200000" flipV="1">
+            <a:off x="9515135" y="2124418"/>
+            <a:ext cx="1048432" cy="914398"/>
+          </a:xfrm>
+          <a:prstGeom prst="bentConnector3">
+            <a:avLst/>
+          </a:prstGeom>
+          <a:ln>
+            <a:solidFill>
+              <a:schemeClr val="accent1">
+                <a:lumMod val="60000"/>
+                <a:lumOff val="40000"/>
+              </a:schemeClr>
+            </a:solidFill>
+            <a:tailEnd type="triangle"/>
+          </a:ln>
+        </p:spPr>
+        <p:style>
+          <a:lnRef idx="1">
+            <a:schemeClr val="accent1"/>
+          </a:lnRef>
+          <a:fillRef idx="0">
+            <a:schemeClr val="accent1"/>
+          </a:fillRef>
+          <a:effectRef idx="0">
+            <a:schemeClr val="accent1"/>
+          </a:effectRef>
+          <a:fontRef idx="minor">
+            <a:schemeClr val="tx1"/>
+          </a:fontRef>
+        </p:style>
+      </p:cxnSp>
+      <p:cxnSp>
+        <p:nvCxnSpPr>
+          <p:cNvPr id="151" name="Connector: Elbow 150">
+            <a:extLst>
+              <a:ext uri="{FF2B5EF4-FFF2-40B4-BE49-F238E27FC236}">
+                <a16:creationId xmlns:a16="http://schemas.microsoft.com/office/drawing/2014/main" id="{0E491CAE-232E-42D5-ABD7-0F06EAB465E9}"/>
+              </a:ext>
+            </a:extLst>
+          </p:cNvPr>
+          <p:cNvCxnSpPr>
+            <a:stCxn id="131" idx="2"/>
+            <a:endCxn id="128" idx="0"/>
+          </p:cNvCxnSpPr>
+          <p:nvPr/>
+        </p:nvCxnSpPr>
+        <p:spPr>
+          <a:xfrm rot="5400000">
+            <a:off x="9936807" y="4086669"/>
+            <a:ext cx="894248" cy="225238"/>
+          </a:xfrm>
+          <a:prstGeom prst="bentConnector3">
+            <a:avLst/>
+          </a:prstGeom>
+          <a:ln>
+            <a:solidFill>
+              <a:schemeClr val="accent1">
+                <a:lumMod val="60000"/>
+                <a:lumOff val="40000"/>
+              </a:schemeClr>
+            </a:solidFill>
+            <a:tailEnd type="triangle"/>
+          </a:ln>
+        </p:spPr>
+        <p:style>
+          <a:lnRef idx="1">
+            <a:schemeClr val="accent1"/>
+          </a:lnRef>
+          <a:fillRef idx="0">
+            <a:schemeClr val="accent1"/>
+          </a:fillRef>
+          <a:effectRef idx="0">
+            <a:schemeClr val="accent1"/>
+          </a:effectRef>
+          <a:fontRef idx="minor">
+            <a:schemeClr val="tx1"/>
+          </a:fontRef>
+        </p:style>
+      </p:cxnSp>
+      <p:cxnSp>
+        <p:nvCxnSpPr>
+          <p:cNvPr id="153" name="Connector: Elbow 152">
+            <a:extLst>
+              <a:ext uri="{FF2B5EF4-FFF2-40B4-BE49-F238E27FC236}">
+                <a16:creationId xmlns:a16="http://schemas.microsoft.com/office/drawing/2014/main" id="{111D75ED-96B9-4C54-80F1-7994D9A458DE}"/>
+              </a:ext>
+            </a:extLst>
+          </p:cNvPr>
+          <p:cNvCxnSpPr>
+            <a:stCxn id="131" idx="2"/>
+            <a:endCxn id="129" idx="0"/>
+          </p:cNvCxnSpPr>
+          <p:nvPr/>
+        </p:nvCxnSpPr>
+        <p:spPr>
+          <a:xfrm rot="5400000">
+            <a:off x="9943416" y="4194360"/>
+            <a:ext cx="995330" cy="110938"/>
+          </a:xfrm>
+          <a:prstGeom prst="bentConnector3">
+            <a:avLst/>
+          </a:prstGeom>
+          <a:ln>
+            <a:solidFill>
+              <a:schemeClr val="accent1">
+                <a:lumMod val="60000"/>
+                <a:lumOff val="40000"/>
+              </a:schemeClr>
+            </a:solidFill>
+            <a:tailEnd type="triangle"/>
+          </a:ln>
+        </p:spPr>
+        <p:style>
+          <a:lnRef idx="1">
+            <a:schemeClr val="accent1"/>
+          </a:lnRef>
+          <a:fillRef idx="0">
+            <a:schemeClr val="accent1"/>
+          </a:fillRef>
+          <a:effectRef idx="0">
+            <a:schemeClr val="accent1"/>
+          </a:effectRef>
+          <a:fontRef idx="minor">
+            <a:schemeClr val="tx1"/>
+          </a:fontRef>
+        </p:style>
+      </p:cxnSp>
+      <p:cxnSp>
+        <p:nvCxnSpPr>
+          <p:cNvPr id="155" name="Connector: Elbow 154">
+            <a:extLst>
+              <a:ext uri="{FF2B5EF4-FFF2-40B4-BE49-F238E27FC236}">
+                <a16:creationId xmlns:a16="http://schemas.microsoft.com/office/drawing/2014/main" id="{1ADFA978-5847-4F00-83CA-B046638D8F1A}"/>
+              </a:ext>
+            </a:extLst>
+          </p:cNvPr>
+          <p:cNvCxnSpPr>
+            <a:stCxn id="131" idx="2"/>
+            <a:endCxn id="130" idx="0"/>
+          </p:cNvCxnSpPr>
+          <p:nvPr/>
+        </p:nvCxnSpPr>
+        <p:spPr>
+          <a:xfrm rot="16200000" flipH="1">
+            <a:off x="9942634" y="4306080"/>
+            <a:ext cx="1111194" cy="3362"/>
+          </a:xfrm>
+          <a:prstGeom prst="bentConnector3">
+            <a:avLst/>
+          </a:prstGeom>
+          <a:ln>
+            <a:solidFill>
+              <a:schemeClr val="accent1">
+                <a:lumMod val="60000"/>
+                <a:lumOff val="40000"/>
+              </a:schemeClr>
+            </a:solidFill>
             <a:tailEnd type="triangle"/>
           </a:ln>
         </p:spPr>
@@ -13943,10 +14631,10 @@
       </p:cxnSp>
       <p:sp>
         <p:nvSpPr>
-          <p:cNvPr id="123" name="TextBox 122">
-            <a:extLst>
-              <a:ext uri="{FF2B5EF4-FFF2-40B4-BE49-F238E27FC236}">
-                <a16:creationId xmlns:a16="http://schemas.microsoft.com/office/drawing/2014/main" id="{54F4E47A-859B-4158-AEDA-A3870077F1D1}"/>
+          <p:cNvPr id="157" name="TextBox 156">
+            <a:extLst>
+              <a:ext uri="{FF2B5EF4-FFF2-40B4-BE49-F238E27FC236}">
+                <a16:creationId xmlns:a16="http://schemas.microsoft.com/office/drawing/2014/main" id="{3F35F5F5-821C-459E-8CF4-3C1F267C13E1}"/>
               </a:ext>
             </a:extLst>
           </p:cNvPr>
@@ -13955,16 +14643,19 @@
         </p:nvSpPr>
         <p:spPr>
           <a:xfrm>
-            <a:off x="8153400" y="1011534"/>
-            <a:ext cx="2622176" cy="1045866"/>
+            <a:off x="4267200" y="685800"/>
+            <a:ext cx="3657600" cy="1600200"/>
           </a:xfrm>
           <a:prstGeom prst="rect">
             <a:avLst/>
           </a:prstGeom>
           <a:noFill/>
-          <a:ln>
+          <a:ln w="19050">
             <a:solidFill>
-              <a:schemeClr val="tx2"/>
+              <a:schemeClr val="accent1">
+                <a:lumMod val="60000"/>
+                <a:lumOff val="40000"/>
+              </a:schemeClr>
             </a:solidFill>
           </a:ln>
         </p:spPr>
@@ -13974,16 +14665,76 @@
           </a:bodyPr>
           <a:lstStyle/>
           <a:p>
-            <a:endParaRPr lang="en-US" dirty="0"/>
+            <a:r>
+              <a:rPr lang="en-US" dirty="0">
+                <a:solidFill>
+                  <a:schemeClr val="accent1">
+                    <a:lumMod val="20000"/>
+                    <a:lumOff val="80000"/>
+                  </a:schemeClr>
+                </a:solidFill>
+              </a:rPr>
+              <a:t>Soil Science System</a:t>
+            </a:r>
           </a:p>
         </p:txBody>
       </p:sp>
+      <p:cxnSp>
+        <p:nvCxnSpPr>
+          <p:cNvPr id="159" name="Connector: Elbow 158">
+            <a:extLst>
+              <a:ext uri="{FF2B5EF4-FFF2-40B4-BE49-F238E27FC236}">
+                <a16:creationId xmlns:a16="http://schemas.microsoft.com/office/drawing/2014/main" id="{8D0556B9-E26D-4D06-9E45-C6408F6B6734}"/>
+              </a:ext>
+            </a:extLst>
+          </p:cNvPr>
+          <p:cNvCxnSpPr>
+            <a:cxnSpLocks/>
+            <a:stCxn id="74" idx="2"/>
+            <a:endCxn id="9" idx="3"/>
+          </p:cNvCxnSpPr>
+          <p:nvPr/>
+        </p:nvCxnSpPr>
+        <p:spPr>
+          <a:xfrm rot="5400000">
+            <a:off x="5820117" y="3133383"/>
+            <a:ext cx="2380566" cy="685800"/>
+          </a:xfrm>
+          <a:prstGeom prst="bentConnector2">
+            <a:avLst/>
+          </a:prstGeom>
+          <a:ln>
+            <a:solidFill>
+              <a:schemeClr val="accent1">
+                <a:lumMod val="60000"/>
+                <a:lumOff val="40000"/>
+              </a:schemeClr>
+            </a:solidFill>
+            <a:headEnd type="triangle"/>
+            <a:tailEnd type="triangle"/>
+          </a:ln>
+        </p:spPr>
+        <p:style>
+          <a:lnRef idx="1">
+            <a:schemeClr val="accent1"/>
+          </a:lnRef>
+          <a:fillRef idx="0">
+            <a:schemeClr val="accent1"/>
+          </a:fillRef>
+          <a:effectRef idx="0">
+            <a:schemeClr val="accent1"/>
+          </a:effectRef>
+          <a:fontRef idx="minor">
+            <a:schemeClr val="tx1"/>
+          </a:fontRef>
+        </p:style>
+      </p:cxnSp>
       <p:sp>
         <p:nvSpPr>
-          <p:cNvPr id="124" name="TextBox 123">
-            <a:extLst>
-              <a:ext uri="{FF2B5EF4-FFF2-40B4-BE49-F238E27FC236}">
-                <a16:creationId xmlns:a16="http://schemas.microsoft.com/office/drawing/2014/main" id="{B891E5F0-F377-4F88-AF08-3CCA03030FE4}"/>
+          <p:cNvPr id="74" name="TextBox 73">
+            <a:extLst>
+              <a:ext uri="{FF2B5EF4-FFF2-40B4-BE49-F238E27FC236}">
+                <a16:creationId xmlns:a16="http://schemas.microsoft.com/office/drawing/2014/main" id="{D23C4869-5198-4AAC-9D5A-7AC6104F8F98}"/>
               </a:ext>
             </a:extLst>
           </p:cNvPr>
@@ -13992,8 +14743,8 @@
         </p:nvSpPr>
         <p:spPr>
           <a:xfrm>
-            <a:off x="8251116" y="1114945"/>
-            <a:ext cx="2622176" cy="1045866"/>
+            <a:off x="6781800" y="1600200"/>
+            <a:ext cx="1143000" cy="685800"/>
           </a:xfrm>
           <a:prstGeom prst="rect">
             <a:avLst/>
@@ -14001,7 +14752,10 @@
           <a:noFill/>
           <a:ln>
             <a:solidFill>
-              <a:schemeClr val="tx2"/>
+              <a:schemeClr val="accent1">
+                <a:lumMod val="60000"/>
+                <a:lumOff val="40000"/>
+              </a:schemeClr>
             </a:solidFill>
           </a:ln>
         </p:spPr>
@@ -14011,16 +14765,26 @@
           </a:bodyPr>
           <a:lstStyle/>
           <a:p>
-            <a:endParaRPr lang="en-US" dirty="0"/>
+            <a:r>
+              <a:rPr lang="en-US" dirty="0">
+                <a:solidFill>
+                  <a:schemeClr val="accent1">
+                    <a:lumMod val="20000"/>
+                    <a:lumOff val="80000"/>
+                  </a:schemeClr>
+                </a:solidFill>
+              </a:rPr>
+              <a:t>ROS Interface</a:t>
+            </a:r>
           </a:p>
         </p:txBody>
       </p:sp>
       <p:sp>
         <p:nvSpPr>
-          <p:cNvPr id="125" name="TextBox 124">
-            <a:extLst>
-              <a:ext uri="{FF2B5EF4-FFF2-40B4-BE49-F238E27FC236}">
-                <a16:creationId xmlns:a16="http://schemas.microsoft.com/office/drawing/2014/main" id="{B48602C8-E8C1-479A-AD19-FAB589F086BA}"/>
+          <p:cNvPr id="78" name="TextBox 77">
+            <a:extLst>
+              <a:ext uri="{FF2B5EF4-FFF2-40B4-BE49-F238E27FC236}">
+                <a16:creationId xmlns:a16="http://schemas.microsoft.com/office/drawing/2014/main" id="{D23C4869-5198-4AAC-9D5A-7AC6104F8F98}"/>
               </a:ext>
             </a:extLst>
           </p:cNvPr>
@@ -14029,8 +14793,8 @@
         </p:nvSpPr>
         <p:spPr>
           <a:xfrm>
-            <a:off x="8377070" y="1207045"/>
-            <a:ext cx="2622176" cy="1045866"/>
+            <a:off x="4381500" y="1143000"/>
+            <a:ext cx="2171700" cy="971550"/>
           </a:xfrm>
           <a:prstGeom prst="rect">
             <a:avLst/>
@@ -14038,7 +14802,10 @@
           <a:noFill/>
           <a:ln>
             <a:solidFill>
-              <a:schemeClr val="tx2"/>
+              <a:schemeClr val="accent1">
+                <a:lumMod val="60000"/>
+                <a:lumOff val="40000"/>
+              </a:schemeClr>
             </a:solidFill>
           </a:ln>
         </p:spPr>
@@ -14049,636 +14816,14 @@
           <a:lstStyle/>
           <a:p>
             <a:r>
-              <a:rPr lang="en-US" dirty="0"/>
-              <a:t>Linear Actuator Driver</a:t>
-            </a:r>
-          </a:p>
-        </p:txBody>
-      </p:sp>
-      <p:sp>
-        <p:nvSpPr>
-          <p:cNvPr id="128" name="TextBox 127">
-            <a:extLst>
-              <a:ext uri="{FF2B5EF4-FFF2-40B4-BE49-F238E27FC236}">
-                <a16:creationId xmlns:a16="http://schemas.microsoft.com/office/drawing/2014/main" id="{BD679E7D-E186-40B2-9295-B28D4D1C1AB3}"/>
-              </a:ext>
-            </a:extLst>
-          </p:cNvPr>
-          <p:cNvSpPr txBox="1"/>
-          <p:nvPr/>
-        </p:nvSpPr>
-        <p:spPr>
-          <a:xfrm>
-            <a:off x="8960224" y="4646412"/>
-            <a:ext cx="2622176" cy="1298090"/>
-          </a:xfrm>
-          <a:prstGeom prst="rect">
-            <a:avLst/>
-          </a:prstGeom>
-          <a:noFill/>
-          <a:ln>
-            <a:solidFill>
-              <a:schemeClr val="tx2"/>
-            </a:solidFill>
-          </a:ln>
-        </p:spPr>
-        <p:txBody>
-          <a:bodyPr wrap="square" rtlCol="0">
-            <a:noAutofit/>
-          </a:bodyPr>
-          <a:lstStyle/>
-          <a:p>
-            <a:endParaRPr lang="en-US" dirty="0"/>
-          </a:p>
-        </p:txBody>
-      </p:sp>
-      <p:sp>
-        <p:nvSpPr>
-          <p:cNvPr id="129" name="TextBox 128">
-            <a:extLst>
-              <a:ext uri="{FF2B5EF4-FFF2-40B4-BE49-F238E27FC236}">
-                <a16:creationId xmlns:a16="http://schemas.microsoft.com/office/drawing/2014/main" id="{763DB1C5-E708-4E94-8ED4-5B13B4E73F24}"/>
-              </a:ext>
-            </a:extLst>
-          </p:cNvPr>
-          <p:cNvSpPr txBox="1"/>
-          <p:nvPr/>
-        </p:nvSpPr>
-        <p:spPr>
-          <a:xfrm>
-            <a:off x="9074524" y="4747494"/>
-            <a:ext cx="2622176" cy="1298090"/>
-          </a:xfrm>
-          <a:prstGeom prst="rect">
-            <a:avLst/>
-          </a:prstGeom>
-          <a:noFill/>
-          <a:ln>
-            <a:solidFill>
-              <a:schemeClr val="tx2"/>
-            </a:solidFill>
-          </a:ln>
-        </p:spPr>
-        <p:txBody>
-          <a:bodyPr wrap="square" rtlCol="0">
-            <a:noAutofit/>
-          </a:bodyPr>
-          <a:lstStyle/>
-          <a:p>
-            <a:endParaRPr lang="en-US" dirty="0"/>
-          </a:p>
-        </p:txBody>
-      </p:sp>
-      <p:sp>
-        <p:nvSpPr>
-          <p:cNvPr id="130" name="TextBox 129">
-            <a:extLst>
-              <a:ext uri="{FF2B5EF4-FFF2-40B4-BE49-F238E27FC236}">
-                <a16:creationId xmlns:a16="http://schemas.microsoft.com/office/drawing/2014/main" id="{3C0F30FB-8FC0-47B7-ACB8-3519915B963A}"/>
-              </a:ext>
-            </a:extLst>
-          </p:cNvPr>
-          <p:cNvSpPr txBox="1"/>
-          <p:nvPr/>
-        </p:nvSpPr>
-        <p:spPr>
-          <a:xfrm>
-            <a:off x="9188824" y="4863358"/>
-            <a:ext cx="2622176" cy="1298090"/>
-          </a:xfrm>
-          <a:prstGeom prst="rect">
-            <a:avLst/>
-          </a:prstGeom>
-          <a:noFill/>
-          <a:ln>
-            <a:solidFill>
-              <a:schemeClr val="tx2"/>
-            </a:solidFill>
-          </a:ln>
-        </p:spPr>
-        <p:txBody>
-          <a:bodyPr wrap="square" rtlCol="0">
-            <a:noAutofit/>
-          </a:bodyPr>
-          <a:lstStyle/>
-          <a:p>
-            <a:r>
-              <a:rPr lang="en-US" dirty="0"/>
-              <a:t>Servo Driver</a:t>
-            </a:r>
-          </a:p>
-          <a:p>
-            <a:r>
-              <a:rPr lang="en-US" dirty="0"/>
-              <a:t>(smoothing etc.</a:t>
-            </a:r>
-          </a:p>
-          <a:p>
-            <a:r>
-              <a:rPr lang="en-US" dirty="0"/>
-              <a:t>included)</a:t>
-            </a:r>
-          </a:p>
-        </p:txBody>
-      </p:sp>
-      <p:sp>
-        <p:nvSpPr>
-          <p:cNvPr id="131" name="TextBox 130">
-            <a:extLst>
-              <a:ext uri="{FF2B5EF4-FFF2-40B4-BE49-F238E27FC236}">
-                <a16:creationId xmlns:a16="http://schemas.microsoft.com/office/drawing/2014/main" id="{EE674B17-F606-42D3-9BC7-BC6D94116CDB}"/>
-              </a:ext>
-            </a:extLst>
-          </p:cNvPr>
-          <p:cNvSpPr txBox="1"/>
-          <p:nvPr/>
-        </p:nvSpPr>
-        <p:spPr>
-          <a:xfrm>
-            <a:off x="9639300" y="3105833"/>
-            <a:ext cx="1714500" cy="646331"/>
-          </a:xfrm>
-          <a:prstGeom prst="rect">
-            <a:avLst/>
-          </a:prstGeom>
-          <a:noFill/>
-          <a:ln>
-            <a:solidFill>
-              <a:schemeClr val="tx2"/>
-            </a:solidFill>
-          </a:ln>
-        </p:spPr>
-        <p:txBody>
-          <a:bodyPr wrap="square" rtlCol="0">
-            <a:spAutoFit/>
-          </a:bodyPr>
-          <a:lstStyle/>
-          <a:p>
-            <a:r>
-              <a:rPr lang="en-US" dirty="0"/>
-              <a:t>Inverse Kinematics (opt)</a:t>
-            </a:r>
-          </a:p>
-        </p:txBody>
-      </p:sp>
-      <p:cxnSp>
-        <p:nvCxnSpPr>
-          <p:cNvPr id="133" name="Straight Arrow Connector 132">
-            <a:extLst>
-              <a:ext uri="{FF2B5EF4-FFF2-40B4-BE49-F238E27FC236}">
-                <a16:creationId xmlns:a16="http://schemas.microsoft.com/office/drawing/2014/main" id="{499678DD-72AB-4CA2-8671-2F59582343EC}"/>
-              </a:ext>
-            </a:extLst>
-          </p:cNvPr>
-          <p:cNvCxnSpPr>
-            <a:stCxn id="11" idx="3"/>
-            <a:endCxn id="131" idx="1"/>
-          </p:cNvCxnSpPr>
-          <p:nvPr/>
-        </p:nvCxnSpPr>
-        <p:spPr>
-          <a:xfrm flipV="1">
-            <a:off x="9296400" y="3428999"/>
-            <a:ext cx="342900" cy="2"/>
-          </a:xfrm>
-          <a:prstGeom prst="straightConnector1">
-            <a:avLst/>
-          </a:prstGeom>
-          <a:ln>
-            <a:headEnd type="triangle"/>
-            <a:tailEnd type="triangle"/>
-          </a:ln>
-        </p:spPr>
-        <p:style>
-          <a:lnRef idx="1">
-            <a:schemeClr val="accent1"/>
-          </a:lnRef>
-          <a:fillRef idx="0">
-            <a:schemeClr val="accent1"/>
-          </a:fillRef>
-          <a:effectRef idx="0">
-            <a:schemeClr val="accent1"/>
-          </a:effectRef>
-          <a:fontRef idx="minor">
-            <a:schemeClr val="tx1"/>
-          </a:fontRef>
-        </p:style>
-      </p:cxnSp>
-      <p:cxnSp>
-        <p:nvCxnSpPr>
-          <p:cNvPr id="135" name="Connector: Elbow 134">
-            <a:extLst>
-              <a:ext uri="{FF2B5EF4-FFF2-40B4-BE49-F238E27FC236}">
-                <a16:creationId xmlns:a16="http://schemas.microsoft.com/office/drawing/2014/main" id="{78DF9FC0-A69F-405A-9826-928C2E720A35}"/>
-              </a:ext>
-            </a:extLst>
-          </p:cNvPr>
-          <p:cNvCxnSpPr>
-            <a:stCxn id="131" idx="0"/>
-            <a:endCxn id="125" idx="2"/>
-          </p:cNvCxnSpPr>
-          <p:nvPr/>
-        </p:nvCxnSpPr>
-        <p:spPr>
-          <a:xfrm rot="16200000" flipV="1">
-            <a:off x="9665893" y="2275176"/>
-            <a:ext cx="852922" cy="808392"/>
-          </a:xfrm>
-          <a:prstGeom prst="bentConnector3">
-            <a:avLst/>
-          </a:prstGeom>
-          <a:ln>
-            <a:tailEnd type="triangle"/>
-          </a:ln>
-        </p:spPr>
-        <p:style>
-          <a:lnRef idx="1">
-            <a:schemeClr val="accent1"/>
-          </a:lnRef>
-          <a:fillRef idx="0">
-            <a:schemeClr val="accent1"/>
-          </a:fillRef>
-          <a:effectRef idx="0">
-            <a:schemeClr val="accent1"/>
-          </a:effectRef>
-          <a:fontRef idx="minor">
-            <a:schemeClr val="tx1"/>
-          </a:fontRef>
-        </p:style>
-      </p:cxnSp>
-      <p:cxnSp>
-        <p:nvCxnSpPr>
-          <p:cNvPr id="141" name="Connector: Elbow 140">
-            <a:extLst>
-              <a:ext uri="{FF2B5EF4-FFF2-40B4-BE49-F238E27FC236}">
-                <a16:creationId xmlns:a16="http://schemas.microsoft.com/office/drawing/2014/main" id="{2946BB67-7982-42C3-B808-6A97BE23269C}"/>
-              </a:ext>
-            </a:extLst>
-          </p:cNvPr>
-          <p:cNvCxnSpPr>
-            <a:cxnSpLocks/>
-            <a:stCxn id="131" idx="0"/>
-          </p:cNvCxnSpPr>
-          <p:nvPr/>
-        </p:nvCxnSpPr>
-        <p:spPr>
-          <a:xfrm rot="16200000" flipV="1">
-            <a:off x="9594251" y="2203534"/>
-            <a:ext cx="947350" cy="857248"/>
-          </a:xfrm>
-          <a:prstGeom prst="bentConnector3">
-            <a:avLst/>
-          </a:prstGeom>
-          <a:ln>
-            <a:tailEnd type="triangle"/>
-          </a:ln>
-        </p:spPr>
-        <p:style>
-          <a:lnRef idx="1">
-            <a:schemeClr val="accent1"/>
-          </a:lnRef>
-          <a:fillRef idx="0">
-            <a:schemeClr val="accent1"/>
-          </a:fillRef>
-          <a:effectRef idx="0">
-            <a:schemeClr val="accent1"/>
-          </a:effectRef>
-          <a:fontRef idx="minor">
-            <a:schemeClr val="tx1"/>
-          </a:fontRef>
-        </p:style>
-      </p:cxnSp>
-      <p:cxnSp>
-        <p:nvCxnSpPr>
-          <p:cNvPr id="145" name="Connector: Elbow 144">
-            <a:extLst>
-              <a:ext uri="{FF2B5EF4-FFF2-40B4-BE49-F238E27FC236}">
-                <a16:creationId xmlns:a16="http://schemas.microsoft.com/office/drawing/2014/main" id="{AB8E9E8C-A231-453E-A812-9605D329E68E}"/>
-              </a:ext>
-            </a:extLst>
-          </p:cNvPr>
-          <p:cNvCxnSpPr>
-            <a:cxnSpLocks/>
-            <a:stCxn id="131" idx="0"/>
-          </p:cNvCxnSpPr>
-          <p:nvPr/>
-        </p:nvCxnSpPr>
-        <p:spPr>
-          <a:xfrm rot="16200000" flipV="1">
-            <a:off x="9515135" y="2124418"/>
-            <a:ext cx="1048432" cy="914398"/>
-          </a:xfrm>
-          <a:prstGeom prst="bentConnector3">
-            <a:avLst/>
-          </a:prstGeom>
-          <a:ln>
-            <a:tailEnd type="triangle"/>
-          </a:ln>
-        </p:spPr>
-        <p:style>
-          <a:lnRef idx="1">
-            <a:schemeClr val="accent1"/>
-          </a:lnRef>
-          <a:fillRef idx="0">
-            <a:schemeClr val="accent1"/>
-          </a:fillRef>
-          <a:effectRef idx="0">
-            <a:schemeClr val="accent1"/>
-          </a:effectRef>
-          <a:fontRef idx="minor">
-            <a:schemeClr val="tx1"/>
-          </a:fontRef>
-        </p:style>
-      </p:cxnSp>
-      <p:cxnSp>
-        <p:nvCxnSpPr>
-          <p:cNvPr id="151" name="Connector: Elbow 150">
-            <a:extLst>
-              <a:ext uri="{FF2B5EF4-FFF2-40B4-BE49-F238E27FC236}">
-                <a16:creationId xmlns:a16="http://schemas.microsoft.com/office/drawing/2014/main" id="{0E491CAE-232E-42D5-ABD7-0F06EAB465E9}"/>
-              </a:ext>
-            </a:extLst>
-          </p:cNvPr>
-          <p:cNvCxnSpPr>
-            <a:stCxn id="131" idx="2"/>
-            <a:endCxn id="128" idx="0"/>
-          </p:cNvCxnSpPr>
-          <p:nvPr/>
-        </p:nvCxnSpPr>
-        <p:spPr>
-          <a:xfrm rot="5400000">
-            <a:off x="9936807" y="4086669"/>
-            <a:ext cx="894248" cy="225238"/>
-          </a:xfrm>
-          <a:prstGeom prst="bentConnector3">
-            <a:avLst/>
-          </a:prstGeom>
-          <a:ln>
-            <a:tailEnd type="triangle"/>
-          </a:ln>
-        </p:spPr>
-        <p:style>
-          <a:lnRef idx="1">
-            <a:schemeClr val="accent1"/>
-          </a:lnRef>
-          <a:fillRef idx="0">
-            <a:schemeClr val="accent1"/>
-          </a:fillRef>
-          <a:effectRef idx="0">
-            <a:schemeClr val="accent1"/>
-          </a:effectRef>
-          <a:fontRef idx="minor">
-            <a:schemeClr val="tx1"/>
-          </a:fontRef>
-        </p:style>
-      </p:cxnSp>
-      <p:cxnSp>
-        <p:nvCxnSpPr>
-          <p:cNvPr id="153" name="Connector: Elbow 152">
-            <a:extLst>
-              <a:ext uri="{FF2B5EF4-FFF2-40B4-BE49-F238E27FC236}">
-                <a16:creationId xmlns:a16="http://schemas.microsoft.com/office/drawing/2014/main" id="{111D75ED-96B9-4C54-80F1-7994D9A458DE}"/>
-              </a:ext>
-            </a:extLst>
-          </p:cNvPr>
-          <p:cNvCxnSpPr>
-            <a:stCxn id="131" idx="2"/>
-            <a:endCxn id="129" idx="0"/>
-          </p:cNvCxnSpPr>
-          <p:nvPr/>
-        </p:nvCxnSpPr>
-        <p:spPr>
-          <a:xfrm rot="5400000">
-            <a:off x="9943416" y="4194360"/>
-            <a:ext cx="995330" cy="110938"/>
-          </a:xfrm>
-          <a:prstGeom prst="bentConnector3">
-            <a:avLst/>
-          </a:prstGeom>
-          <a:ln>
-            <a:tailEnd type="triangle"/>
-          </a:ln>
-        </p:spPr>
-        <p:style>
-          <a:lnRef idx="1">
-            <a:schemeClr val="accent1"/>
-          </a:lnRef>
-          <a:fillRef idx="0">
-            <a:schemeClr val="accent1"/>
-          </a:fillRef>
-          <a:effectRef idx="0">
-            <a:schemeClr val="accent1"/>
-          </a:effectRef>
-          <a:fontRef idx="minor">
-            <a:schemeClr val="tx1"/>
-          </a:fontRef>
-        </p:style>
-      </p:cxnSp>
-      <p:cxnSp>
-        <p:nvCxnSpPr>
-          <p:cNvPr id="155" name="Connector: Elbow 154">
-            <a:extLst>
-              <a:ext uri="{FF2B5EF4-FFF2-40B4-BE49-F238E27FC236}">
-                <a16:creationId xmlns:a16="http://schemas.microsoft.com/office/drawing/2014/main" id="{1ADFA978-5847-4F00-83CA-B046638D8F1A}"/>
-              </a:ext>
-            </a:extLst>
-          </p:cNvPr>
-          <p:cNvCxnSpPr>
-            <a:stCxn id="131" idx="2"/>
-            <a:endCxn id="130" idx="0"/>
-          </p:cNvCxnSpPr>
-          <p:nvPr/>
-        </p:nvCxnSpPr>
-        <p:spPr>
-          <a:xfrm rot="16200000" flipH="1">
-            <a:off x="9942634" y="4306080"/>
-            <a:ext cx="1111194" cy="3362"/>
-          </a:xfrm>
-          <a:prstGeom prst="bentConnector3">
-            <a:avLst/>
-          </a:prstGeom>
-          <a:ln>
-            <a:tailEnd type="triangle"/>
-          </a:ln>
-        </p:spPr>
-        <p:style>
-          <a:lnRef idx="1">
-            <a:schemeClr val="accent1"/>
-          </a:lnRef>
-          <a:fillRef idx="0">
-            <a:schemeClr val="accent1"/>
-          </a:fillRef>
-          <a:effectRef idx="0">
-            <a:schemeClr val="accent1"/>
-          </a:effectRef>
-          <a:fontRef idx="minor">
-            <a:schemeClr val="tx1"/>
-          </a:fontRef>
-        </p:style>
-      </p:cxnSp>
-      <p:sp>
-        <p:nvSpPr>
-          <p:cNvPr id="157" name="TextBox 156">
-            <a:extLst>
-              <a:ext uri="{FF2B5EF4-FFF2-40B4-BE49-F238E27FC236}">
-                <a16:creationId xmlns:a16="http://schemas.microsoft.com/office/drawing/2014/main" id="{3F35F5F5-821C-459E-8CF4-3C1F267C13E1}"/>
-              </a:ext>
-            </a:extLst>
-          </p:cNvPr>
-          <p:cNvSpPr txBox="1"/>
-          <p:nvPr/>
-        </p:nvSpPr>
-        <p:spPr>
-          <a:xfrm>
-            <a:off x="4267200" y="685800"/>
-            <a:ext cx="3657600" cy="1600200"/>
-          </a:xfrm>
-          <a:prstGeom prst="rect">
-            <a:avLst/>
-          </a:prstGeom>
-          <a:noFill/>
-          <a:ln w="19050">
-            <a:solidFill>
-              <a:schemeClr val="accent1"/>
-            </a:solidFill>
-          </a:ln>
-        </p:spPr>
-        <p:txBody>
-          <a:bodyPr wrap="square" rtlCol="0">
-            <a:noAutofit/>
-          </a:bodyPr>
-          <a:lstStyle/>
-          <a:p>
-            <a:r>
-              <a:rPr lang="en-US" dirty="0"/>
-              <a:t>Soil Science System</a:t>
-            </a:r>
-          </a:p>
-        </p:txBody>
-      </p:sp>
-      <p:cxnSp>
-        <p:nvCxnSpPr>
-          <p:cNvPr id="159" name="Connector: Elbow 158">
-            <a:extLst>
-              <a:ext uri="{FF2B5EF4-FFF2-40B4-BE49-F238E27FC236}">
-                <a16:creationId xmlns:a16="http://schemas.microsoft.com/office/drawing/2014/main" id="{8D0556B9-E26D-4D06-9E45-C6408F6B6734}"/>
-              </a:ext>
-            </a:extLst>
-          </p:cNvPr>
-          <p:cNvCxnSpPr>
-            <a:cxnSpLocks/>
-            <a:stCxn id="74" idx="2"/>
-            <a:endCxn id="9" idx="3"/>
-          </p:cNvCxnSpPr>
-          <p:nvPr/>
-        </p:nvCxnSpPr>
-        <p:spPr>
-          <a:xfrm rot="5400000">
-            <a:off x="5820117" y="3133383"/>
-            <a:ext cx="2380566" cy="685800"/>
-          </a:xfrm>
-          <a:prstGeom prst="bentConnector2">
-            <a:avLst/>
-          </a:prstGeom>
-          <a:ln>
-            <a:headEnd type="triangle"/>
-            <a:tailEnd type="triangle"/>
-          </a:ln>
-        </p:spPr>
-        <p:style>
-          <a:lnRef idx="1">
-            <a:schemeClr val="accent1"/>
-          </a:lnRef>
-          <a:fillRef idx="0">
-            <a:schemeClr val="accent1"/>
-          </a:fillRef>
-          <a:effectRef idx="0">
-            <a:schemeClr val="accent1"/>
-          </a:effectRef>
-          <a:fontRef idx="minor">
-            <a:schemeClr val="tx1"/>
-          </a:fontRef>
-        </p:style>
-      </p:cxnSp>
-      <p:sp>
-        <p:nvSpPr>
-          <p:cNvPr id="74" name="TextBox 73">
-            <a:extLst>
-              <a:ext uri="{FF2B5EF4-FFF2-40B4-BE49-F238E27FC236}">
-                <a16:creationId xmlns:a16="http://schemas.microsoft.com/office/drawing/2014/main" id="{D23C4869-5198-4AAC-9D5A-7AC6104F8F98}"/>
-              </a:ext>
-            </a:extLst>
-          </p:cNvPr>
-          <p:cNvSpPr txBox="1"/>
-          <p:nvPr/>
-        </p:nvSpPr>
-        <p:spPr>
-          <a:xfrm>
-            <a:off x="6781800" y="1600200"/>
-            <a:ext cx="1143000" cy="685800"/>
-          </a:xfrm>
-          <a:prstGeom prst="rect">
-            <a:avLst/>
-          </a:prstGeom>
-          <a:noFill/>
-          <a:ln>
-            <a:solidFill>
-              <a:schemeClr val="tx2"/>
-            </a:solidFill>
-          </a:ln>
-        </p:spPr>
-        <p:txBody>
-          <a:bodyPr wrap="square" rtlCol="0">
-            <a:noAutofit/>
-          </a:bodyPr>
-          <a:lstStyle/>
-          <a:p>
-            <a:r>
-              <a:rPr lang="en-US" dirty="0" err="1"/>
-              <a:t>Comms</a:t>
-            </a:r>
-            <a:r>
-              <a:rPr lang="en-US" dirty="0"/>
-              <a:t>. Interface</a:t>
-            </a:r>
-          </a:p>
-        </p:txBody>
-      </p:sp>
-      <p:sp>
-        <p:nvSpPr>
-          <p:cNvPr id="78" name="TextBox 77">
-            <a:extLst>
-              <a:ext uri="{FF2B5EF4-FFF2-40B4-BE49-F238E27FC236}">
-                <a16:creationId xmlns:a16="http://schemas.microsoft.com/office/drawing/2014/main" id="{D23C4869-5198-4AAC-9D5A-7AC6104F8F98}"/>
-              </a:ext>
-            </a:extLst>
-          </p:cNvPr>
-          <p:cNvSpPr txBox="1"/>
-          <p:nvPr/>
-        </p:nvSpPr>
-        <p:spPr>
-          <a:xfrm>
-            <a:off x="4381500" y="1143000"/>
-            <a:ext cx="2171700" cy="971550"/>
-          </a:xfrm>
-          <a:prstGeom prst="rect">
-            <a:avLst/>
-          </a:prstGeom>
-          <a:noFill/>
-          <a:ln>
-            <a:solidFill>
-              <a:schemeClr val="tx2"/>
-            </a:solidFill>
-          </a:ln>
-        </p:spPr>
-        <p:txBody>
-          <a:bodyPr wrap="square" rtlCol="0">
-            <a:noAutofit/>
-          </a:bodyPr>
-          <a:lstStyle/>
-          <a:p>
-            <a:r>
-              <a:rPr lang="en-US" dirty="0"/>
+              <a:rPr lang="en-US" dirty="0">
+                <a:solidFill>
+                  <a:schemeClr val="accent1">
+                    <a:lumMod val="20000"/>
+                    <a:lumOff val="80000"/>
+                  </a:schemeClr>
+                </a:solidFill>
+              </a:rPr>
               <a:t>Controller</a:t>
             </a:r>
           </a:p>
@@ -14689,7 +14834,14 @@
               </a:tabLst>
             </a:pPr>
             <a:r>
-              <a:rPr lang="en-US" dirty="0"/>
+              <a:rPr lang="en-US" dirty="0">
+                <a:solidFill>
+                  <a:schemeClr val="accent1">
+                    <a:lumMod val="20000"/>
+                    <a:lumOff val="80000"/>
+                  </a:schemeClr>
+                </a:solidFill>
+              </a:rPr>
               <a:t>	Collection</a:t>
             </a:r>
           </a:p>
@@ -14700,7 +14852,14 @@
               </a:tabLst>
             </a:pPr>
             <a:r>
-              <a:rPr lang="en-US" dirty="0"/>
+              <a:rPr lang="en-US" dirty="0">
+                <a:solidFill>
+                  <a:schemeClr val="accent1">
+                    <a:lumMod val="20000"/>
+                    <a:lumOff val="80000"/>
+                  </a:schemeClr>
+                </a:solidFill>
+              </a:rPr>
               <a:t>	Sensors</a:t>
             </a:r>
           </a:p>
@@ -14729,6 +14888,12 @@
             <a:avLst/>
           </a:prstGeom>
           <a:ln>
+            <a:solidFill>
+              <a:schemeClr val="accent1">
+                <a:lumMod val="60000"/>
+                <a:lumOff val="40000"/>
+              </a:schemeClr>
+            </a:solidFill>
             <a:headEnd type="none"/>
             <a:tailEnd type="triangle"/>
           </a:ln>
@@ -14771,6 +14936,12 @@
             <a:avLst/>
           </a:prstGeom>
           <a:ln>
+            <a:solidFill>
+              <a:schemeClr val="accent1">
+                <a:lumMod val="60000"/>
+                <a:lumOff val="40000"/>
+              </a:schemeClr>
+            </a:solidFill>
             <a:headEnd type="none"/>
             <a:tailEnd type="triangle"/>
           </a:ln>
@@ -14806,10 +14977,16 @@
           </a:xfrm>
           <a:prstGeom prst="bentConnector3">
             <a:avLst>
-              <a:gd name="adj1" fmla="val 45540"/>
+              <a:gd name="adj1" fmla="val 46272"/>
             </a:avLst>
           </a:prstGeom>
           <a:ln>
+            <a:solidFill>
+              <a:schemeClr val="accent1">
+                <a:lumMod val="60000"/>
+                <a:lumOff val="40000"/>
+              </a:schemeClr>
+            </a:solidFill>
             <a:tailEnd type="triangle"/>
           </a:ln>
         </p:spPr>

</xml_diff>

<commit_message>
Added some structure documentation
</commit_message>
<xml_diff>
--- a/Architecture.pptx
+++ b/Architecture.pptx
@@ -5,7 +5,7 @@
     <p:sldMasterId id="2147483648" r:id="rId1"/>
   </p:sldMasterIdLst>
   <p:notesMasterIdLst>
-    <p:notesMasterId r:id="rId7"/>
+    <p:notesMasterId r:id="rId9"/>
   </p:notesMasterIdLst>
   <p:sldIdLst>
     <p:sldId id="256" r:id="rId2"/>
@@ -13,6 +13,8 @@
     <p:sldId id="257" r:id="rId4"/>
     <p:sldId id="258" r:id="rId5"/>
     <p:sldId id="259" r:id="rId6"/>
+    <p:sldId id="261" r:id="rId7"/>
+    <p:sldId id="262" r:id="rId8"/>
   </p:sldIdLst>
   <p:sldSz cx="12192000" cy="6858000"/>
   <p:notesSz cx="6858000" cy="9144000"/>
@@ -212,7 +214,7 @@
           <a:p>
             <a:fld id="{7207C0AE-1CF7-4A0B-B9C2-6CA9E4371059}" type="datetimeFigureOut">
               <a:rPr lang="en-US" smtClean="0"/>
-              <a:t>3/26/2018</a:t>
+              <a:t>8/3/2018</a:t>
             </a:fld>
             <a:endParaRPr lang="en-US"/>
           </a:p>
@@ -946,6 +948,90 @@
 </p:notes>
 </file>
 
+<file path=ppt/notesSlides/notesSlide6.xml><?xml version="1.0" encoding="utf-8"?>
+<p:notes xmlns:a="http://schemas.openxmlformats.org/drawingml/2006/main" xmlns:r="http://schemas.openxmlformats.org/officeDocument/2006/relationships" xmlns:p="http://schemas.openxmlformats.org/presentationml/2006/main">
+  <p:cSld>
+    <p:spTree>
+      <p:nvGrpSpPr>
+        <p:cNvPr id="1" name=""/>
+        <p:cNvGrpSpPr/>
+        <p:nvPr/>
+      </p:nvGrpSpPr>
+      <p:grpSpPr>
+        <a:xfrm>
+          <a:off x="0" y="0"/>
+          <a:ext cx="0" cy="0"/>
+          <a:chOff x="0" y="0"/>
+          <a:chExt cx="0" cy="0"/>
+        </a:xfrm>
+      </p:grpSpPr>
+      <p:sp>
+        <p:nvSpPr>
+          <p:cNvPr id="2" name="Slide Image Placeholder 1"/>
+          <p:cNvSpPr>
+            <a:spLocks noGrp="1" noRot="1" noChangeAspect="1"/>
+          </p:cNvSpPr>
+          <p:nvPr>
+            <p:ph type="sldImg"/>
+          </p:nvPr>
+        </p:nvSpPr>
+        <p:spPr/>
+      </p:sp>
+      <p:sp>
+        <p:nvSpPr>
+          <p:cNvPr id="3" name="Notes Placeholder 2"/>
+          <p:cNvSpPr>
+            <a:spLocks noGrp="1"/>
+          </p:cNvSpPr>
+          <p:nvPr>
+            <p:ph type="body" idx="1"/>
+          </p:nvPr>
+        </p:nvSpPr>
+        <p:spPr/>
+        <p:txBody>
+          <a:bodyPr/>
+          <a:lstStyle/>
+          <a:p>
+            <a:endParaRPr lang="en-US" dirty="0"/>
+          </a:p>
+        </p:txBody>
+      </p:sp>
+      <p:sp>
+        <p:nvSpPr>
+          <p:cNvPr id="4" name="Slide Number Placeholder 3"/>
+          <p:cNvSpPr>
+            <a:spLocks noGrp="1"/>
+          </p:cNvSpPr>
+          <p:nvPr>
+            <p:ph type="sldNum" sz="quarter" idx="10"/>
+          </p:nvPr>
+        </p:nvSpPr>
+        <p:spPr/>
+        <p:txBody>
+          <a:bodyPr/>
+          <a:lstStyle/>
+          <a:p>
+            <a:fld id="{50E412CC-F43F-4B6E-88D2-297F1CE79C24}" type="slidenum">
+              <a:rPr lang="en-US" smtClean="0"/>
+              <a:t>7</a:t>
+            </a:fld>
+            <a:endParaRPr lang="en-US"/>
+          </a:p>
+        </p:txBody>
+      </p:sp>
+    </p:spTree>
+    <p:extLst>
+      <p:ext uri="{BB962C8B-B14F-4D97-AF65-F5344CB8AC3E}">
+        <p14:creationId xmlns:p14="http://schemas.microsoft.com/office/powerpoint/2010/main" val="1576655926"/>
+      </p:ext>
+    </p:extLst>
+  </p:cSld>
+  <p:clrMapOvr>
+    <a:masterClrMapping/>
+  </p:clrMapOvr>
+</p:notes>
+</file>
+
 <file path=ppt/slideLayouts/slideLayout1.xml><?xml version="1.0" encoding="utf-8"?>
 <p:sldLayout xmlns:a="http://schemas.openxmlformats.org/drawingml/2006/main" xmlns:r="http://schemas.openxmlformats.org/officeDocument/2006/relationships" xmlns:p="http://schemas.openxmlformats.org/presentationml/2006/main" type="title" preserve="1">
   <p:cSld name="Title Slide">
@@ -1093,7 +1179,7 @@
           <a:p>
             <a:fld id="{1522C3F5-FD30-402A-BDF3-0D99E299B33B}" type="datetimeFigureOut">
               <a:rPr lang="en-US" smtClean="0"/>
-              <a:t>3/26/2018</a:t>
+              <a:t>8/3/2018</a:t>
             </a:fld>
             <a:endParaRPr lang="en-US"/>
           </a:p>
@@ -1291,7 +1377,7 @@
           <a:p>
             <a:fld id="{1522C3F5-FD30-402A-BDF3-0D99E299B33B}" type="datetimeFigureOut">
               <a:rPr lang="en-US" smtClean="0"/>
-              <a:t>3/26/2018</a:t>
+              <a:t>8/3/2018</a:t>
             </a:fld>
             <a:endParaRPr lang="en-US"/>
           </a:p>
@@ -1499,7 +1585,7 @@
           <a:p>
             <a:fld id="{1522C3F5-FD30-402A-BDF3-0D99E299B33B}" type="datetimeFigureOut">
               <a:rPr lang="en-US" smtClean="0"/>
-              <a:t>3/26/2018</a:t>
+              <a:t>8/3/2018</a:t>
             </a:fld>
             <a:endParaRPr lang="en-US"/>
           </a:p>
@@ -1697,7 +1783,7 @@
           <a:p>
             <a:fld id="{1522C3F5-FD30-402A-BDF3-0D99E299B33B}" type="datetimeFigureOut">
               <a:rPr lang="en-US" smtClean="0"/>
-              <a:t>3/26/2018</a:t>
+              <a:t>8/3/2018</a:t>
             </a:fld>
             <a:endParaRPr lang="en-US"/>
           </a:p>
@@ -1972,7 +2058,7 @@
           <a:p>
             <a:fld id="{1522C3F5-FD30-402A-BDF3-0D99E299B33B}" type="datetimeFigureOut">
               <a:rPr lang="en-US" smtClean="0"/>
-              <a:t>3/26/2018</a:t>
+              <a:t>8/3/2018</a:t>
             </a:fld>
             <a:endParaRPr lang="en-US"/>
           </a:p>
@@ -2237,7 +2323,7 @@
           <a:p>
             <a:fld id="{1522C3F5-FD30-402A-BDF3-0D99E299B33B}" type="datetimeFigureOut">
               <a:rPr lang="en-US" smtClean="0"/>
-              <a:t>3/26/2018</a:t>
+              <a:t>8/3/2018</a:t>
             </a:fld>
             <a:endParaRPr lang="en-US"/>
           </a:p>
@@ -2649,7 +2735,7 @@
           <a:p>
             <a:fld id="{1522C3F5-FD30-402A-BDF3-0D99E299B33B}" type="datetimeFigureOut">
               <a:rPr lang="en-US" smtClean="0"/>
-              <a:t>3/26/2018</a:t>
+              <a:t>8/3/2018</a:t>
             </a:fld>
             <a:endParaRPr lang="en-US"/>
           </a:p>
@@ -2790,7 +2876,7 @@
           <a:p>
             <a:fld id="{1522C3F5-FD30-402A-BDF3-0D99E299B33B}" type="datetimeFigureOut">
               <a:rPr lang="en-US" smtClean="0"/>
-              <a:t>3/26/2018</a:t>
+              <a:t>8/3/2018</a:t>
             </a:fld>
             <a:endParaRPr lang="en-US"/>
           </a:p>
@@ -2903,7 +2989,7 @@
           <a:p>
             <a:fld id="{1522C3F5-FD30-402A-BDF3-0D99E299B33B}" type="datetimeFigureOut">
               <a:rPr lang="en-US" smtClean="0"/>
-              <a:t>3/26/2018</a:t>
+              <a:t>8/3/2018</a:t>
             </a:fld>
             <a:endParaRPr lang="en-US"/>
           </a:p>
@@ -3214,7 +3300,7 @@
           <a:p>
             <a:fld id="{1522C3F5-FD30-402A-BDF3-0D99E299B33B}" type="datetimeFigureOut">
               <a:rPr lang="en-US" smtClean="0"/>
-              <a:t>3/26/2018</a:t>
+              <a:t>8/3/2018</a:t>
             </a:fld>
             <a:endParaRPr lang="en-US"/>
           </a:p>
@@ -3502,7 +3588,7 @@
           <a:p>
             <a:fld id="{1522C3F5-FD30-402A-BDF3-0D99E299B33B}" type="datetimeFigureOut">
               <a:rPr lang="en-US" smtClean="0"/>
-              <a:t>3/26/2018</a:t>
+              <a:t>8/3/2018</a:t>
             </a:fld>
             <a:endParaRPr lang="en-US"/>
           </a:p>
@@ -3743,7 +3829,7 @@
           <a:p>
             <a:fld id="{1522C3F5-FD30-402A-BDF3-0D99E299B33B}" type="datetimeFigureOut">
               <a:rPr lang="en-US" smtClean="0"/>
-              <a:t>3/26/2018</a:t>
+              <a:t>8/3/2018</a:t>
             </a:fld>
             <a:endParaRPr lang="en-US"/>
           </a:p>
@@ -17558,6 +17644,1969 @@
     <p:extLst>
       <p:ext uri="{BB962C8B-B14F-4D97-AF65-F5344CB8AC3E}">
         <p14:creationId xmlns:p14="http://schemas.microsoft.com/office/powerpoint/2010/main" val="3992410057"/>
+      </p:ext>
+    </p:extLst>
+  </p:cSld>
+  <p:clrMapOvr>
+    <a:masterClrMapping/>
+  </p:clrMapOvr>
+</p:sld>
+</file>
+
+<file path=ppt/slides/slide6.xml><?xml version="1.0" encoding="utf-8"?>
+<p:sld xmlns:a="http://schemas.openxmlformats.org/drawingml/2006/main" xmlns:r="http://schemas.openxmlformats.org/officeDocument/2006/relationships" xmlns:p="http://schemas.openxmlformats.org/presentationml/2006/main">
+  <p:cSld>
+    <p:spTree>
+      <p:nvGrpSpPr>
+        <p:cNvPr id="1" name=""/>
+        <p:cNvGrpSpPr/>
+        <p:nvPr/>
+      </p:nvGrpSpPr>
+      <p:grpSpPr>
+        <a:xfrm>
+          <a:off x="0" y="0"/>
+          <a:ext cx="0" cy="0"/>
+          <a:chOff x="0" y="0"/>
+          <a:chExt cx="0" cy="0"/>
+        </a:xfrm>
+      </p:grpSpPr>
+      <p:sp>
+        <p:nvSpPr>
+          <p:cNvPr id="2" name="Title 1">
+            <a:extLst>
+              <a:ext uri="{FF2B5EF4-FFF2-40B4-BE49-F238E27FC236}">
+                <a16:creationId xmlns:a16="http://schemas.microsoft.com/office/drawing/2014/main" id="{0C32F70D-720A-4E41-8F1E-1F8488C24969}"/>
+              </a:ext>
+            </a:extLst>
+          </p:cNvPr>
+          <p:cNvSpPr>
+            <a:spLocks noGrp="1"/>
+          </p:cNvSpPr>
+          <p:nvPr>
+            <p:ph type="title"/>
+          </p:nvPr>
+        </p:nvSpPr>
+        <p:spPr/>
+        <p:txBody>
+          <a:bodyPr/>
+          <a:lstStyle/>
+          <a:p>
+            <a:endParaRPr lang="en-US"/>
+          </a:p>
+        </p:txBody>
+      </p:sp>
+      <p:sp>
+        <p:nvSpPr>
+          <p:cNvPr id="3" name="Content Placeholder 2">
+            <a:extLst>
+              <a:ext uri="{FF2B5EF4-FFF2-40B4-BE49-F238E27FC236}">
+                <a16:creationId xmlns:a16="http://schemas.microsoft.com/office/drawing/2014/main" id="{25B97A03-DE48-4DFE-B292-D08C7016D014}"/>
+              </a:ext>
+            </a:extLst>
+          </p:cNvPr>
+          <p:cNvSpPr>
+            <a:spLocks noGrp="1"/>
+          </p:cNvSpPr>
+          <p:nvPr>
+            <p:ph idx="1"/>
+          </p:nvPr>
+        </p:nvSpPr>
+        <p:spPr/>
+        <p:txBody>
+          <a:bodyPr/>
+          <a:lstStyle/>
+          <a:p>
+            <a:endParaRPr lang="en-US"/>
+          </a:p>
+        </p:txBody>
+      </p:sp>
+    </p:spTree>
+    <p:extLst>
+      <p:ext uri="{BB962C8B-B14F-4D97-AF65-F5344CB8AC3E}">
+        <p14:creationId xmlns:p14="http://schemas.microsoft.com/office/powerpoint/2010/main" val="2128990315"/>
+      </p:ext>
+    </p:extLst>
+  </p:cSld>
+  <p:clrMapOvr>
+    <a:masterClrMapping/>
+  </p:clrMapOvr>
+</p:sld>
+</file>
+
+<file path=ppt/slides/slide7.xml><?xml version="1.0" encoding="utf-8"?>
+<p:sld xmlns:a="http://schemas.openxmlformats.org/drawingml/2006/main" xmlns:r="http://schemas.openxmlformats.org/officeDocument/2006/relationships" xmlns:p="http://schemas.openxmlformats.org/presentationml/2006/main">
+  <p:cSld>
+    <p:spTree>
+      <p:nvGrpSpPr>
+        <p:cNvPr id="1" name=""/>
+        <p:cNvGrpSpPr/>
+        <p:nvPr/>
+      </p:nvGrpSpPr>
+      <p:grpSpPr>
+        <a:xfrm>
+          <a:off x="0" y="0"/>
+          <a:ext cx="0" cy="0"/>
+          <a:chOff x="0" y="0"/>
+          <a:chExt cx="0" cy="0"/>
+        </a:xfrm>
+      </p:grpSpPr>
+      <p:sp>
+        <p:nvSpPr>
+          <p:cNvPr id="4" name="Rectangle 3">
+            <a:extLst>
+              <a:ext uri="{FF2B5EF4-FFF2-40B4-BE49-F238E27FC236}">
+                <a16:creationId xmlns:a16="http://schemas.microsoft.com/office/drawing/2014/main" id="{140C5DDF-863E-4E95-A0D1-30BDEEF004F3}"/>
+              </a:ext>
+            </a:extLst>
+          </p:cNvPr>
+          <p:cNvSpPr/>
+          <p:nvPr/>
+        </p:nvSpPr>
+        <p:spPr>
+          <a:xfrm>
+            <a:off x="609600" y="342900"/>
+            <a:ext cx="10515600" cy="6057900"/>
+          </a:xfrm>
+          <a:prstGeom prst="rect">
+            <a:avLst/>
+          </a:prstGeom>
+          <a:solidFill>
+            <a:schemeClr val="bg1">
+              <a:lumMod val="95000"/>
+            </a:schemeClr>
+          </a:solidFill>
+        </p:spPr>
+        <p:style>
+          <a:lnRef idx="2">
+            <a:schemeClr val="accent1">
+              <a:shade val="50000"/>
+            </a:schemeClr>
+          </a:lnRef>
+          <a:fillRef idx="1">
+            <a:schemeClr val="accent1"/>
+          </a:fillRef>
+          <a:effectRef idx="0">
+            <a:schemeClr val="accent1"/>
+          </a:effectRef>
+          <a:fontRef idx="minor">
+            <a:schemeClr val="lt1"/>
+          </a:fontRef>
+        </p:style>
+        <p:txBody>
+          <a:bodyPr rtlCol="0" anchor="t"/>
+          <a:lstStyle/>
+          <a:p>
+            <a:r>
+              <a:rPr lang="en-US" dirty="0">
+                <a:solidFill>
+                  <a:schemeClr val="tx1"/>
+                </a:solidFill>
+              </a:rPr>
+              <a:t>/</a:t>
+            </a:r>
+          </a:p>
+        </p:txBody>
+      </p:sp>
+      <p:grpSp>
+        <p:nvGrpSpPr>
+          <p:cNvPr id="17" name="Group 16">
+            <a:extLst>
+              <a:ext uri="{FF2B5EF4-FFF2-40B4-BE49-F238E27FC236}">
+                <a16:creationId xmlns:a16="http://schemas.microsoft.com/office/drawing/2014/main" id="{DC729A24-759A-4921-8DD6-C7B873B39AA9}"/>
+              </a:ext>
+            </a:extLst>
+          </p:cNvPr>
+          <p:cNvGrpSpPr/>
+          <p:nvPr/>
+        </p:nvGrpSpPr>
+        <p:grpSpPr>
+          <a:xfrm>
+            <a:off x="838200" y="628650"/>
+            <a:ext cx="3200400" cy="1714500"/>
+            <a:chOff x="838200" y="1028700"/>
+            <a:chExt cx="3200400" cy="1714500"/>
+          </a:xfrm>
+          <a:solidFill>
+            <a:schemeClr val="bg1">
+              <a:lumMod val="85000"/>
+            </a:schemeClr>
+          </a:solidFill>
+        </p:grpSpPr>
+        <p:sp>
+          <p:nvSpPr>
+            <p:cNvPr id="5" name="Rectangle 4">
+              <a:extLst>
+                <a:ext uri="{FF2B5EF4-FFF2-40B4-BE49-F238E27FC236}">
+                  <a16:creationId xmlns:a16="http://schemas.microsoft.com/office/drawing/2014/main" id="{C9C5ADFA-B4DA-48B9-A083-80489F507DA0}"/>
+                </a:ext>
+              </a:extLst>
+            </p:cNvPr>
+            <p:cNvSpPr/>
+            <p:nvPr/>
+          </p:nvSpPr>
+          <p:spPr>
+            <a:xfrm>
+              <a:off x="838200" y="1028700"/>
+              <a:ext cx="3200400" cy="1714500"/>
+            </a:xfrm>
+            <a:prstGeom prst="rect">
+              <a:avLst/>
+            </a:prstGeom>
+            <a:grpFill/>
+          </p:spPr>
+          <p:style>
+            <a:lnRef idx="2">
+              <a:schemeClr val="accent1">
+                <a:shade val="50000"/>
+              </a:schemeClr>
+            </a:lnRef>
+            <a:fillRef idx="1">
+              <a:schemeClr val="accent1"/>
+            </a:fillRef>
+            <a:effectRef idx="0">
+              <a:schemeClr val="accent1"/>
+            </a:effectRef>
+            <a:fontRef idx="minor">
+              <a:schemeClr val="lt1"/>
+            </a:fontRef>
+          </p:style>
+          <p:txBody>
+            <a:bodyPr rtlCol="0" anchor="t"/>
+            <a:lstStyle/>
+            <a:p>
+              <a:r>
+                <a:rPr lang="en-US" dirty="0">
+                  <a:solidFill>
+                    <a:schemeClr val="tx1"/>
+                  </a:solidFill>
+                </a:rPr>
+                <a:t>Drive Board HW/</a:t>
+              </a:r>
+            </a:p>
+          </p:txBody>
+        </p:sp>
+        <p:sp>
+          <p:nvSpPr>
+            <p:cNvPr id="6" name="Rectangle 5">
+              <a:extLst>
+                <a:ext uri="{FF2B5EF4-FFF2-40B4-BE49-F238E27FC236}">
+                  <a16:creationId xmlns:a16="http://schemas.microsoft.com/office/drawing/2014/main" id="{03DAC542-939C-4EE3-9DA1-0C5BC7A6B4FD}"/>
+                </a:ext>
+              </a:extLst>
+            </p:cNvPr>
+            <p:cNvSpPr/>
+            <p:nvPr/>
+          </p:nvSpPr>
+          <p:spPr>
+            <a:xfrm>
+              <a:off x="1066800" y="1314450"/>
+              <a:ext cx="2743200" cy="1200150"/>
+            </a:xfrm>
+            <a:prstGeom prst="rect">
+              <a:avLst/>
+            </a:prstGeom>
+            <a:grpFill/>
+          </p:spPr>
+          <p:style>
+            <a:lnRef idx="2">
+              <a:schemeClr val="accent1">
+                <a:shade val="50000"/>
+              </a:schemeClr>
+            </a:lnRef>
+            <a:fillRef idx="1">
+              <a:schemeClr val="accent1"/>
+            </a:fillRef>
+            <a:effectRef idx="0">
+              <a:schemeClr val="accent1"/>
+            </a:effectRef>
+            <a:fontRef idx="minor">
+              <a:schemeClr val="lt1"/>
+            </a:fontRef>
+          </p:style>
+          <p:txBody>
+            <a:bodyPr rtlCol="0" anchor="t"/>
+            <a:lstStyle/>
+            <a:p>
+              <a:r>
+                <a:rPr lang="en-US" dirty="0">
+                  <a:solidFill>
+                    <a:schemeClr val="tx1"/>
+                  </a:solidFill>
+                </a:rPr>
+                <a:t>PCA9685 PWM HAT/</a:t>
+              </a:r>
+            </a:p>
+            <a:p>
+              <a:r>
+                <a:rPr lang="en-US" sz="1200" dirty="0">
+                  <a:solidFill>
+                    <a:schemeClr val="tx1"/>
+                  </a:solidFill>
+                </a:rPr>
+                <a:t>Driver module for the HAT, takes in wither duty cycle or pulse time inputs.</a:t>
+              </a:r>
+            </a:p>
+            <a:p>
+              <a:endParaRPr lang="en-US" sz="1200" dirty="0">
+                <a:solidFill>
+                  <a:schemeClr val="tx1"/>
+                </a:solidFill>
+              </a:endParaRPr>
+            </a:p>
+            <a:p>
+              <a:r>
+                <a:rPr lang="en-US" sz="1200" dirty="0">
+                  <a:solidFill>
+                    <a:schemeClr val="tx1"/>
+                  </a:solidFill>
+                </a:rPr>
+                <a:t>Frequency is set by a parameter (startup)</a:t>
+              </a:r>
+            </a:p>
+          </p:txBody>
+        </p:sp>
+      </p:grpSp>
+      <p:grpSp>
+        <p:nvGrpSpPr>
+          <p:cNvPr id="19" name="Group 18">
+            <a:extLst>
+              <a:ext uri="{FF2B5EF4-FFF2-40B4-BE49-F238E27FC236}">
+                <a16:creationId xmlns:a16="http://schemas.microsoft.com/office/drawing/2014/main" id="{95AA8198-958B-49AF-86EE-2432CDF858AC}"/>
+              </a:ext>
+            </a:extLst>
+          </p:cNvPr>
+          <p:cNvGrpSpPr/>
+          <p:nvPr/>
+        </p:nvGrpSpPr>
+        <p:grpSpPr>
+          <a:xfrm>
+            <a:off x="838200" y="2514600"/>
+            <a:ext cx="3200400" cy="3086100"/>
+            <a:chOff x="838200" y="2971800"/>
+            <a:chExt cx="3200400" cy="3086100"/>
+          </a:xfrm>
+          <a:solidFill>
+            <a:schemeClr val="bg1">
+              <a:lumMod val="85000"/>
+            </a:schemeClr>
+          </a:solidFill>
+        </p:grpSpPr>
+        <p:sp>
+          <p:nvSpPr>
+            <p:cNvPr id="12" name="Rectangle 11">
+              <a:extLst>
+                <a:ext uri="{FF2B5EF4-FFF2-40B4-BE49-F238E27FC236}">
+                  <a16:creationId xmlns:a16="http://schemas.microsoft.com/office/drawing/2014/main" id="{E88B30A3-EF0C-43EA-AFE4-739916575520}"/>
+                </a:ext>
+              </a:extLst>
+            </p:cNvPr>
+            <p:cNvSpPr/>
+            <p:nvPr/>
+          </p:nvSpPr>
+          <p:spPr>
+            <a:xfrm>
+              <a:off x="838200" y="2971800"/>
+              <a:ext cx="3200400" cy="3086100"/>
+            </a:xfrm>
+            <a:prstGeom prst="rect">
+              <a:avLst/>
+            </a:prstGeom>
+            <a:grpFill/>
+          </p:spPr>
+          <p:style>
+            <a:lnRef idx="2">
+              <a:schemeClr val="accent1">
+                <a:shade val="50000"/>
+              </a:schemeClr>
+            </a:lnRef>
+            <a:fillRef idx="1">
+              <a:schemeClr val="accent1"/>
+            </a:fillRef>
+            <a:effectRef idx="0">
+              <a:schemeClr val="accent1"/>
+            </a:effectRef>
+            <a:fontRef idx="minor">
+              <a:schemeClr val="lt1"/>
+            </a:fontRef>
+          </p:style>
+          <p:txBody>
+            <a:bodyPr rtlCol="0" anchor="t"/>
+            <a:lstStyle/>
+            <a:p>
+              <a:r>
+                <a:rPr lang="en-US" dirty="0">
+                  <a:solidFill>
+                    <a:schemeClr val="tx1"/>
+                  </a:solidFill>
+                </a:rPr>
+                <a:t>Arm Board HW/</a:t>
+              </a:r>
+            </a:p>
+          </p:txBody>
+        </p:sp>
+        <p:sp>
+          <p:nvSpPr>
+            <p:cNvPr id="13" name="Rectangle 12">
+              <a:extLst>
+                <a:ext uri="{FF2B5EF4-FFF2-40B4-BE49-F238E27FC236}">
+                  <a16:creationId xmlns:a16="http://schemas.microsoft.com/office/drawing/2014/main" id="{BBCD6D2E-2921-495B-96B2-1C7D5DC9BF5A}"/>
+                </a:ext>
+              </a:extLst>
+            </p:cNvPr>
+            <p:cNvSpPr/>
+            <p:nvPr/>
+          </p:nvSpPr>
+          <p:spPr>
+            <a:xfrm>
+              <a:off x="1009650" y="3257550"/>
+              <a:ext cx="2743200" cy="1200150"/>
+            </a:xfrm>
+            <a:prstGeom prst="rect">
+              <a:avLst/>
+            </a:prstGeom>
+            <a:grpFill/>
+          </p:spPr>
+          <p:style>
+            <a:lnRef idx="2">
+              <a:schemeClr val="accent1">
+                <a:shade val="50000"/>
+              </a:schemeClr>
+            </a:lnRef>
+            <a:fillRef idx="1">
+              <a:schemeClr val="accent1"/>
+            </a:fillRef>
+            <a:effectRef idx="0">
+              <a:schemeClr val="accent1"/>
+            </a:effectRef>
+            <a:fontRef idx="minor">
+              <a:schemeClr val="lt1"/>
+            </a:fontRef>
+          </p:style>
+          <p:txBody>
+            <a:bodyPr rtlCol="0" anchor="t"/>
+            <a:lstStyle/>
+            <a:p>
+              <a:r>
+                <a:rPr lang="en-US" dirty="0">
+                  <a:solidFill>
+                    <a:schemeClr val="tx1"/>
+                  </a:solidFill>
+                </a:rPr>
+                <a:t>PCA9685 PWM HAT</a:t>
+              </a:r>
+            </a:p>
+            <a:p>
+              <a:r>
+                <a:rPr lang="en-US" sz="1200" dirty="0">
+                  <a:solidFill>
+                    <a:schemeClr val="tx1"/>
+                  </a:solidFill>
+                </a:rPr>
+                <a:t>Driver module for the HAT, takes in wither duty cycle or pulse time inputs.</a:t>
+              </a:r>
+            </a:p>
+            <a:p>
+              <a:endParaRPr lang="en-US" sz="1200" dirty="0">
+                <a:solidFill>
+                  <a:schemeClr val="tx1"/>
+                </a:solidFill>
+              </a:endParaRPr>
+            </a:p>
+            <a:p>
+              <a:r>
+                <a:rPr lang="en-US" sz="1200" dirty="0">
+                  <a:solidFill>
+                    <a:schemeClr val="tx1"/>
+                  </a:solidFill>
+                </a:rPr>
+                <a:t>Frequency is set by a parameter (startup)</a:t>
+              </a:r>
+            </a:p>
+          </p:txBody>
+        </p:sp>
+        <p:grpSp>
+          <p:nvGrpSpPr>
+            <p:cNvPr id="18" name="Group 17">
+              <a:extLst>
+                <a:ext uri="{FF2B5EF4-FFF2-40B4-BE49-F238E27FC236}">
+                  <a16:creationId xmlns:a16="http://schemas.microsoft.com/office/drawing/2014/main" id="{0EC598F9-74C4-4EE6-BDDB-AA258C0FC840}"/>
+                </a:ext>
+              </a:extLst>
+            </p:cNvPr>
+            <p:cNvGrpSpPr/>
+            <p:nvPr/>
+          </p:nvGrpSpPr>
+          <p:grpSpPr>
+            <a:xfrm>
+              <a:off x="1066800" y="4514850"/>
+              <a:ext cx="2857500" cy="1314450"/>
+              <a:chOff x="1066800" y="4514850"/>
+              <a:chExt cx="2857500" cy="1314450"/>
+            </a:xfrm>
+            <a:grpFill/>
+          </p:grpSpPr>
+          <p:sp>
+            <p:nvSpPr>
+              <p:cNvPr id="14" name="Rectangle 13">
+                <a:extLst>
+                  <a:ext uri="{FF2B5EF4-FFF2-40B4-BE49-F238E27FC236}">
+                    <a16:creationId xmlns:a16="http://schemas.microsoft.com/office/drawing/2014/main" id="{160BF557-C6D1-48DF-9B33-78F3E6F5A518}"/>
+                  </a:ext>
+                </a:extLst>
+              </p:cNvPr>
+              <p:cNvSpPr/>
+              <p:nvPr/>
+            </p:nvSpPr>
+            <p:spPr>
+              <a:xfrm>
+                <a:off x="1066800" y="4514850"/>
+                <a:ext cx="2743200" cy="1200150"/>
+              </a:xfrm>
+              <a:prstGeom prst="rect">
+                <a:avLst/>
+              </a:prstGeom>
+              <a:grpFill/>
+            </p:spPr>
+            <p:style>
+              <a:lnRef idx="2">
+                <a:schemeClr val="accent1">
+                  <a:shade val="50000"/>
+                </a:schemeClr>
+              </a:lnRef>
+              <a:fillRef idx="1">
+                <a:schemeClr val="accent1"/>
+              </a:fillRef>
+              <a:effectRef idx="0">
+                <a:schemeClr val="accent1"/>
+              </a:effectRef>
+              <a:fontRef idx="minor">
+                <a:schemeClr val="lt1"/>
+              </a:fontRef>
+            </p:style>
+            <p:txBody>
+              <a:bodyPr rtlCol="0" anchor="t"/>
+              <a:lstStyle/>
+              <a:p>
+                <a:endParaRPr lang="en-US" sz="1200" dirty="0">
+                  <a:solidFill>
+                    <a:schemeClr val="tx1"/>
+                  </a:solidFill>
+                </a:endParaRPr>
+              </a:p>
+            </p:txBody>
+          </p:sp>
+          <p:sp>
+            <p:nvSpPr>
+              <p:cNvPr id="16" name="Rectangle 15">
+                <a:extLst>
+                  <a:ext uri="{FF2B5EF4-FFF2-40B4-BE49-F238E27FC236}">
+                    <a16:creationId xmlns:a16="http://schemas.microsoft.com/office/drawing/2014/main" id="{A7D299D6-376C-49C3-AA6A-E5F732C5C814}"/>
+                  </a:ext>
+                </a:extLst>
+              </p:cNvPr>
+              <p:cNvSpPr/>
+              <p:nvPr/>
+            </p:nvSpPr>
+            <p:spPr>
+              <a:xfrm>
+                <a:off x="1123950" y="4572000"/>
+                <a:ext cx="2743200" cy="1200150"/>
+              </a:xfrm>
+              <a:prstGeom prst="rect">
+                <a:avLst/>
+              </a:prstGeom>
+              <a:grpFill/>
+            </p:spPr>
+            <p:style>
+              <a:lnRef idx="2">
+                <a:schemeClr val="accent1">
+                  <a:shade val="50000"/>
+                </a:schemeClr>
+              </a:lnRef>
+              <a:fillRef idx="1">
+                <a:schemeClr val="accent1"/>
+              </a:fillRef>
+              <a:effectRef idx="0">
+                <a:schemeClr val="accent1"/>
+              </a:effectRef>
+              <a:fontRef idx="minor">
+                <a:schemeClr val="lt1"/>
+              </a:fontRef>
+            </p:style>
+            <p:txBody>
+              <a:bodyPr rtlCol="0" anchor="t"/>
+              <a:lstStyle/>
+              <a:p>
+                <a:endParaRPr lang="en-US" sz="1200" dirty="0">
+                  <a:solidFill>
+                    <a:schemeClr val="tx1"/>
+                  </a:solidFill>
+                </a:endParaRPr>
+              </a:p>
+            </p:txBody>
+          </p:sp>
+          <p:sp>
+            <p:nvSpPr>
+              <p:cNvPr id="15" name="Rectangle 14">
+                <a:extLst>
+                  <a:ext uri="{FF2B5EF4-FFF2-40B4-BE49-F238E27FC236}">
+                    <a16:creationId xmlns:a16="http://schemas.microsoft.com/office/drawing/2014/main" id="{AD3E28FA-A7A2-4247-A058-C0DECB0212A4}"/>
+                  </a:ext>
+                </a:extLst>
+              </p:cNvPr>
+              <p:cNvSpPr/>
+              <p:nvPr/>
+            </p:nvSpPr>
+            <p:spPr>
+              <a:xfrm>
+                <a:off x="1181100" y="4629150"/>
+                <a:ext cx="2743200" cy="1200150"/>
+              </a:xfrm>
+              <a:prstGeom prst="rect">
+                <a:avLst/>
+              </a:prstGeom>
+              <a:grpFill/>
+            </p:spPr>
+            <p:style>
+              <a:lnRef idx="2">
+                <a:schemeClr val="accent1">
+                  <a:shade val="50000"/>
+                </a:schemeClr>
+              </a:lnRef>
+              <a:fillRef idx="1">
+                <a:schemeClr val="accent1"/>
+              </a:fillRef>
+              <a:effectRef idx="0">
+                <a:schemeClr val="accent1"/>
+              </a:effectRef>
+              <a:fontRef idx="minor">
+                <a:schemeClr val="lt1"/>
+              </a:fontRef>
+            </p:style>
+            <p:txBody>
+              <a:bodyPr rtlCol="0" anchor="t"/>
+              <a:lstStyle/>
+              <a:p>
+                <a:r>
+                  <a:rPr lang="en-US" dirty="0">
+                    <a:solidFill>
+                      <a:schemeClr val="tx1"/>
+                    </a:solidFill>
+                  </a:rPr>
+                  <a:t>Switch Inputs (</a:t>
+                </a:r>
+                <a:r>
+                  <a:rPr lang="en-US" dirty="0" err="1">
+                    <a:solidFill>
+                      <a:schemeClr val="tx1"/>
+                    </a:solidFill>
+                  </a:rPr>
+                  <a:t>PiGPIO</a:t>
+                </a:r>
+                <a:r>
+                  <a:rPr lang="en-US" dirty="0">
+                    <a:solidFill>
+                      <a:schemeClr val="tx1"/>
+                    </a:solidFill>
+                  </a:rPr>
+                  <a:t>)</a:t>
+                </a:r>
+              </a:p>
+              <a:p>
+                <a:r>
+                  <a:rPr lang="en-US" sz="1200" dirty="0">
+                    <a:solidFill>
+                      <a:schemeClr val="tx1"/>
+                    </a:solidFill>
+                  </a:rPr>
+                  <a:t>Reads a GPIO pin and publishes out the results</a:t>
+                </a:r>
+              </a:p>
+              <a:p>
+                <a:endParaRPr lang="en-US" sz="1200" dirty="0">
+                  <a:solidFill>
+                    <a:schemeClr val="tx1"/>
+                  </a:solidFill>
+                </a:endParaRPr>
+              </a:p>
+              <a:p>
+                <a:r>
+                  <a:rPr lang="en-US" sz="1200" dirty="0">
+                    <a:solidFill>
+                      <a:schemeClr val="tx1"/>
+                    </a:solidFill>
+                  </a:rPr>
+                  <a:t>Frequency is set by a parameter (startup)</a:t>
+                </a:r>
+              </a:p>
+            </p:txBody>
+          </p:sp>
+        </p:grpSp>
+      </p:grpSp>
+      <p:grpSp>
+        <p:nvGrpSpPr>
+          <p:cNvPr id="23" name="Group 22">
+            <a:extLst>
+              <a:ext uri="{FF2B5EF4-FFF2-40B4-BE49-F238E27FC236}">
+                <a16:creationId xmlns:a16="http://schemas.microsoft.com/office/drawing/2014/main" id="{0B130826-00E4-4C4A-9548-F2D998979E5C}"/>
+              </a:ext>
+            </a:extLst>
+          </p:cNvPr>
+          <p:cNvGrpSpPr/>
+          <p:nvPr/>
+        </p:nvGrpSpPr>
+        <p:grpSpPr>
+          <a:xfrm>
+            <a:off x="4267200" y="628650"/>
+            <a:ext cx="3200400" cy="2457450"/>
+            <a:chOff x="838200" y="2971800"/>
+            <a:chExt cx="3200400" cy="2457450"/>
+          </a:xfrm>
+          <a:solidFill>
+            <a:schemeClr val="bg1">
+              <a:lumMod val="85000"/>
+            </a:schemeClr>
+          </a:solidFill>
+        </p:grpSpPr>
+        <p:sp>
+          <p:nvSpPr>
+            <p:cNvPr id="24" name="Rectangle 23">
+              <a:extLst>
+                <a:ext uri="{FF2B5EF4-FFF2-40B4-BE49-F238E27FC236}">
+                  <a16:creationId xmlns:a16="http://schemas.microsoft.com/office/drawing/2014/main" id="{6C626DFA-368C-4965-A2D6-D0D896B119AD}"/>
+                </a:ext>
+              </a:extLst>
+            </p:cNvPr>
+            <p:cNvSpPr/>
+            <p:nvPr/>
+          </p:nvSpPr>
+          <p:spPr>
+            <a:xfrm>
+              <a:off x="838200" y="2971800"/>
+              <a:ext cx="3200400" cy="2457450"/>
+            </a:xfrm>
+            <a:prstGeom prst="rect">
+              <a:avLst/>
+            </a:prstGeom>
+            <a:grpFill/>
+          </p:spPr>
+          <p:style>
+            <a:lnRef idx="2">
+              <a:schemeClr val="accent1">
+                <a:shade val="50000"/>
+              </a:schemeClr>
+            </a:lnRef>
+            <a:fillRef idx="1">
+              <a:schemeClr val="accent1"/>
+            </a:fillRef>
+            <a:effectRef idx="0">
+              <a:schemeClr val="accent1"/>
+            </a:effectRef>
+            <a:fontRef idx="minor">
+              <a:schemeClr val="lt1"/>
+            </a:fontRef>
+          </p:style>
+          <p:txBody>
+            <a:bodyPr rtlCol="0" anchor="t"/>
+            <a:lstStyle/>
+            <a:p>
+              <a:r>
+                <a:rPr lang="en-US" dirty="0">
+                  <a:solidFill>
+                    <a:schemeClr val="tx1"/>
+                  </a:solidFill>
+                </a:rPr>
+                <a:t>Master Board HW/</a:t>
+              </a:r>
+            </a:p>
+          </p:txBody>
+        </p:sp>
+        <p:sp>
+          <p:nvSpPr>
+            <p:cNvPr id="25" name="Rectangle 24">
+              <a:extLst>
+                <a:ext uri="{FF2B5EF4-FFF2-40B4-BE49-F238E27FC236}">
+                  <a16:creationId xmlns:a16="http://schemas.microsoft.com/office/drawing/2014/main" id="{7FF37F0C-BD65-4EE7-9BB0-9AABDCB8BF73}"/>
+                </a:ext>
+              </a:extLst>
+            </p:cNvPr>
+            <p:cNvSpPr/>
+            <p:nvPr/>
+          </p:nvSpPr>
+          <p:spPr>
+            <a:xfrm>
+              <a:off x="1066800" y="3257550"/>
+              <a:ext cx="2743200" cy="1143000"/>
+            </a:xfrm>
+            <a:prstGeom prst="rect">
+              <a:avLst/>
+            </a:prstGeom>
+            <a:grpFill/>
+          </p:spPr>
+          <p:style>
+            <a:lnRef idx="2">
+              <a:schemeClr val="accent1">
+                <a:shade val="50000"/>
+              </a:schemeClr>
+            </a:lnRef>
+            <a:fillRef idx="1">
+              <a:schemeClr val="accent1"/>
+            </a:fillRef>
+            <a:effectRef idx="0">
+              <a:schemeClr val="accent1"/>
+            </a:effectRef>
+            <a:fontRef idx="minor">
+              <a:schemeClr val="lt1"/>
+            </a:fontRef>
+          </p:style>
+          <p:txBody>
+            <a:bodyPr rtlCol="0" anchor="t"/>
+            <a:lstStyle/>
+            <a:p>
+              <a:r>
+                <a:rPr lang="en-US" dirty="0">
+                  <a:solidFill>
+                    <a:schemeClr val="tx1"/>
+                  </a:solidFill>
+                </a:rPr>
+                <a:t>PCA9685 PWM HAT</a:t>
+              </a:r>
+            </a:p>
+            <a:p>
+              <a:r>
+                <a:rPr lang="en-US" sz="1200" dirty="0">
+                  <a:solidFill>
+                    <a:schemeClr val="tx1"/>
+                  </a:solidFill>
+                </a:rPr>
+                <a:t>Driver module for the HAT, takes in wither duty cycle or pulse time inputs.</a:t>
+              </a:r>
+            </a:p>
+            <a:p>
+              <a:endParaRPr lang="en-US" sz="1200" dirty="0">
+                <a:solidFill>
+                  <a:schemeClr val="tx1"/>
+                </a:solidFill>
+              </a:endParaRPr>
+            </a:p>
+            <a:p>
+              <a:r>
+                <a:rPr lang="en-US" sz="1200" dirty="0">
+                  <a:solidFill>
+                    <a:schemeClr val="tx1"/>
+                  </a:solidFill>
+                </a:rPr>
+                <a:t>Frequency is set by a parameter (startup)</a:t>
+              </a:r>
+            </a:p>
+          </p:txBody>
+        </p:sp>
+        <p:sp>
+          <p:nvSpPr>
+            <p:cNvPr id="29" name="Rectangle 28">
+              <a:extLst>
+                <a:ext uri="{FF2B5EF4-FFF2-40B4-BE49-F238E27FC236}">
+                  <a16:creationId xmlns:a16="http://schemas.microsoft.com/office/drawing/2014/main" id="{0891341B-D87C-471C-B85B-7FDCC3E5A300}"/>
+                </a:ext>
+              </a:extLst>
+            </p:cNvPr>
+            <p:cNvSpPr/>
+            <p:nvPr/>
+          </p:nvSpPr>
+          <p:spPr>
+            <a:xfrm>
+              <a:off x="1066800" y="4457700"/>
+              <a:ext cx="2743200" cy="742950"/>
+            </a:xfrm>
+            <a:prstGeom prst="rect">
+              <a:avLst/>
+            </a:prstGeom>
+            <a:grpFill/>
+          </p:spPr>
+          <p:style>
+            <a:lnRef idx="2">
+              <a:schemeClr val="accent1">
+                <a:shade val="50000"/>
+              </a:schemeClr>
+            </a:lnRef>
+            <a:fillRef idx="1">
+              <a:schemeClr val="accent1"/>
+            </a:fillRef>
+            <a:effectRef idx="0">
+              <a:schemeClr val="accent1"/>
+            </a:effectRef>
+            <a:fontRef idx="minor">
+              <a:schemeClr val="lt1"/>
+            </a:fontRef>
+          </p:style>
+          <p:txBody>
+            <a:bodyPr rtlCol="0" anchor="t"/>
+            <a:lstStyle/>
+            <a:p>
+              <a:r>
+                <a:rPr lang="en-US" dirty="0">
+                  <a:solidFill>
+                    <a:schemeClr val="tx1"/>
+                  </a:solidFill>
+                </a:rPr>
+                <a:t>GPS Module (serial)</a:t>
+              </a:r>
+            </a:p>
+            <a:p>
+              <a:r>
+                <a:rPr lang="en-US" sz="1200" dirty="0">
+                  <a:solidFill>
+                    <a:schemeClr val="tx1"/>
+                  </a:solidFill>
+                </a:rPr>
+                <a:t>Retrieves and publishes the current GPS data</a:t>
+              </a:r>
+            </a:p>
+          </p:txBody>
+        </p:sp>
+      </p:grpSp>
+      <p:grpSp>
+        <p:nvGrpSpPr>
+          <p:cNvPr id="40" name="Group 39">
+            <a:extLst>
+              <a:ext uri="{FF2B5EF4-FFF2-40B4-BE49-F238E27FC236}">
+                <a16:creationId xmlns:a16="http://schemas.microsoft.com/office/drawing/2014/main" id="{D1C8398E-1507-484A-8D40-EAE0A570F9D8}"/>
+              </a:ext>
+            </a:extLst>
+          </p:cNvPr>
+          <p:cNvGrpSpPr/>
+          <p:nvPr/>
+        </p:nvGrpSpPr>
+        <p:grpSpPr>
+          <a:xfrm>
+            <a:off x="7696200" y="628650"/>
+            <a:ext cx="3200400" cy="3829050"/>
+            <a:chOff x="7696200" y="1028700"/>
+            <a:chExt cx="3200400" cy="3829050"/>
+          </a:xfrm>
+          <a:solidFill>
+            <a:schemeClr val="bg1">
+              <a:lumMod val="85000"/>
+            </a:schemeClr>
+          </a:solidFill>
+        </p:grpSpPr>
+        <p:sp>
+          <p:nvSpPr>
+            <p:cNvPr id="31" name="Rectangle 30">
+              <a:extLst>
+                <a:ext uri="{FF2B5EF4-FFF2-40B4-BE49-F238E27FC236}">
+                  <a16:creationId xmlns:a16="http://schemas.microsoft.com/office/drawing/2014/main" id="{675EEF24-EA6C-46C1-8D5D-5D37AD9F7652}"/>
+                </a:ext>
+              </a:extLst>
+            </p:cNvPr>
+            <p:cNvSpPr/>
+            <p:nvPr/>
+          </p:nvSpPr>
+          <p:spPr>
+            <a:xfrm>
+              <a:off x="7696200" y="1028700"/>
+              <a:ext cx="3200400" cy="3829050"/>
+            </a:xfrm>
+            <a:prstGeom prst="rect">
+              <a:avLst/>
+            </a:prstGeom>
+            <a:grpFill/>
+          </p:spPr>
+          <p:style>
+            <a:lnRef idx="2">
+              <a:schemeClr val="accent1">
+                <a:shade val="50000"/>
+              </a:schemeClr>
+            </a:lnRef>
+            <a:fillRef idx="1">
+              <a:schemeClr val="accent1"/>
+            </a:fillRef>
+            <a:effectRef idx="0">
+              <a:schemeClr val="accent1"/>
+            </a:effectRef>
+            <a:fontRef idx="minor">
+              <a:schemeClr val="lt1"/>
+            </a:fontRef>
+          </p:style>
+          <p:txBody>
+            <a:bodyPr rtlCol="0" anchor="t"/>
+            <a:lstStyle/>
+            <a:p>
+              <a:r>
+                <a:rPr lang="en-US" dirty="0">
+                  <a:solidFill>
+                    <a:schemeClr val="tx1"/>
+                  </a:solidFill>
+                </a:rPr>
+                <a:t>Drive/</a:t>
+              </a:r>
+            </a:p>
+          </p:txBody>
+        </p:sp>
+        <p:sp>
+          <p:nvSpPr>
+            <p:cNvPr id="34" name="Rectangle 33">
+              <a:extLst>
+                <a:ext uri="{FF2B5EF4-FFF2-40B4-BE49-F238E27FC236}">
+                  <a16:creationId xmlns:a16="http://schemas.microsoft.com/office/drawing/2014/main" id="{184B1D66-7575-4EAC-86B7-20844E0290ED}"/>
+                </a:ext>
+              </a:extLst>
+            </p:cNvPr>
+            <p:cNvSpPr/>
+            <p:nvPr/>
+          </p:nvSpPr>
+          <p:spPr>
+            <a:xfrm>
+              <a:off x="7924800" y="1314450"/>
+              <a:ext cx="2743200" cy="742950"/>
+            </a:xfrm>
+            <a:prstGeom prst="rect">
+              <a:avLst/>
+            </a:prstGeom>
+            <a:grpFill/>
+          </p:spPr>
+          <p:style>
+            <a:lnRef idx="2">
+              <a:schemeClr val="accent1">
+                <a:shade val="50000"/>
+              </a:schemeClr>
+            </a:lnRef>
+            <a:fillRef idx="1">
+              <a:schemeClr val="accent1"/>
+            </a:fillRef>
+            <a:effectRef idx="0">
+              <a:schemeClr val="accent1"/>
+            </a:effectRef>
+            <a:fontRef idx="minor">
+              <a:schemeClr val="lt1"/>
+            </a:fontRef>
+          </p:style>
+          <p:txBody>
+            <a:bodyPr rtlCol="0" anchor="t"/>
+            <a:lstStyle/>
+            <a:p>
+              <a:r>
+                <a:rPr lang="en-US" dirty="0">
+                  <a:solidFill>
+                    <a:schemeClr val="tx1"/>
+                  </a:solidFill>
+                </a:rPr>
+                <a:t>Drivetrain Interface</a:t>
+              </a:r>
+            </a:p>
+            <a:p>
+              <a:r>
+                <a:rPr lang="en-US" sz="1200" dirty="0">
+                  <a:solidFill>
+                    <a:schemeClr val="tx1"/>
+                  </a:solidFill>
+                </a:rPr>
+                <a:t>Receives commands and publishes them in pairs (left, right)</a:t>
+              </a:r>
+            </a:p>
+          </p:txBody>
+        </p:sp>
+        <p:sp>
+          <p:nvSpPr>
+            <p:cNvPr id="37" name="Rectangle 36">
+              <a:extLst>
+                <a:ext uri="{FF2B5EF4-FFF2-40B4-BE49-F238E27FC236}">
+                  <a16:creationId xmlns:a16="http://schemas.microsoft.com/office/drawing/2014/main" id="{24C034A4-9EEE-4274-BC0D-4D51497B1D49}"/>
+                </a:ext>
+              </a:extLst>
+            </p:cNvPr>
+            <p:cNvSpPr/>
+            <p:nvPr/>
+          </p:nvSpPr>
+          <p:spPr>
+            <a:xfrm>
+              <a:off x="7924800" y="3028950"/>
+              <a:ext cx="2743200" cy="742950"/>
+            </a:xfrm>
+            <a:prstGeom prst="rect">
+              <a:avLst/>
+            </a:prstGeom>
+            <a:grpFill/>
+          </p:spPr>
+          <p:style>
+            <a:lnRef idx="2">
+              <a:schemeClr val="accent1">
+                <a:shade val="50000"/>
+              </a:schemeClr>
+            </a:lnRef>
+            <a:fillRef idx="1">
+              <a:schemeClr val="accent1"/>
+            </a:fillRef>
+            <a:effectRef idx="0">
+              <a:schemeClr val="accent1"/>
+            </a:effectRef>
+            <a:fontRef idx="minor">
+              <a:schemeClr val="lt1"/>
+            </a:fontRef>
+          </p:style>
+          <p:txBody>
+            <a:bodyPr rtlCol="0" anchor="t"/>
+            <a:lstStyle/>
+            <a:p>
+              <a:r>
+                <a:rPr lang="en-US" dirty="0">
+                  <a:solidFill>
+                    <a:schemeClr val="tx1"/>
+                  </a:solidFill>
+                </a:rPr>
+                <a:t>Drivetrain Control</a:t>
+              </a:r>
+            </a:p>
+            <a:p>
+              <a:r>
+                <a:rPr lang="en-US" sz="1200" dirty="0">
+                  <a:solidFill>
+                    <a:schemeClr val="tx1"/>
+                  </a:solidFill>
+                </a:rPr>
+                <a:t>Subscribes to drive command pairs and outputs the individual motor values</a:t>
+              </a:r>
+            </a:p>
+          </p:txBody>
+        </p:sp>
+        <p:sp>
+          <p:nvSpPr>
+            <p:cNvPr id="38" name="Rectangle 37">
+              <a:extLst>
+                <a:ext uri="{FF2B5EF4-FFF2-40B4-BE49-F238E27FC236}">
+                  <a16:creationId xmlns:a16="http://schemas.microsoft.com/office/drawing/2014/main" id="{2B4FEAAD-A783-4A75-9E30-B78A44E263DE}"/>
+                </a:ext>
+              </a:extLst>
+            </p:cNvPr>
+            <p:cNvSpPr/>
+            <p:nvPr/>
+          </p:nvSpPr>
+          <p:spPr>
+            <a:xfrm>
+              <a:off x="7924800" y="3886200"/>
+              <a:ext cx="2743200" cy="742950"/>
+            </a:xfrm>
+            <a:prstGeom prst="rect">
+              <a:avLst/>
+            </a:prstGeom>
+            <a:grpFill/>
+          </p:spPr>
+          <p:style>
+            <a:lnRef idx="2">
+              <a:schemeClr val="accent1">
+                <a:shade val="50000"/>
+              </a:schemeClr>
+            </a:lnRef>
+            <a:fillRef idx="1">
+              <a:schemeClr val="accent1"/>
+            </a:fillRef>
+            <a:effectRef idx="0">
+              <a:schemeClr val="accent1"/>
+            </a:effectRef>
+            <a:fontRef idx="minor">
+              <a:schemeClr val="lt1"/>
+            </a:fontRef>
+          </p:style>
+          <p:txBody>
+            <a:bodyPr rtlCol="0" anchor="t"/>
+            <a:lstStyle/>
+            <a:p>
+              <a:r>
+                <a:rPr lang="en-US" dirty="0">
+                  <a:solidFill>
+                    <a:schemeClr val="tx1"/>
+                  </a:solidFill>
+                </a:rPr>
+                <a:t>Mapping</a:t>
+              </a:r>
+            </a:p>
+            <a:p>
+              <a:r>
+                <a:rPr lang="en-US" sz="1200" dirty="0">
+                  <a:solidFill>
+                    <a:schemeClr val="tx1"/>
+                  </a:solidFill>
+                </a:rPr>
+                <a:t>Scales the motor outputs for the PWM outputs.</a:t>
+              </a:r>
+            </a:p>
+          </p:txBody>
+        </p:sp>
+        <p:sp>
+          <p:nvSpPr>
+            <p:cNvPr id="39" name="Rectangle 38">
+              <a:extLst>
+                <a:ext uri="{FF2B5EF4-FFF2-40B4-BE49-F238E27FC236}">
+                  <a16:creationId xmlns:a16="http://schemas.microsoft.com/office/drawing/2014/main" id="{0078860F-B68B-4962-AF65-409A5FF72238}"/>
+                </a:ext>
+              </a:extLst>
+            </p:cNvPr>
+            <p:cNvSpPr/>
+            <p:nvPr/>
+          </p:nvSpPr>
+          <p:spPr>
+            <a:xfrm>
+              <a:off x="7924800" y="2171700"/>
+              <a:ext cx="2743200" cy="742950"/>
+            </a:xfrm>
+            <a:prstGeom prst="rect">
+              <a:avLst/>
+            </a:prstGeom>
+            <a:grpFill/>
+          </p:spPr>
+          <p:style>
+            <a:lnRef idx="2">
+              <a:schemeClr val="accent1">
+                <a:shade val="50000"/>
+              </a:schemeClr>
+            </a:lnRef>
+            <a:fillRef idx="1">
+              <a:schemeClr val="accent1"/>
+            </a:fillRef>
+            <a:effectRef idx="0">
+              <a:schemeClr val="accent1"/>
+            </a:effectRef>
+            <a:fontRef idx="minor">
+              <a:schemeClr val="lt1"/>
+            </a:fontRef>
+          </p:style>
+          <p:txBody>
+            <a:bodyPr rtlCol="0" anchor="t"/>
+            <a:lstStyle/>
+            <a:p>
+              <a:r>
+                <a:rPr lang="en-US" dirty="0">
+                  <a:solidFill>
+                    <a:schemeClr val="tx1"/>
+                  </a:solidFill>
+                </a:rPr>
+                <a:t>Drivetrain </a:t>
+              </a:r>
+              <a:r>
+                <a:rPr lang="en-US" dirty="0" err="1">
+                  <a:solidFill>
+                    <a:schemeClr val="tx1"/>
+                  </a:solidFill>
+                </a:rPr>
+                <a:t>Hartbeat</a:t>
+              </a:r>
+              <a:endParaRPr lang="en-US" dirty="0">
+                <a:solidFill>
+                  <a:schemeClr val="tx1"/>
+                </a:solidFill>
+              </a:endParaRPr>
+            </a:p>
+            <a:p>
+              <a:r>
+                <a:rPr lang="en-US" sz="1200" dirty="0">
+                  <a:solidFill>
+                    <a:schemeClr val="tx1"/>
+                  </a:solidFill>
+                </a:rPr>
+                <a:t>Monitors for a gap in the drivetrain command pairs and stops the rover</a:t>
+              </a:r>
+            </a:p>
+          </p:txBody>
+        </p:sp>
+      </p:grpSp>
+      <p:grpSp>
+        <p:nvGrpSpPr>
+          <p:cNvPr id="67" name="Group 66">
+            <a:extLst>
+              <a:ext uri="{FF2B5EF4-FFF2-40B4-BE49-F238E27FC236}">
+                <a16:creationId xmlns:a16="http://schemas.microsoft.com/office/drawing/2014/main" id="{3518AE46-7FBA-42EF-9A1B-2ABB9C709DDE}"/>
+              </a:ext>
+            </a:extLst>
+          </p:cNvPr>
+          <p:cNvGrpSpPr/>
+          <p:nvPr/>
+        </p:nvGrpSpPr>
+        <p:grpSpPr>
+          <a:xfrm>
+            <a:off x="4267200" y="3257550"/>
+            <a:ext cx="3200400" cy="2914650"/>
+            <a:chOff x="4267200" y="3257550"/>
+            <a:chExt cx="3200400" cy="2914650"/>
+          </a:xfrm>
+        </p:grpSpPr>
+        <p:sp>
+          <p:nvSpPr>
+            <p:cNvPr id="42" name="Rectangle 41">
+              <a:extLst>
+                <a:ext uri="{FF2B5EF4-FFF2-40B4-BE49-F238E27FC236}">
+                  <a16:creationId xmlns:a16="http://schemas.microsoft.com/office/drawing/2014/main" id="{86296EC5-915C-46D5-B2DE-674A5EF7BE3F}"/>
+                </a:ext>
+              </a:extLst>
+            </p:cNvPr>
+            <p:cNvSpPr/>
+            <p:nvPr/>
+          </p:nvSpPr>
+          <p:spPr>
+            <a:xfrm>
+              <a:off x="4267200" y="3257550"/>
+              <a:ext cx="3200400" cy="2914650"/>
+            </a:xfrm>
+            <a:prstGeom prst="rect">
+              <a:avLst/>
+            </a:prstGeom>
+            <a:solidFill>
+              <a:schemeClr val="bg1">
+                <a:lumMod val="85000"/>
+              </a:schemeClr>
+            </a:solidFill>
+          </p:spPr>
+          <p:style>
+            <a:lnRef idx="2">
+              <a:schemeClr val="accent1">
+                <a:shade val="50000"/>
+              </a:schemeClr>
+            </a:lnRef>
+            <a:fillRef idx="1">
+              <a:schemeClr val="accent1"/>
+            </a:fillRef>
+            <a:effectRef idx="0">
+              <a:schemeClr val="accent1"/>
+            </a:effectRef>
+            <a:fontRef idx="minor">
+              <a:schemeClr val="lt1"/>
+            </a:fontRef>
+          </p:style>
+          <p:txBody>
+            <a:bodyPr rtlCol="0" anchor="t"/>
+            <a:lstStyle/>
+            <a:p>
+              <a:r>
+                <a:rPr lang="en-US" dirty="0">
+                  <a:solidFill>
+                    <a:schemeClr val="tx1"/>
+                  </a:solidFill>
+                </a:rPr>
+                <a:t>Arm/</a:t>
+              </a:r>
+            </a:p>
+          </p:txBody>
+        </p:sp>
+        <p:sp>
+          <p:nvSpPr>
+            <p:cNvPr id="64" name="Rectangle 63">
+              <a:extLst>
+                <a:ext uri="{FF2B5EF4-FFF2-40B4-BE49-F238E27FC236}">
+                  <a16:creationId xmlns:a16="http://schemas.microsoft.com/office/drawing/2014/main" id="{0C417E82-235B-43C8-A720-C9FEFB93B795}"/>
+                </a:ext>
+              </a:extLst>
+            </p:cNvPr>
+            <p:cNvSpPr/>
+            <p:nvPr/>
+          </p:nvSpPr>
+          <p:spPr>
+            <a:xfrm>
+              <a:off x="4495800" y="3543300"/>
+              <a:ext cx="2743200" cy="742950"/>
+            </a:xfrm>
+            <a:prstGeom prst="rect">
+              <a:avLst/>
+            </a:prstGeom>
+            <a:solidFill>
+              <a:schemeClr val="bg1">
+                <a:lumMod val="85000"/>
+              </a:schemeClr>
+            </a:solidFill>
+          </p:spPr>
+          <p:style>
+            <a:lnRef idx="2">
+              <a:schemeClr val="accent1">
+                <a:shade val="50000"/>
+              </a:schemeClr>
+            </a:lnRef>
+            <a:fillRef idx="1">
+              <a:schemeClr val="accent1"/>
+            </a:fillRef>
+            <a:effectRef idx="0">
+              <a:schemeClr val="accent1"/>
+            </a:effectRef>
+            <a:fontRef idx="minor">
+              <a:schemeClr val="lt1"/>
+            </a:fontRef>
+          </p:style>
+          <p:txBody>
+            <a:bodyPr rtlCol="0" anchor="t"/>
+            <a:lstStyle/>
+            <a:p>
+              <a:endParaRPr lang="en-US" sz="1200" dirty="0">
+                <a:solidFill>
+                  <a:schemeClr val="tx1"/>
+                </a:solidFill>
+              </a:endParaRPr>
+            </a:p>
+          </p:txBody>
+        </p:sp>
+        <p:sp>
+          <p:nvSpPr>
+            <p:cNvPr id="65" name="Rectangle 64">
+              <a:extLst>
+                <a:ext uri="{FF2B5EF4-FFF2-40B4-BE49-F238E27FC236}">
+                  <a16:creationId xmlns:a16="http://schemas.microsoft.com/office/drawing/2014/main" id="{319F9AE6-90FE-402E-8940-E8440B88B8CB}"/>
+                </a:ext>
+              </a:extLst>
+            </p:cNvPr>
+            <p:cNvSpPr/>
+            <p:nvPr/>
+          </p:nvSpPr>
+          <p:spPr>
+            <a:xfrm>
+              <a:off x="4495800" y="4457700"/>
+              <a:ext cx="2743200" cy="742950"/>
+            </a:xfrm>
+            <a:prstGeom prst="rect">
+              <a:avLst/>
+            </a:prstGeom>
+            <a:solidFill>
+              <a:schemeClr val="bg1">
+                <a:lumMod val="85000"/>
+              </a:schemeClr>
+            </a:solidFill>
+          </p:spPr>
+          <p:style>
+            <a:lnRef idx="2">
+              <a:schemeClr val="accent1">
+                <a:shade val="50000"/>
+              </a:schemeClr>
+            </a:lnRef>
+            <a:fillRef idx="1">
+              <a:schemeClr val="accent1"/>
+            </a:fillRef>
+            <a:effectRef idx="0">
+              <a:schemeClr val="accent1"/>
+            </a:effectRef>
+            <a:fontRef idx="minor">
+              <a:schemeClr val="lt1"/>
+            </a:fontRef>
+          </p:style>
+          <p:txBody>
+            <a:bodyPr rtlCol="0" anchor="t"/>
+            <a:lstStyle/>
+            <a:p>
+              <a:endParaRPr lang="en-US" sz="1200" dirty="0">
+                <a:solidFill>
+                  <a:schemeClr val="tx1"/>
+                </a:solidFill>
+              </a:endParaRPr>
+            </a:p>
+          </p:txBody>
+        </p:sp>
+        <p:sp>
+          <p:nvSpPr>
+            <p:cNvPr id="66" name="Rectangle 65">
+              <a:extLst>
+                <a:ext uri="{FF2B5EF4-FFF2-40B4-BE49-F238E27FC236}">
+                  <a16:creationId xmlns:a16="http://schemas.microsoft.com/office/drawing/2014/main" id="{9BB98254-AAB7-446C-A80B-B0A7137E5949}"/>
+                </a:ext>
+              </a:extLst>
+            </p:cNvPr>
+            <p:cNvSpPr/>
+            <p:nvPr/>
+          </p:nvSpPr>
+          <p:spPr>
+            <a:xfrm>
+              <a:off x="4495800" y="5372100"/>
+              <a:ext cx="2743200" cy="571500"/>
+            </a:xfrm>
+            <a:prstGeom prst="rect">
+              <a:avLst/>
+            </a:prstGeom>
+            <a:solidFill>
+              <a:schemeClr val="bg1">
+                <a:lumMod val="85000"/>
+              </a:schemeClr>
+            </a:solidFill>
+          </p:spPr>
+          <p:style>
+            <a:lnRef idx="2">
+              <a:schemeClr val="accent1">
+                <a:shade val="50000"/>
+              </a:schemeClr>
+            </a:lnRef>
+            <a:fillRef idx="1">
+              <a:schemeClr val="accent1"/>
+            </a:fillRef>
+            <a:effectRef idx="0">
+              <a:schemeClr val="accent1"/>
+            </a:effectRef>
+            <a:fontRef idx="minor">
+              <a:schemeClr val="lt1"/>
+            </a:fontRef>
+          </p:style>
+          <p:txBody>
+            <a:bodyPr rtlCol="0" anchor="t"/>
+            <a:lstStyle/>
+            <a:p>
+              <a:endParaRPr lang="en-US" sz="1200" dirty="0">
+                <a:solidFill>
+                  <a:schemeClr val="tx1"/>
+                </a:solidFill>
+              </a:endParaRPr>
+            </a:p>
+          </p:txBody>
+        </p:sp>
+        <p:sp>
+          <p:nvSpPr>
+            <p:cNvPr id="60" name="Rectangle 59">
+              <a:extLst>
+                <a:ext uri="{FF2B5EF4-FFF2-40B4-BE49-F238E27FC236}">
+                  <a16:creationId xmlns:a16="http://schemas.microsoft.com/office/drawing/2014/main" id="{8B9A26B4-54B8-4603-979E-C3910AD6102B}"/>
+                </a:ext>
+              </a:extLst>
+            </p:cNvPr>
+            <p:cNvSpPr/>
+            <p:nvPr/>
+          </p:nvSpPr>
+          <p:spPr>
+            <a:xfrm>
+              <a:off x="4552950" y="3600450"/>
+              <a:ext cx="2743200" cy="742950"/>
+            </a:xfrm>
+            <a:prstGeom prst="rect">
+              <a:avLst/>
+            </a:prstGeom>
+            <a:solidFill>
+              <a:schemeClr val="bg1">
+                <a:lumMod val="85000"/>
+              </a:schemeClr>
+            </a:solidFill>
+          </p:spPr>
+          <p:style>
+            <a:lnRef idx="2">
+              <a:schemeClr val="accent1">
+                <a:shade val="50000"/>
+              </a:schemeClr>
+            </a:lnRef>
+            <a:fillRef idx="1">
+              <a:schemeClr val="accent1"/>
+            </a:fillRef>
+            <a:effectRef idx="0">
+              <a:schemeClr val="accent1"/>
+            </a:effectRef>
+            <a:fontRef idx="minor">
+              <a:schemeClr val="lt1"/>
+            </a:fontRef>
+          </p:style>
+          <p:txBody>
+            <a:bodyPr rtlCol="0" anchor="t"/>
+            <a:lstStyle/>
+            <a:p>
+              <a:endParaRPr lang="en-US" sz="1200" dirty="0">
+                <a:solidFill>
+                  <a:schemeClr val="tx1"/>
+                </a:solidFill>
+              </a:endParaRPr>
+            </a:p>
+          </p:txBody>
+        </p:sp>
+        <p:sp>
+          <p:nvSpPr>
+            <p:cNvPr id="62" name="Rectangle 61">
+              <a:extLst>
+                <a:ext uri="{FF2B5EF4-FFF2-40B4-BE49-F238E27FC236}">
+                  <a16:creationId xmlns:a16="http://schemas.microsoft.com/office/drawing/2014/main" id="{A6266E6B-8A03-42B9-AC9F-A2A5E45D6051}"/>
+                </a:ext>
+              </a:extLst>
+            </p:cNvPr>
+            <p:cNvSpPr/>
+            <p:nvPr/>
+          </p:nvSpPr>
+          <p:spPr>
+            <a:xfrm>
+              <a:off x="4552950" y="5429250"/>
+              <a:ext cx="2743200" cy="571500"/>
+            </a:xfrm>
+            <a:prstGeom prst="rect">
+              <a:avLst/>
+            </a:prstGeom>
+            <a:solidFill>
+              <a:schemeClr val="bg1">
+                <a:lumMod val="85000"/>
+              </a:schemeClr>
+            </a:solidFill>
+          </p:spPr>
+          <p:style>
+            <a:lnRef idx="2">
+              <a:schemeClr val="accent1">
+                <a:shade val="50000"/>
+              </a:schemeClr>
+            </a:lnRef>
+            <a:fillRef idx="1">
+              <a:schemeClr val="accent1"/>
+            </a:fillRef>
+            <a:effectRef idx="0">
+              <a:schemeClr val="accent1"/>
+            </a:effectRef>
+            <a:fontRef idx="minor">
+              <a:schemeClr val="lt1"/>
+            </a:fontRef>
+          </p:style>
+          <p:txBody>
+            <a:bodyPr rtlCol="0" anchor="t"/>
+            <a:lstStyle/>
+            <a:p>
+              <a:endParaRPr lang="en-US" sz="1200" dirty="0">
+                <a:solidFill>
+                  <a:schemeClr val="tx1"/>
+                </a:solidFill>
+              </a:endParaRPr>
+            </a:p>
+          </p:txBody>
+        </p:sp>
+        <p:sp>
+          <p:nvSpPr>
+            <p:cNvPr id="48" name="Rectangle 47">
+              <a:extLst>
+                <a:ext uri="{FF2B5EF4-FFF2-40B4-BE49-F238E27FC236}">
+                  <a16:creationId xmlns:a16="http://schemas.microsoft.com/office/drawing/2014/main" id="{AF315EB8-037A-4A7D-BEE5-34251E2B9EB8}"/>
+                </a:ext>
+              </a:extLst>
+            </p:cNvPr>
+            <p:cNvSpPr/>
+            <p:nvPr/>
+          </p:nvSpPr>
+          <p:spPr>
+            <a:xfrm>
+              <a:off x="4610100" y="3657600"/>
+              <a:ext cx="2743200" cy="742950"/>
+            </a:xfrm>
+            <a:prstGeom prst="rect">
+              <a:avLst/>
+            </a:prstGeom>
+            <a:solidFill>
+              <a:schemeClr val="bg1">
+                <a:lumMod val="85000"/>
+              </a:schemeClr>
+            </a:solidFill>
+          </p:spPr>
+          <p:style>
+            <a:lnRef idx="2">
+              <a:schemeClr val="accent1">
+                <a:shade val="50000"/>
+              </a:schemeClr>
+            </a:lnRef>
+            <a:fillRef idx="1">
+              <a:schemeClr val="accent1"/>
+            </a:fillRef>
+            <a:effectRef idx="0">
+              <a:schemeClr val="accent1"/>
+            </a:effectRef>
+            <a:fontRef idx="minor">
+              <a:schemeClr val="lt1"/>
+            </a:fontRef>
+          </p:style>
+          <p:txBody>
+            <a:bodyPr rtlCol="0" anchor="t"/>
+            <a:lstStyle/>
+            <a:p>
+              <a:r>
+                <a:rPr lang="en-US" dirty="0">
+                  <a:solidFill>
+                    <a:schemeClr val="tx1"/>
+                  </a:solidFill>
+                </a:rPr>
+                <a:t>Actuator Interface</a:t>
+              </a:r>
+            </a:p>
+            <a:p>
+              <a:r>
+                <a:rPr lang="en-US" sz="1200" dirty="0">
+                  <a:solidFill>
+                    <a:schemeClr val="tx1"/>
+                  </a:solidFill>
+                </a:rPr>
+                <a:t>Receives commands for an actuator and publishes them.</a:t>
+              </a:r>
+            </a:p>
+          </p:txBody>
+        </p:sp>
+        <p:sp>
+          <p:nvSpPr>
+            <p:cNvPr id="49" name="Rectangle 48">
+              <a:extLst>
+                <a:ext uri="{FF2B5EF4-FFF2-40B4-BE49-F238E27FC236}">
+                  <a16:creationId xmlns:a16="http://schemas.microsoft.com/office/drawing/2014/main" id="{8F05F808-1569-468F-9EF0-42A6FADF6227}"/>
+                </a:ext>
+              </a:extLst>
+            </p:cNvPr>
+            <p:cNvSpPr/>
+            <p:nvPr/>
+          </p:nvSpPr>
+          <p:spPr>
+            <a:xfrm>
+              <a:off x="4552950" y="4514850"/>
+              <a:ext cx="2743200" cy="742950"/>
+            </a:xfrm>
+            <a:prstGeom prst="rect">
+              <a:avLst/>
+            </a:prstGeom>
+            <a:solidFill>
+              <a:schemeClr val="bg1">
+                <a:lumMod val="85000"/>
+              </a:schemeClr>
+            </a:solidFill>
+          </p:spPr>
+          <p:style>
+            <a:lnRef idx="2">
+              <a:schemeClr val="accent1">
+                <a:shade val="50000"/>
+              </a:schemeClr>
+            </a:lnRef>
+            <a:fillRef idx="1">
+              <a:schemeClr val="accent1"/>
+            </a:fillRef>
+            <a:effectRef idx="0">
+              <a:schemeClr val="accent1"/>
+            </a:effectRef>
+            <a:fontRef idx="minor">
+              <a:schemeClr val="lt1"/>
+            </a:fontRef>
+          </p:style>
+          <p:txBody>
+            <a:bodyPr rtlCol="0" anchor="t"/>
+            <a:lstStyle/>
+            <a:p>
+              <a:r>
+                <a:rPr lang="en-US" dirty="0">
+                  <a:solidFill>
+                    <a:schemeClr val="tx1"/>
+                  </a:solidFill>
+                </a:rPr>
+                <a:t>Actuator Limiting</a:t>
+              </a:r>
+            </a:p>
+            <a:p>
+              <a:r>
+                <a:rPr lang="en-US" sz="1200" dirty="0">
+                  <a:solidFill>
+                    <a:schemeClr val="tx1"/>
+                  </a:solidFill>
+                </a:rPr>
+                <a:t>Limits the value of an actuator command when configured switches are active.</a:t>
+              </a:r>
+            </a:p>
+          </p:txBody>
+        </p:sp>
+        <p:sp>
+          <p:nvSpPr>
+            <p:cNvPr id="58" name="Rectangle 57">
+              <a:extLst>
+                <a:ext uri="{FF2B5EF4-FFF2-40B4-BE49-F238E27FC236}">
+                  <a16:creationId xmlns:a16="http://schemas.microsoft.com/office/drawing/2014/main" id="{9ED7CBDD-E3A3-4F93-8715-A4B1B3B1B39C}"/>
+                </a:ext>
+              </a:extLst>
+            </p:cNvPr>
+            <p:cNvSpPr/>
+            <p:nvPr/>
+          </p:nvSpPr>
+          <p:spPr>
+            <a:xfrm>
+              <a:off x="4610100" y="5486400"/>
+              <a:ext cx="2743200" cy="571500"/>
+            </a:xfrm>
+            <a:prstGeom prst="rect">
+              <a:avLst/>
+            </a:prstGeom>
+            <a:solidFill>
+              <a:schemeClr val="bg1">
+                <a:lumMod val="85000"/>
+              </a:schemeClr>
+            </a:solidFill>
+          </p:spPr>
+          <p:style>
+            <a:lnRef idx="2">
+              <a:schemeClr val="accent1">
+                <a:shade val="50000"/>
+              </a:schemeClr>
+            </a:lnRef>
+            <a:fillRef idx="1">
+              <a:schemeClr val="accent1"/>
+            </a:fillRef>
+            <a:effectRef idx="0">
+              <a:schemeClr val="accent1"/>
+            </a:effectRef>
+            <a:fontRef idx="minor">
+              <a:schemeClr val="lt1"/>
+            </a:fontRef>
+          </p:style>
+          <p:txBody>
+            <a:bodyPr rtlCol="0" anchor="t"/>
+            <a:lstStyle/>
+            <a:p>
+              <a:r>
+                <a:rPr lang="en-US" dirty="0">
+                  <a:solidFill>
+                    <a:schemeClr val="tx1"/>
+                  </a:solidFill>
+                </a:rPr>
+                <a:t>Mapping</a:t>
+              </a:r>
+            </a:p>
+            <a:p>
+              <a:r>
+                <a:rPr lang="en-US" sz="1200" dirty="0">
+                  <a:solidFill>
+                    <a:schemeClr val="tx1"/>
+                  </a:solidFill>
+                </a:rPr>
+                <a:t>Scales the outputs for the PWM board</a:t>
+              </a:r>
+            </a:p>
+          </p:txBody>
+        </p:sp>
+      </p:grpSp>
+      <p:grpSp>
+        <p:nvGrpSpPr>
+          <p:cNvPr id="78" name="Group 77">
+            <a:extLst>
+              <a:ext uri="{FF2B5EF4-FFF2-40B4-BE49-F238E27FC236}">
+                <a16:creationId xmlns:a16="http://schemas.microsoft.com/office/drawing/2014/main" id="{FEDA687A-B140-4BCB-918F-3B4D2CA30544}"/>
+              </a:ext>
+            </a:extLst>
+          </p:cNvPr>
+          <p:cNvGrpSpPr/>
+          <p:nvPr/>
+        </p:nvGrpSpPr>
+        <p:grpSpPr>
+          <a:xfrm>
+            <a:off x="7696200" y="4629150"/>
+            <a:ext cx="3200400" cy="1543050"/>
+            <a:chOff x="7581900" y="3028950"/>
+            <a:chExt cx="3200400" cy="1485900"/>
+          </a:xfrm>
+        </p:grpSpPr>
+        <p:sp>
+          <p:nvSpPr>
+            <p:cNvPr id="69" name="Rectangle 68">
+              <a:extLst>
+                <a:ext uri="{FF2B5EF4-FFF2-40B4-BE49-F238E27FC236}">
+                  <a16:creationId xmlns:a16="http://schemas.microsoft.com/office/drawing/2014/main" id="{806B4353-BE35-4568-B992-C4DAF11E201E}"/>
+                </a:ext>
+              </a:extLst>
+            </p:cNvPr>
+            <p:cNvSpPr/>
+            <p:nvPr/>
+          </p:nvSpPr>
+          <p:spPr>
+            <a:xfrm>
+              <a:off x="7581900" y="3028950"/>
+              <a:ext cx="3200400" cy="1485900"/>
+            </a:xfrm>
+            <a:prstGeom prst="rect">
+              <a:avLst/>
+            </a:prstGeom>
+            <a:solidFill>
+              <a:schemeClr val="bg1">
+                <a:lumMod val="85000"/>
+              </a:schemeClr>
+            </a:solidFill>
+          </p:spPr>
+          <p:style>
+            <a:lnRef idx="2">
+              <a:schemeClr val="accent1">
+                <a:shade val="50000"/>
+              </a:schemeClr>
+            </a:lnRef>
+            <a:fillRef idx="1">
+              <a:schemeClr val="accent1"/>
+            </a:fillRef>
+            <a:effectRef idx="0">
+              <a:schemeClr val="accent1"/>
+            </a:effectRef>
+            <a:fontRef idx="minor">
+              <a:schemeClr val="lt1"/>
+            </a:fontRef>
+          </p:style>
+          <p:txBody>
+            <a:bodyPr rtlCol="0" anchor="t"/>
+            <a:lstStyle/>
+            <a:p>
+              <a:r>
+                <a:rPr lang="en-US" dirty="0">
+                  <a:solidFill>
+                    <a:schemeClr val="tx1"/>
+                  </a:solidFill>
+                </a:rPr>
+                <a:t>System Cooling/</a:t>
+              </a:r>
+            </a:p>
+          </p:txBody>
+        </p:sp>
+        <p:sp>
+          <p:nvSpPr>
+            <p:cNvPr id="75" name="Rectangle 74">
+              <a:extLst>
+                <a:ext uri="{FF2B5EF4-FFF2-40B4-BE49-F238E27FC236}">
+                  <a16:creationId xmlns:a16="http://schemas.microsoft.com/office/drawing/2014/main" id="{B124467C-9901-4E3C-8CAA-28064BFC0A52}"/>
+                </a:ext>
+              </a:extLst>
+            </p:cNvPr>
+            <p:cNvSpPr/>
+            <p:nvPr/>
+          </p:nvSpPr>
+          <p:spPr>
+            <a:xfrm>
+              <a:off x="7810500" y="3414183"/>
+              <a:ext cx="2743200" cy="742950"/>
+            </a:xfrm>
+            <a:prstGeom prst="rect">
+              <a:avLst/>
+            </a:prstGeom>
+            <a:solidFill>
+              <a:schemeClr val="bg1">
+                <a:lumMod val="85000"/>
+              </a:schemeClr>
+            </a:solidFill>
+          </p:spPr>
+          <p:style>
+            <a:lnRef idx="2">
+              <a:schemeClr val="accent1">
+                <a:shade val="50000"/>
+              </a:schemeClr>
+            </a:lnRef>
+            <a:fillRef idx="1">
+              <a:schemeClr val="accent1"/>
+            </a:fillRef>
+            <a:effectRef idx="0">
+              <a:schemeClr val="accent1"/>
+            </a:effectRef>
+            <a:fontRef idx="minor">
+              <a:schemeClr val="lt1"/>
+            </a:fontRef>
+          </p:style>
+          <p:txBody>
+            <a:bodyPr rtlCol="0" anchor="t"/>
+            <a:lstStyle/>
+            <a:p>
+              <a:r>
+                <a:rPr lang="en-US" dirty="0">
+                  <a:solidFill>
+                    <a:schemeClr val="tx1"/>
+                  </a:solidFill>
+                </a:rPr>
+                <a:t>PID Controller</a:t>
+              </a:r>
+            </a:p>
+            <a:p>
+              <a:r>
+                <a:rPr lang="en-US" sz="1200" dirty="0">
+                  <a:solidFill>
+                    <a:schemeClr val="tx1"/>
+                  </a:solidFill>
+                </a:rPr>
+                <a:t>Monitors temperature and outputs speed to the fans (via PWM controller)</a:t>
+              </a:r>
+            </a:p>
+          </p:txBody>
+        </p:sp>
+      </p:grpSp>
+    </p:spTree>
+    <p:extLst>
+      <p:ext uri="{BB962C8B-B14F-4D97-AF65-F5344CB8AC3E}">
+        <p14:creationId xmlns:p14="http://schemas.microsoft.com/office/powerpoint/2010/main" val="3083580986"/>
       </p:ext>
     </p:extLst>
   </p:cSld>

</xml_diff>